<commit_message>
more updates and adjustments
</commit_message>
<xml_diff>
--- a/gnu-parallel-tutorial.pptx
+++ b/gnu-parallel-tutorial.pptx
@@ -5,10 +5,10 @@
     <p:sldMasterId id="2147483660" r:id="rId1"/>
   </p:sldMasterIdLst>
   <p:notesMasterIdLst>
-    <p:notesMasterId r:id="rId66"/>
+    <p:notesMasterId r:id="rId68"/>
   </p:notesMasterIdLst>
   <p:handoutMasterIdLst>
-    <p:handoutMasterId r:id="rId67"/>
+    <p:handoutMasterId r:id="rId69"/>
   </p:handoutMasterIdLst>
   <p:sldIdLst>
     <p:sldId id="256" r:id="rId2"/>
@@ -69,12 +69,14 @@
     <p:sldId id="463" r:id="rId57"/>
     <p:sldId id="432" r:id="rId58"/>
     <p:sldId id="423" r:id="rId59"/>
-    <p:sldId id="411" r:id="rId60"/>
-    <p:sldId id="288" r:id="rId61"/>
-    <p:sldId id="309" r:id="rId62"/>
+    <p:sldId id="464" r:id="rId60"/>
+    <p:sldId id="465" r:id="rId61"/>
+    <p:sldId id="411" r:id="rId62"/>
     <p:sldId id="398" r:id="rId63"/>
     <p:sldId id="393" r:id="rId64"/>
-    <p:sldId id="456" r:id="rId65"/>
+    <p:sldId id="288" r:id="rId65"/>
+    <p:sldId id="309" r:id="rId66"/>
+    <p:sldId id="456" r:id="rId67"/>
   </p:sldIdLst>
   <p:sldSz cx="9144000" cy="5143500" type="screen16x9"/>
   <p:notesSz cx="9144000" cy="6858000"/>
@@ -1399,7 +1401,7 @@
           <a:p>
             <a:fld id="{D97B2049-7013-B143-AD62-F7BCB3DA4A6F}" type="slidenum">
               <a:rPr lang="en-US" smtClean="0"/>
-              <a:t>60</a:t>
+              <a:t>64</a:t>
             </a:fld>
             <a:endParaRPr lang="en-US"/>
           </a:p>
@@ -4298,7 +4300,7 @@
         </p:spPr>
         <p:txBody>
           <a:bodyPr>
-            <a:normAutofit/>
+            <a:normAutofit fontScale="90000"/>
           </a:bodyPr>
           <a:lstStyle/>
           <a:p>
@@ -4306,7 +4308,7 @@
               <a:rPr lang="en-US" dirty="0">
                 <a:latin typeface="National Park " pitchFamily="2" charset="77"/>
               </a:rPr>
-              <a:t>GNU Parallel</a:t>
+              <a:t>Scientific Workflows at scale using GNU Parallel</a:t>
             </a:r>
           </a:p>
         </p:txBody>
@@ -4980,17 +4982,27 @@
               <a:t>: </a:t>
             </a:r>
             <a:r>
-              <a:rPr lang="en-US" dirty="0" err="1">
-                <a:cs typeface="Courier New" panose="02070309020205020404" pitchFamily="49" charset="0"/>
-              </a:rPr>
-              <a:t>www.pi.dk</a:t>
-            </a:r>
-            <a:r>
               <a:rPr lang="en-US" dirty="0">
                 <a:cs typeface="Courier New" panose="02070309020205020404" pitchFamily="49" charset="0"/>
-              </a:rPr>
-              <a:t>/1</a:t>
-            </a:r>
+                <a:hlinkClick r:id="rId2"/>
+              </a:rPr>
+              <a:t>www.pi.dk/1</a:t>
+            </a:r>
+            <a:endParaRPr lang="en-US" dirty="0">
+              <a:cs typeface="Courier New" panose="02070309020205020404" pitchFamily="49" charset="0"/>
+            </a:endParaRPr>
+          </a:p>
+          <a:p>
+            <a:r>
+              <a:rPr lang="en-US" dirty="0">
+                <a:cs typeface="Courier New" panose="02070309020205020404" pitchFamily="49" charset="0"/>
+                <a:hlinkClick r:id="rId3"/>
+              </a:rPr>
+              <a:t>www.gnu.org/software/parallel/parallel_cheat.pdf</a:t>
+            </a:r>
+            <a:endParaRPr lang="en-US" dirty="0">
+              <a:cs typeface="Courier New" panose="02070309020205020404" pitchFamily="49" charset="0"/>
+            </a:endParaRPr>
           </a:p>
           <a:p>
             <a:r>
@@ -7712,7 +7724,7 @@
         <p:spPr/>
         <p:txBody>
           <a:bodyPr>
-            <a:normAutofit/>
+            <a:noAutofit/>
           </a:bodyPr>
           <a:lstStyle/>
           <a:p>
@@ -7777,6 +7789,21 @@
             <a:r>
               <a:rPr lang="en-US" sz="1600" dirty="0"/>
               <a:t>from NERSC / LBNL for his contributions to the tutorial.</a:t>
+            </a:r>
+          </a:p>
+          <a:p>
+            <a:pPr marL="0" indent="0">
+              <a:buNone/>
+            </a:pPr>
+            <a:endParaRPr lang="en-US" sz="1600" dirty="0"/>
+          </a:p>
+          <a:p>
+            <a:pPr marL="0" indent="0">
+              <a:buNone/>
+            </a:pPr>
+            <a:r>
+              <a:rPr lang="en-US" sz="1600" dirty="0"/>
+              <a:t>I thank the eScience Tutorial committee and chairs for providing this opportunity.</a:t>
             </a:r>
             <a:br>
               <a:rPr lang="en-US" sz="1600" dirty="0"/>
@@ -14958,7 +14985,7 @@
         </p:nvSpPr>
         <p:spPr>
           <a:xfrm>
-            <a:off x="628650" y="1577578"/>
+            <a:off x="628650" y="2074664"/>
             <a:ext cx="7886700" cy="994172"/>
           </a:xfrm>
         </p:spPr>
@@ -19461,7 +19488,7 @@
               <a:rPr lang="en-US" dirty="0">
                 <a:latin typeface="National Park " pitchFamily="2" charset="77"/>
               </a:rPr>
-              <a:t>Part 7: A Real Application Example</a:t>
+              <a:t>Part 7: A Real Application</a:t>
             </a:r>
             <a:endParaRPr lang="en-US" i="1" dirty="0">
               <a:latin typeface="National Park Medium" pitchFamily="2" charset="77"/>
@@ -21288,7 +21315,7 @@
         </p:spPr>
         <p:txBody>
           <a:bodyPr>
-            <a:normAutofit fontScale="90000"/>
+            <a:normAutofit/>
           </a:bodyPr>
           <a:lstStyle/>
           <a:p>
@@ -21297,7 +21324,7 @@
               <a:rPr lang="en-US" dirty="0">
                 <a:latin typeface="National Park " pitchFamily="2" charset="77"/>
               </a:rPr>
-              <a:t>Part 8: Putting it all Together: Asynchronous Workflow Execution in HPC at Scale</a:t>
+              <a:t>Part 8: Putting it all Together</a:t>
             </a:r>
             <a:endParaRPr lang="en-US" i="1" dirty="0">
               <a:latin typeface="National Park Medium" pitchFamily="2" charset="77"/>
@@ -21577,10 +21604,13 @@
                 <a:cs typeface="Courier New" panose="02070309020205020404" pitchFamily="49" charset="0"/>
               </a:rPr>
             </a:br>
-            <a:endParaRPr lang="en-US" sz="1640" b="1" dirty="0">
-              <a:latin typeface="Courier New" panose="02070309020205020404" pitchFamily="49" charset="0"/>
-              <a:cs typeface="Courier New" panose="02070309020205020404" pitchFamily="49" charset="0"/>
-            </a:endParaRPr>
+            <a:r>
+              <a:rPr lang="en-US" sz="1640" b="1" dirty="0">
+                <a:latin typeface="Courier New" panose="02070309020205020404" pitchFamily="49" charset="0"/>
+                <a:cs typeface="Courier New" panose="02070309020205020404" pitchFamily="49" charset="0"/>
+              </a:rPr>
+              <a:t>ls | head -3</a:t>
+            </a:r>
           </a:p>
           <a:p>
             <a:pPr marL="0" indent="0">
@@ -21591,33 +21621,32 @@
                 <a:latin typeface="Courier New" panose="02070309020205020404" pitchFamily="49" charset="0"/>
                 <a:cs typeface="Courier New" panose="02070309020205020404" pitchFamily="49" charset="0"/>
               </a:rPr>
-              <a:t>find $PWD -type f | grep </a:t>
-            </a:r>
-            <a:r>
-              <a:rPr lang="en-US" sz="1640" b="1" dirty="0" err="1">
-                <a:latin typeface="Courier New" panose="02070309020205020404" pitchFamily="49" charset="0"/>
-                <a:cs typeface="Courier New" panose="02070309020205020404" pitchFamily="49" charset="0"/>
-              </a:rPr>
-              <a:t>fasta</a:t>
-            </a:r>
+              <a:t>uniprot_100.fasta</a:t>
+            </a:r>
+          </a:p>
+          <a:p>
+            <a:pPr marL="0" indent="0">
+              <a:buNone/>
+            </a:pPr>
             <a:r>
               <a:rPr lang="en-US" sz="1640" b="1" dirty="0">
                 <a:latin typeface="Courier New" panose="02070309020205020404" pitchFamily="49" charset="0"/>
                 <a:cs typeface="Courier New" panose="02070309020205020404" pitchFamily="49" charset="0"/>
               </a:rPr>
-              <a:t> &gt; </a:t>
-            </a:r>
-            <a:r>
-              <a:rPr lang="en-US" sz="1640" b="1" dirty="0" err="1">
-                <a:latin typeface="Courier New" panose="02070309020205020404" pitchFamily="49" charset="0"/>
-                <a:cs typeface="Courier New" panose="02070309020205020404" pitchFamily="49" charset="0"/>
-              </a:rPr>
-              <a:t>inputs.txt</a:t>
-            </a:r>
-            <a:endParaRPr lang="en-US" sz="1640" b="1" dirty="0">
-              <a:latin typeface="Courier New" panose="02070309020205020404" pitchFamily="49" charset="0"/>
-              <a:cs typeface="Courier New" panose="02070309020205020404" pitchFamily="49" charset="0"/>
-            </a:endParaRPr>
+              <a:t>uniprot_101.fasta</a:t>
+            </a:r>
+          </a:p>
+          <a:p>
+            <a:pPr marL="0" indent="0">
+              <a:buNone/>
+            </a:pPr>
+            <a:r>
+              <a:rPr lang="en-US" sz="1640" b="1" dirty="0">
+                <a:latin typeface="Courier New" panose="02070309020205020404" pitchFamily="49" charset="0"/>
+                <a:cs typeface="Courier New" panose="02070309020205020404" pitchFamily="49" charset="0"/>
+              </a:rPr>
+              <a:t>uniprot_102.fasta</a:t>
+            </a:r>
           </a:p>
           <a:p>
             <a:pPr marL="0" indent="0">
@@ -21637,49 +21666,29 @@
                 <a:latin typeface="Courier New" panose="02070309020205020404" pitchFamily="49" charset="0"/>
                 <a:cs typeface="Courier New" panose="02070309020205020404" pitchFamily="49" charset="0"/>
               </a:rPr>
-              <a:t>ls | head -3</a:t>
-            </a:r>
-          </a:p>
-          <a:p>
-            <a:pPr marL="0" indent="0">
-              <a:buNone/>
-            </a:pPr>
+              <a:t>find $PWD -type f | grep </a:t>
+            </a:r>
+            <a:r>
+              <a:rPr lang="en-US" sz="1640" b="1" dirty="0" err="1">
+                <a:latin typeface="Courier New" panose="02070309020205020404" pitchFamily="49" charset="0"/>
+                <a:cs typeface="Courier New" panose="02070309020205020404" pitchFamily="49" charset="0"/>
+              </a:rPr>
+              <a:t>fasta</a:t>
+            </a:r>
             <a:r>
               <a:rPr lang="en-US" sz="1640" b="1" dirty="0">
                 <a:latin typeface="Courier New" panose="02070309020205020404" pitchFamily="49" charset="0"/>
                 <a:cs typeface="Courier New" panose="02070309020205020404" pitchFamily="49" charset="0"/>
               </a:rPr>
-              <a:t>uniprot_100.fasta</a:t>
-            </a:r>
-          </a:p>
-          <a:p>
-            <a:pPr marL="0" indent="0">
-              <a:buNone/>
-            </a:pPr>
-            <a:r>
-              <a:rPr lang="en-US" sz="1640" b="1" dirty="0">
-                <a:latin typeface="Courier New" panose="02070309020205020404" pitchFamily="49" charset="0"/>
-                <a:cs typeface="Courier New" panose="02070309020205020404" pitchFamily="49" charset="0"/>
-              </a:rPr>
-              <a:t>uniprot_101.fasta</a:t>
-            </a:r>
-          </a:p>
-          <a:p>
-            <a:pPr marL="0" indent="0">
-              <a:buNone/>
-            </a:pPr>
-            <a:r>
-              <a:rPr lang="en-US" sz="1640" b="1" dirty="0">
-                <a:latin typeface="Courier New" panose="02070309020205020404" pitchFamily="49" charset="0"/>
-                <a:cs typeface="Courier New" panose="02070309020205020404" pitchFamily="49" charset="0"/>
-              </a:rPr>
-              <a:t>uniprot_102.fasta</a:t>
-            </a:r>
-          </a:p>
-          <a:p>
-            <a:pPr marL="0" indent="0">
-              <a:buNone/>
-            </a:pPr>
+              <a:t> &gt; </a:t>
+            </a:r>
+            <a:r>
+              <a:rPr lang="en-US" sz="1640" b="1" dirty="0" err="1">
+                <a:latin typeface="Courier New" panose="02070309020205020404" pitchFamily="49" charset="0"/>
+                <a:cs typeface="Courier New" panose="02070309020205020404" pitchFamily="49" charset="0"/>
+              </a:rPr>
+              <a:t>inputs.txt</a:t>
+            </a:r>
             <a:endParaRPr lang="en-US" sz="1640" b="1" dirty="0">
               <a:latin typeface="Courier New" panose="02070309020205020404" pitchFamily="49" charset="0"/>
               <a:cs typeface="Courier New" panose="02070309020205020404" pitchFamily="49" charset="0"/>
@@ -21755,7 +21764,7 @@
           <p:cNvPr id="2" name="Title 1">
             <a:extLst>
               <a:ext uri="{FF2B5EF4-FFF2-40B4-BE49-F238E27FC236}">
-                <a16:creationId xmlns:a16="http://schemas.microsoft.com/office/drawing/2014/main" id="{6972196C-1D2D-C240-AD57-E3EBC4FA030D}"/>
+                <a16:creationId xmlns:a16="http://schemas.microsoft.com/office/drawing/2014/main" id="{BB32880E-3461-51C6-DCC7-DFA1EC09CD50}"/>
               </a:ext>
             </a:extLst>
           </p:cNvPr>
@@ -21776,7 +21785,19 @@
               <a:rPr lang="en-US" dirty="0">
                 <a:latin typeface="National Park " pitchFamily="2" charset="77"/>
               </a:rPr>
-              <a:t>Summary</a:t>
+              <a:t>First Approach: </a:t>
+            </a:r>
+            <a:r>
+              <a:rPr lang="en-US" dirty="0" err="1">
+                <a:latin typeface="National Park " pitchFamily="2" charset="77"/>
+              </a:rPr>
+              <a:t>srun</a:t>
+            </a:r>
+            <a:r>
+              <a:rPr lang="en-US" dirty="0">
+                <a:latin typeface="National Park " pitchFamily="2" charset="77"/>
+              </a:rPr>
+              <a:t> ... parallel</a:t>
             </a:r>
           </a:p>
         </p:txBody>
@@ -21786,7 +21807,7 @@
           <p:cNvPr id="3" name="Content Placeholder 2">
             <a:extLst>
               <a:ext uri="{FF2B5EF4-FFF2-40B4-BE49-F238E27FC236}">
-                <a16:creationId xmlns:a16="http://schemas.microsoft.com/office/drawing/2014/main" id="{59541F7C-8324-CD41-84A0-D9DC3E4E12B8}"/>
+                <a16:creationId xmlns:a16="http://schemas.microsoft.com/office/drawing/2014/main" id="{DEAB976F-7778-54E8-5445-4E85E7388081}"/>
               </a:ext>
             </a:extLst>
           </p:cNvPr>
@@ -21804,32 +21825,180 @@
           </a:bodyPr>
           <a:lstStyle/>
           <a:p>
-            <a:r>
-              <a:rPr lang="en-US" dirty="0">
-                <a:latin typeface="National Park " pitchFamily="2" charset="77"/>
-              </a:rPr>
-              <a:t>GNU Parallel is an effective tool that could be useful in day to day tasks on the terminal as well as for larger workflows</a:t>
-            </a:r>
-          </a:p>
-          <a:p>
-            <a:r>
-              <a:rPr lang="en-US" dirty="0">
-                <a:latin typeface="National Park " pitchFamily="2" charset="77"/>
-              </a:rPr>
-              <a:t>Many many options to choose from to customize a parallel operation</a:t>
-            </a:r>
-          </a:p>
-          <a:p>
-            <a:r>
-              <a:rPr lang="en-US" dirty="0">
-                <a:latin typeface="National Park " pitchFamily="2" charset="77"/>
-              </a:rPr>
-              <a:t>Very handy for quick prototyping</a:t>
-            </a:r>
-          </a:p>
-          <a:p>
-            <a:endParaRPr lang="en-US" dirty="0">
-              <a:latin typeface="National Park " pitchFamily="2" charset="77"/>
+            <a:pPr marL="0" indent="0">
+              <a:buNone/>
+            </a:pPr>
+            <a:br>
+              <a:rPr lang="en-US" sz="1800" b="1" dirty="0">
+                <a:latin typeface="Courier New" panose="02070309020205020404" pitchFamily="49" charset="0"/>
+                <a:cs typeface="Courier New" panose="02070309020205020404" pitchFamily="49" charset="0"/>
+              </a:rPr>
+            </a:br>
+            <a:r>
+              <a:rPr lang="en-US" sz="1800" b="1" dirty="0" err="1">
+                <a:latin typeface="Courier New" panose="02070309020205020404" pitchFamily="49" charset="0"/>
+                <a:cs typeface="Courier New" panose="02070309020205020404" pitchFamily="49" charset="0"/>
+              </a:rPr>
+              <a:t>srun</a:t>
+            </a:r>
+            <a:r>
+              <a:rPr lang="en-US" sz="1800" b="1" dirty="0">
+                <a:latin typeface="Courier New" panose="02070309020205020404" pitchFamily="49" charset="0"/>
+                <a:cs typeface="Courier New" panose="02070309020205020404" pitchFamily="49" charset="0"/>
+              </a:rPr>
+              <a:t> </a:t>
+            </a:r>
+            <a:r>
+              <a:rPr lang="en-US" sz="1800" dirty="0">
+                <a:latin typeface="Courier New" panose="02070309020205020404" pitchFamily="49" charset="0"/>
+                <a:cs typeface="Courier New" panose="02070309020205020404" pitchFamily="49" charset="0"/>
+              </a:rPr>
+              <a:t>--no-kill --</a:t>
+            </a:r>
+            <a:r>
+              <a:rPr lang="en-US" sz="1800" dirty="0" err="1">
+                <a:latin typeface="Courier New" panose="02070309020205020404" pitchFamily="49" charset="0"/>
+                <a:cs typeface="Courier New" panose="02070309020205020404" pitchFamily="49" charset="0"/>
+              </a:rPr>
+              <a:t>ntasks</a:t>
+            </a:r>
+            <a:r>
+              <a:rPr lang="en-US" sz="1800" dirty="0">
+                <a:latin typeface="Courier New" panose="02070309020205020404" pitchFamily="49" charset="0"/>
+                <a:cs typeface="Courier New" panose="02070309020205020404" pitchFamily="49" charset="0"/>
+              </a:rPr>
+              <a:t>-per-node=1 --wait=0</a:t>
+            </a:r>
+            <a:br>
+              <a:rPr lang="en-US" sz="1800" dirty="0">
+                <a:latin typeface="Courier New" panose="02070309020205020404" pitchFamily="49" charset="0"/>
+                <a:cs typeface="Courier New" panose="02070309020205020404" pitchFamily="49" charset="0"/>
+              </a:rPr>
+            </a:br>
+            <a:br>
+              <a:rPr lang="en-US" sz="1800" b="1" dirty="0">
+                <a:latin typeface="Courier New" panose="02070309020205020404" pitchFamily="49" charset="0"/>
+                <a:cs typeface="Courier New" panose="02070309020205020404" pitchFamily="49" charset="0"/>
+              </a:rPr>
+            </a:br>
+            <a:r>
+              <a:rPr lang="en-US" sz="1800" b="1" dirty="0">
+                <a:latin typeface="Courier New" panose="02070309020205020404" pitchFamily="49" charset="0"/>
+                <a:cs typeface="Courier New" panose="02070309020205020404" pitchFamily="49" charset="0"/>
+              </a:rPr>
+              <a:t>parallel </a:t>
+            </a:r>
+            <a:r>
+              <a:rPr lang="en-US" sz="1800" dirty="0">
+                <a:latin typeface="Courier New" panose="02070309020205020404" pitchFamily="49" charset="0"/>
+                <a:cs typeface="Courier New" panose="02070309020205020404" pitchFamily="49" charset="0"/>
+              </a:rPr>
+              <a:t>-j 8 $HOME/hmmer-3.3/install/bin/</a:t>
+            </a:r>
+            <a:r>
+              <a:rPr lang="en-US" sz="1800" dirty="0" err="1">
+                <a:latin typeface="Courier New" panose="02070309020205020404" pitchFamily="49" charset="0"/>
+                <a:cs typeface="Courier New" panose="02070309020205020404" pitchFamily="49" charset="0"/>
+              </a:rPr>
+              <a:t>hmmsearch</a:t>
+            </a:r>
+            <a:r>
+              <a:rPr lang="en-US" sz="1800" dirty="0">
+                <a:latin typeface="Courier New" panose="02070309020205020404" pitchFamily="49" charset="0"/>
+                <a:cs typeface="Courier New" panose="02070309020205020404" pitchFamily="49" charset="0"/>
+              </a:rPr>
+              <a:t> </a:t>
+            </a:r>
+            <a:br>
+              <a:rPr lang="en-US" sz="1800" dirty="0">
+                <a:latin typeface="Courier New" panose="02070309020205020404" pitchFamily="49" charset="0"/>
+                <a:cs typeface="Courier New" panose="02070309020205020404" pitchFamily="49" charset="0"/>
+              </a:rPr>
+            </a:br>
+            <a:br>
+              <a:rPr lang="en-US" sz="1800" dirty="0">
+                <a:latin typeface="Courier New" panose="02070309020205020404" pitchFamily="49" charset="0"/>
+                <a:cs typeface="Courier New" panose="02070309020205020404" pitchFamily="49" charset="0"/>
+              </a:rPr>
+            </a:br>
+            <a:r>
+              <a:rPr lang="en-US" sz="1800" dirty="0">
+                <a:latin typeface="Courier New" panose="02070309020205020404" pitchFamily="49" charset="0"/>
+                <a:cs typeface="Courier New" panose="02070309020205020404" pitchFamily="49" charset="0"/>
+              </a:rPr>
+              <a:t>--</a:t>
+            </a:r>
+            <a:r>
+              <a:rPr lang="en-US" sz="1800" dirty="0" err="1">
+                <a:latin typeface="Courier New" panose="02070309020205020404" pitchFamily="49" charset="0"/>
+                <a:cs typeface="Courier New" panose="02070309020205020404" pitchFamily="49" charset="0"/>
+              </a:rPr>
+              <a:t>cpu</a:t>
+            </a:r>
+            <a:r>
+              <a:rPr lang="en-US" sz="1800" dirty="0">
+                <a:latin typeface="Courier New" panose="02070309020205020404" pitchFamily="49" charset="0"/>
+                <a:cs typeface="Courier New" panose="02070309020205020404" pitchFamily="49" charset="0"/>
+              </a:rPr>
+              <a:t> 4 --</a:t>
+            </a:r>
+            <a:r>
+              <a:rPr lang="en-US" sz="1800" dirty="0" err="1">
+                <a:latin typeface="Courier New" panose="02070309020205020404" pitchFamily="49" charset="0"/>
+                <a:cs typeface="Courier New" panose="02070309020205020404" pitchFamily="49" charset="0"/>
+              </a:rPr>
+              <a:t>noali</a:t>
+            </a:r>
+            <a:r>
+              <a:rPr lang="en-US" sz="1800" dirty="0">
+                <a:latin typeface="Courier New" panose="02070309020205020404" pitchFamily="49" charset="0"/>
+                <a:cs typeface="Courier New" panose="02070309020205020404" pitchFamily="49" charset="0"/>
+              </a:rPr>
+              <a:t> -o {//}/output_{/}.txt </a:t>
+            </a:r>
+            <a:br>
+              <a:rPr lang="en-US" sz="1800" dirty="0">
+                <a:latin typeface="Courier New" panose="02070309020205020404" pitchFamily="49" charset="0"/>
+                <a:cs typeface="Courier New" panose="02070309020205020404" pitchFamily="49" charset="0"/>
+              </a:rPr>
+            </a:br>
+            <a:br>
+              <a:rPr lang="en-US" sz="1800" dirty="0">
+                <a:latin typeface="Courier New" panose="02070309020205020404" pitchFamily="49" charset="0"/>
+                <a:cs typeface="Courier New" panose="02070309020205020404" pitchFamily="49" charset="0"/>
+              </a:rPr>
+            </a:br>
+            <a:r>
+              <a:rPr lang="en-US" sz="1800" dirty="0">
+                <a:latin typeface="Courier New" panose="02070309020205020404" pitchFamily="49" charset="0"/>
+                <a:cs typeface="Courier New" panose="02070309020205020404" pitchFamily="49" charset="0"/>
+              </a:rPr>
+              <a:t>$SCRATCH/</a:t>
+            </a:r>
+            <a:r>
+              <a:rPr lang="en-US" sz="1800" dirty="0" err="1">
+                <a:latin typeface="Courier New" panose="02070309020205020404" pitchFamily="49" charset="0"/>
+                <a:cs typeface="Courier New" panose="02070309020205020404" pitchFamily="49" charset="0"/>
+              </a:rPr>
+              <a:t>Pfam-A.hmm</a:t>
+            </a:r>
+            <a:r>
+              <a:rPr lang="en-US" sz="1800" dirty="0">
+                <a:latin typeface="Courier New" panose="02070309020205020404" pitchFamily="49" charset="0"/>
+                <a:cs typeface="Courier New" panose="02070309020205020404" pitchFamily="49" charset="0"/>
+              </a:rPr>
+              <a:t> {} :::: </a:t>
+            </a:r>
+            <a:r>
+              <a:rPr lang="en-US" sz="1800" dirty="0" err="1">
+                <a:latin typeface="Courier New" panose="02070309020205020404" pitchFamily="49" charset="0"/>
+                <a:cs typeface="Courier New" panose="02070309020205020404" pitchFamily="49" charset="0"/>
+              </a:rPr>
+              <a:t>inputs.txt</a:t>
+            </a:r>
+            <a:endParaRPr lang="en-US" sz="1800" dirty="0">
+              <a:latin typeface="Courier New" panose="02070309020205020404" pitchFamily="49" charset="0"/>
+              <a:cs typeface="Courier New" panose="02070309020205020404" pitchFamily="49" charset="0"/>
             </a:endParaRPr>
           </a:p>
         </p:txBody>
@@ -21839,7 +22008,7 @@
           <p:cNvPr id="4" name="Slide Number Placeholder 3">
             <a:extLst>
               <a:ext uri="{FF2B5EF4-FFF2-40B4-BE49-F238E27FC236}">
-                <a16:creationId xmlns:a16="http://schemas.microsoft.com/office/drawing/2014/main" id="{6D0E0BA3-5ECE-E94D-B034-8F400208F397}"/>
+                <a16:creationId xmlns:a16="http://schemas.microsoft.com/office/drawing/2014/main" id="{E671E754-D163-0655-AD00-F16A6005EBE2}"/>
               </a:ext>
             </a:extLst>
           </p:cNvPr>
@@ -21856,62 +22025,17 @@
           <a:lstStyle/>
           <a:p>
             <a:fld id="{4E3AEE2C-3A74-8643-B4A2-442777B583A3}" type="slidenum">
-              <a:rPr lang="en-US" smtClean="0">
-                <a:latin typeface="National Park " pitchFamily="2" charset="77"/>
-              </a:rPr>
+              <a:rPr lang="en-US" smtClean="0"/>
               <a:t>59</a:t>
             </a:fld>
-            <a:endParaRPr lang="en-US">
-              <a:latin typeface="National Park " pitchFamily="2" charset="77"/>
-            </a:endParaRPr>
-          </a:p>
-        </p:txBody>
-      </p:sp>
-      <p:sp>
-        <p:nvSpPr>
-          <p:cNvPr id="5" name="TextBox 4">
-            <a:extLst>
-              <a:ext uri="{FF2B5EF4-FFF2-40B4-BE49-F238E27FC236}">
-                <a16:creationId xmlns:a16="http://schemas.microsoft.com/office/drawing/2014/main" id="{B9BD456B-BB50-C343-BC4E-DD06F77B9D78}"/>
-              </a:ext>
-            </a:extLst>
-          </p:cNvPr>
-          <p:cNvSpPr txBox="1"/>
-          <p:nvPr/>
-        </p:nvSpPr>
-        <p:spPr>
-          <a:xfrm>
-            <a:off x="7603274" y="4490264"/>
-            <a:ext cx="816249" cy="248209"/>
-          </a:xfrm>
-          <a:prstGeom prst="rect">
-            <a:avLst/>
-          </a:prstGeom>
-          <a:noFill/>
-        </p:spPr>
-        <p:txBody>
-          <a:bodyPr wrap="none" rtlCol="0">
-            <a:spAutoFit/>
-          </a:bodyPr>
-          <a:lstStyle/>
-          <a:p>
-            <a:r>
-              <a:rPr lang="en-US" sz="1013" dirty="0">
-                <a:latin typeface="National Park " pitchFamily="2" charset="77"/>
-                <a:hlinkClick r:id="rId2" action="ppaction://hlinksldjump"/>
-              </a:rPr>
-              <a:t>back to toc</a:t>
-            </a:r>
-            <a:endParaRPr lang="en-US" sz="1013" dirty="0">
-              <a:latin typeface="National Park " pitchFamily="2" charset="77"/>
-            </a:endParaRPr>
+            <a:endParaRPr lang="en-US"/>
           </a:p>
         </p:txBody>
       </p:sp>
     </p:spTree>
     <p:extLst>
       <p:ext uri="{BB962C8B-B14F-4D97-AF65-F5344CB8AC3E}">
-        <p14:creationId xmlns:p14="http://schemas.microsoft.com/office/powerpoint/2010/main" val="1077433394"/>
+        <p14:creationId xmlns:p14="http://schemas.microsoft.com/office/powerpoint/2010/main" val="355479598"/>
       </p:ext>
     </p:extLst>
   </p:cSld>
@@ -22140,7 +22264,13 @@
       </p:grpSpPr>
       <p:sp>
         <p:nvSpPr>
-          <p:cNvPr id="2" name="Title 1"/>
+          <p:cNvPr id="2" name="Title 1">
+            <a:extLst>
+              <a:ext uri="{FF2B5EF4-FFF2-40B4-BE49-F238E27FC236}">
+                <a16:creationId xmlns:a16="http://schemas.microsoft.com/office/drawing/2014/main" id="{BE1E2B3C-2401-3BF0-27E4-B5D012AEF020}"/>
+              </a:ext>
+            </a:extLst>
+          </p:cNvPr>
           <p:cNvSpPr>
             <a:spLocks noGrp="1"/>
           </p:cNvSpPr>
@@ -22158,14 +22288,20 @@
               <a:rPr lang="en-US" dirty="0">
                 <a:latin typeface="National Park " pitchFamily="2" charset="77"/>
               </a:rPr>
-              <a:t>Credits, references and resources</a:t>
-            </a:r>
-          </a:p>
-        </p:txBody>
-      </p:sp>
-      <p:sp>
-        <p:nvSpPr>
-          <p:cNvPr id="3" name="Content Placeholder 2"/>
+              <a:t>Second Approach: Distribute Tasks</a:t>
+            </a:r>
+          </a:p>
+        </p:txBody>
+      </p:sp>
+      <p:sp>
+        <p:nvSpPr>
+          <p:cNvPr id="3" name="Content Placeholder 2">
+            <a:extLst>
+              <a:ext uri="{FF2B5EF4-FFF2-40B4-BE49-F238E27FC236}">
+                <a16:creationId xmlns:a16="http://schemas.microsoft.com/office/drawing/2014/main" id="{EF17F557-D07B-E16A-3941-143412DFCB17}"/>
+              </a:ext>
+            </a:extLst>
+          </p:cNvPr>
           <p:cNvSpPr>
             <a:spLocks noGrp="1"/>
           </p:cNvSpPr>
@@ -22173,144 +22309,277 @@
             <p:ph idx="1"/>
           </p:nvPr>
         </p:nvSpPr>
+        <p:spPr>
+          <a:xfrm>
+            <a:off x="628649" y="1799307"/>
+            <a:ext cx="7886700" cy="1201990"/>
+          </a:xfrm>
+        </p:spPr>
+        <p:txBody>
+          <a:bodyPr>
+            <a:normAutofit fontScale="92500" lnSpcReduction="10000"/>
+          </a:bodyPr>
+          <a:lstStyle/>
+          <a:p>
+            <a:pPr marL="0" indent="0">
+              <a:buNone/>
+            </a:pPr>
+            <a:r>
+              <a:rPr lang="en-US" dirty="0">
+                <a:latin typeface="Courier New" panose="02070309020205020404" pitchFamily="49" charset="0"/>
+                <a:cs typeface="Courier New" panose="02070309020205020404" pitchFamily="49" charset="0"/>
+              </a:rPr>
+              <a:t>#</a:t>
+            </a:r>
+            <a:r>
+              <a:rPr lang="en-US" dirty="0" err="1">
+                <a:latin typeface="Courier New" panose="02070309020205020404" pitchFamily="49" charset="0"/>
+                <a:cs typeface="Courier New" panose="02070309020205020404" pitchFamily="49" charset="0"/>
+              </a:rPr>
+              <a:t>driver.sh</a:t>
+            </a:r>
+            <a:endParaRPr lang="en-US" dirty="0">
+              <a:latin typeface="Courier New" panose="02070309020205020404" pitchFamily="49" charset="0"/>
+              <a:cs typeface="Courier New" panose="02070309020205020404" pitchFamily="49" charset="0"/>
+            </a:endParaRPr>
+          </a:p>
+          <a:p>
+            <a:pPr marL="0" indent="0">
+              <a:buNone/>
+            </a:pPr>
+            <a:r>
+              <a:rPr lang="en-US" dirty="0">
+                <a:latin typeface="Courier New" panose="02070309020205020404" pitchFamily="49" charset="0"/>
+                <a:cs typeface="Courier New" panose="02070309020205020404" pitchFamily="49" charset="0"/>
+              </a:rPr>
+              <a:t>cat </a:t>
+            </a:r>
+            <a:r>
+              <a:rPr lang="en-US" dirty="0" err="1">
+                <a:latin typeface="Courier New" panose="02070309020205020404" pitchFamily="49" charset="0"/>
+                <a:cs typeface="Courier New" panose="02070309020205020404" pitchFamily="49" charset="0"/>
+              </a:rPr>
+              <a:t>inputs.txt</a:t>
+            </a:r>
+            <a:r>
+              <a:rPr lang="en-US" dirty="0">
+                <a:latin typeface="Courier New" panose="02070309020205020404" pitchFamily="49" charset="0"/>
+                <a:cs typeface="Courier New" panose="02070309020205020404" pitchFamily="49" charset="0"/>
+              </a:rPr>
+              <a:t> |awk -v NNODE="$SLURM_NNODES" -v NODEID="$SLURM_NODEID" \ 'NR % NNODE == NODEID’ | parallel ./</a:t>
+            </a:r>
+            <a:r>
+              <a:rPr lang="en-US" dirty="0" err="1">
+                <a:latin typeface="Courier New" panose="02070309020205020404" pitchFamily="49" charset="0"/>
+                <a:cs typeface="Courier New" panose="02070309020205020404" pitchFamily="49" charset="0"/>
+              </a:rPr>
+              <a:t>payload.sh</a:t>
+            </a:r>
+            <a:r>
+              <a:rPr lang="en-US" dirty="0">
+                <a:latin typeface="Courier New" panose="02070309020205020404" pitchFamily="49" charset="0"/>
+                <a:cs typeface="Courier New" panose="02070309020205020404" pitchFamily="49" charset="0"/>
+              </a:rPr>
+              <a:t> {}</a:t>
+            </a:r>
+          </a:p>
+        </p:txBody>
+      </p:sp>
+      <p:sp>
+        <p:nvSpPr>
+          <p:cNvPr id="4" name="Slide Number Placeholder 3">
+            <a:extLst>
+              <a:ext uri="{FF2B5EF4-FFF2-40B4-BE49-F238E27FC236}">
+                <a16:creationId xmlns:a16="http://schemas.microsoft.com/office/drawing/2014/main" id="{ABDB51E9-DC49-6BD8-F7C1-270179FE76F3}"/>
+              </a:ext>
+            </a:extLst>
+          </p:cNvPr>
+          <p:cNvSpPr>
+            <a:spLocks noGrp="1"/>
+          </p:cNvSpPr>
+          <p:nvPr>
+            <p:ph type="sldNum" sz="quarter" idx="12"/>
+          </p:nvPr>
+        </p:nvSpPr>
         <p:spPr/>
         <p:txBody>
-          <a:bodyPr>
-            <a:normAutofit fontScale="77500" lnSpcReduction="20000"/>
-          </a:bodyPr>
-          <a:lstStyle/>
-          <a:p>
-            <a:r>
-              <a:rPr lang="en-US" dirty="0">
-                <a:hlinkClick r:id="rId3"/>
-              </a:rPr>
-              <a:t>gnu.org/software/parallel</a:t>
-            </a:r>
-            <a:endParaRPr lang="en-US" dirty="0"/>
-          </a:p>
-          <a:p>
-            <a:r>
-              <a:rPr lang="en-US" dirty="0">
-                <a:hlinkClick r:id="rId4"/>
-              </a:rPr>
-              <a:t>rcc.uchicago.edu/documentation/_build/html/running-jobs/srun-parallel/index.html</a:t>
-            </a:r>
-            <a:endParaRPr lang="en-US" dirty="0"/>
-          </a:p>
-          <a:p>
-            <a:r>
-              <a:rPr lang="en-US" dirty="0">
-                <a:hlinkClick r:id="rId5"/>
-              </a:rPr>
-              <a:t>ulhpc-tutorials.readthedocs.io/en/latest/sequential/basics</a:t>
-            </a:r>
-            <a:endParaRPr lang="en-US" dirty="0"/>
-          </a:p>
-          <a:p>
-            <a:r>
-              <a:rPr lang="en-US" dirty="0">
-                <a:hlinkClick r:id="rId6"/>
-              </a:rPr>
-              <a:t>docs.ycrc.yale.edu/clusters-at-yale/guides/parallel</a:t>
-            </a:r>
-            <a:endParaRPr lang="en-US" dirty="0"/>
-          </a:p>
-          <a:p>
-            <a:r>
-              <a:rPr lang="en-US" dirty="0">
-                <a:hlinkClick r:id="rId7"/>
-              </a:rPr>
-              <a:t>www.vanderbilt.edu/accre/documentation/parallel</a:t>
-            </a:r>
-            <a:endParaRPr lang="en-US" dirty="0"/>
-          </a:p>
-          <a:p>
-            <a:r>
-              <a:rPr lang="en-US" dirty="0">
-                <a:hlinkClick r:id="rId8"/>
-              </a:rPr>
-              <a:t>docs-research-it.berkeley.edu/services/high-performance-computing/user-guide/running-your-jobs/gnu-parallel</a:t>
-            </a:r>
-            <a:endParaRPr lang="en-US" dirty="0"/>
-          </a:p>
-          <a:p>
-            <a:r>
-              <a:rPr lang="en-US" dirty="0">
-                <a:hlinkClick r:id="rId9"/>
-              </a:rPr>
-              <a:t>omgenomics.com/parallel</a:t>
-            </a:r>
-            <a:endParaRPr lang="en-US" dirty="0"/>
-          </a:p>
-          <a:p>
-            <a:r>
-              <a:rPr lang="en-US" dirty="0">
-                <a:hlinkClick r:id="rId10"/>
-              </a:rPr>
-              <a:t>curc.readthedocs.io/en/latest/software/GNUParallel.html</a:t>
-            </a:r>
-            <a:endParaRPr lang="en-US" dirty="0"/>
-          </a:p>
-          <a:p>
-            <a:r>
-              <a:rPr lang="en-US" dirty="0">
-                <a:hlinkClick r:id="rId11"/>
-              </a:rPr>
-              <a:t>thenybble.de/posts/json-analysis</a:t>
-            </a:r>
-            <a:endParaRPr lang="en-US" dirty="0"/>
-          </a:p>
-          <a:p>
-            <a:r>
-              <a:rPr lang="en-US" dirty="0">
-                <a:hlinkClick r:id="rId12"/>
-              </a:rPr>
-              <a:t>stackoverflow.com/questions/tagged/gnu-parallel</a:t>
-            </a:r>
-            <a:endParaRPr lang="en-US" dirty="0"/>
-          </a:p>
-          <a:p>
-            <a:r>
-              <a:rPr lang="en-US" dirty="0">
-                <a:hlinkClick r:id="rId13"/>
-              </a:rPr>
-              <a:t>unix.stackexchange.com/questions/tagged/gnu-parallel</a:t>
-            </a:r>
-            <a:endParaRPr lang="en-US" dirty="0"/>
-          </a:p>
-        </p:txBody>
-      </p:sp>
-      <p:sp>
-        <p:nvSpPr>
-          <p:cNvPr id="4" name="Slide Number Placeholder 3"/>
-          <p:cNvSpPr>
-            <a:spLocks noGrp="1"/>
-          </p:cNvSpPr>
-          <p:nvPr>
-            <p:ph type="sldNum" sz="quarter" idx="12"/>
-          </p:nvPr>
-        </p:nvSpPr>
-        <p:spPr/>
-        <p:txBody>
           <a:bodyPr/>
           <a:lstStyle/>
           <a:p>
             <a:fld id="{4E3AEE2C-3A74-8643-B4A2-442777B583A3}" type="slidenum">
-              <a:rPr lang="en-US" smtClean="0">
-                <a:latin typeface="National Park " pitchFamily="2" charset="77"/>
-              </a:rPr>
+              <a:rPr lang="en-US" smtClean="0"/>
               <a:t>60</a:t>
             </a:fld>
-            <a:endParaRPr lang="en-US">
-              <a:latin typeface="National Park " pitchFamily="2" charset="77"/>
-            </a:endParaRPr>
+            <a:endParaRPr lang="en-US"/>
+          </a:p>
+        </p:txBody>
+      </p:sp>
+      <p:sp>
+        <p:nvSpPr>
+          <p:cNvPr id="7" name="TextBox 6">
+            <a:extLst>
+              <a:ext uri="{FF2B5EF4-FFF2-40B4-BE49-F238E27FC236}">
+                <a16:creationId xmlns:a16="http://schemas.microsoft.com/office/drawing/2014/main" id="{119856E4-6F7D-75F5-95D4-E0916D0090E5}"/>
+              </a:ext>
+            </a:extLst>
+          </p:cNvPr>
+          <p:cNvSpPr txBox="1"/>
+          <p:nvPr/>
+        </p:nvSpPr>
+        <p:spPr>
+          <a:xfrm>
+            <a:off x="628649" y="3439708"/>
+            <a:ext cx="7886699" cy="1384995"/>
+          </a:xfrm>
+          <a:prstGeom prst="rect">
+            <a:avLst/>
+          </a:prstGeom>
+          <a:noFill/>
+        </p:spPr>
+        <p:txBody>
+          <a:bodyPr wrap="square">
+            <a:spAutoFit/>
+          </a:bodyPr>
+          <a:lstStyle/>
+          <a:p>
+            <a:r>
+              <a:rPr lang="en-US" sz="2100" dirty="0">
+                <a:latin typeface="Courier New" panose="02070309020205020404" pitchFamily="49" charset="0"/>
+                <a:cs typeface="Courier New" panose="02070309020205020404" pitchFamily="49" charset="0"/>
+              </a:rPr>
+              <a:t>#</a:t>
+            </a:r>
+            <a:r>
+              <a:rPr lang="en-US" sz="2100" dirty="0" err="1">
+                <a:latin typeface="Courier New" panose="02070309020205020404" pitchFamily="49" charset="0"/>
+                <a:cs typeface="Courier New" panose="02070309020205020404" pitchFamily="49" charset="0"/>
+              </a:rPr>
+              <a:t>payload.sh</a:t>
+            </a:r>
+            <a:r>
+              <a:rPr lang="en-US" sz="2100" dirty="0">
+                <a:latin typeface="Courier New" panose="02070309020205020404" pitchFamily="49" charset="0"/>
+                <a:cs typeface="Courier New" panose="02070309020205020404" pitchFamily="49" charset="0"/>
+              </a:rPr>
+              <a:t> [</a:t>
+            </a:r>
+            <a:r>
+              <a:rPr lang="en-US" sz="2100" b="1" dirty="0">
+                <a:latin typeface="Courier New" panose="02070309020205020404" pitchFamily="49" charset="0"/>
+                <a:cs typeface="Courier New" panose="02070309020205020404" pitchFamily="49" charset="0"/>
+              </a:rPr>
+              <a:t>untested</a:t>
+            </a:r>
+            <a:r>
+              <a:rPr lang="en-US" sz="2100" dirty="0">
+                <a:latin typeface="Courier New" panose="02070309020205020404" pitchFamily="49" charset="0"/>
+                <a:cs typeface="Courier New" panose="02070309020205020404" pitchFamily="49" charset="0"/>
+              </a:rPr>
+              <a:t>]</a:t>
+            </a:r>
+            <a:br>
+              <a:rPr lang="en-US" sz="2100" dirty="0">
+                <a:latin typeface="Courier New" panose="02070309020205020404" pitchFamily="49" charset="0"/>
+                <a:cs typeface="Courier New" panose="02070309020205020404" pitchFamily="49" charset="0"/>
+              </a:rPr>
+            </a:br>
+            <a:r>
+              <a:rPr lang="en-US" sz="2100" dirty="0">
+                <a:latin typeface="Courier New" panose="02070309020205020404" pitchFamily="49" charset="0"/>
+                <a:cs typeface="Courier New" panose="02070309020205020404" pitchFamily="49" charset="0"/>
+              </a:rPr>
+              <a:t>$HOME/hmmer-3.3/install/bin/</a:t>
+            </a:r>
+            <a:r>
+              <a:rPr lang="en-US" sz="2100" dirty="0" err="1">
+                <a:latin typeface="Courier New" panose="02070309020205020404" pitchFamily="49" charset="0"/>
+                <a:cs typeface="Courier New" panose="02070309020205020404" pitchFamily="49" charset="0"/>
+              </a:rPr>
+              <a:t>hmmsearch</a:t>
+            </a:r>
+            <a:r>
+              <a:rPr lang="en-US" sz="2100" dirty="0">
+                <a:latin typeface="Courier New" panose="02070309020205020404" pitchFamily="49" charset="0"/>
+                <a:cs typeface="Courier New" panose="02070309020205020404" pitchFamily="49" charset="0"/>
+              </a:rPr>
+              <a:t> </a:t>
+            </a:r>
+            <a:br>
+              <a:rPr lang="en-US" sz="2100" dirty="0">
+                <a:latin typeface="Courier New" panose="02070309020205020404" pitchFamily="49" charset="0"/>
+                <a:cs typeface="Courier New" panose="02070309020205020404" pitchFamily="49" charset="0"/>
+              </a:rPr>
+            </a:br>
+            <a:r>
+              <a:rPr lang="en-US" sz="2100" dirty="0">
+                <a:latin typeface="Courier New" panose="02070309020205020404" pitchFamily="49" charset="0"/>
+                <a:cs typeface="Courier New" panose="02070309020205020404" pitchFamily="49" charset="0"/>
+              </a:rPr>
+              <a:t>--</a:t>
+            </a:r>
+            <a:r>
+              <a:rPr lang="en-US" sz="2100" dirty="0" err="1">
+                <a:latin typeface="Courier New" panose="02070309020205020404" pitchFamily="49" charset="0"/>
+                <a:cs typeface="Courier New" panose="02070309020205020404" pitchFamily="49" charset="0"/>
+              </a:rPr>
+              <a:t>cpu</a:t>
+            </a:r>
+            <a:r>
+              <a:rPr lang="en-US" sz="2100" dirty="0">
+                <a:latin typeface="Courier New" panose="02070309020205020404" pitchFamily="49" charset="0"/>
+                <a:cs typeface="Courier New" panose="02070309020205020404" pitchFamily="49" charset="0"/>
+              </a:rPr>
+              <a:t> 4 --</a:t>
+            </a:r>
+            <a:r>
+              <a:rPr lang="en-US" sz="2100" dirty="0" err="1">
+                <a:latin typeface="Courier New" panose="02070309020205020404" pitchFamily="49" charset="0"/>
+                <a:cs typeface="Courier New" panose="02070309020205020404" pitchFamily="49" charset="0"/>
+              </a:rPr>
+              <a:t>noali</a:t>
+            </a:r>
+            <a:r>
+              <a:rPr lang="en-US" sz="2100" dirty="0">
+                <a:latin typeface="Courier New" panose="02070309020205020404" pitchFamily="49" charset="0"/>
+                <a:cs typeface="Courier New" panose="02070309020205020404" pitchFamily="49" charset="0"/>
+              </a:rPr>
+              <a:t> -o {//}/output_{/}.txt </a:t>
+            </a:r>
+            <a:br>
+              <a:rPr lang="en-US" sz="2100" dirty="0">
+                <a:latin typeface="Courier New" panose="02070309020205020404" pitchFamily="49" charset="0"/>
+                <a:cs typeface="Courier New" panose="02070309020205020404" pitchFamily="49" charset="0"/>
+              </a:rPr>
+            </a:br>
+            <a:r>
+              <a:rPr lang="en-US" sz="2100" dirty="0">
+                <a:latin typeface="Courier New" panose="02070309020205020404" pitchFamily="49" charset="0"/>
+                <a:cs typeface="Courier New" panose="02070309020205020404" pitchFamily="49" charset="0"/>
+              </a:rPr>
+              <a:t>$SCRATCH/</a:t>
+            </a:r>
+            <a:r>
+              <a:rPr lang="en-US" sz="2100" dirty="0" err="1">
+                <a:latin typeface="Courier New" panose="02070309020205020404" pitchFamily="49" charset="0"/>
+                <a:cs typeface="Courier New" panose="02070309020205020404" pitchFamily="49" charset="0"/>
+              </a:rPr>
+              <a:t>Pfam-A.hmm</a:t>
+            </a:r>
+            <a:r>
+              <a:rPr lang="en-US" sz="2100" dirty="0">
+                <a:latin typeface="Courier New" panose="02070309020205020404" pitchFamily="49" charset="0"/>
+                <a:cs typeface="Courier New" panose="02070309020205020404" pitchFamily="49" charset="0"/>
+              </a:rPr>
+              <a:t> $1</a:t>
+            </a:r>
+            <a:endParaRPr lang="en-US" sz="2100" dirty="0"/>
           </a:p>
         </p:txBody>
       </p:sp>
     </p:spTree>
     <p:extLst>
       <p:ext uri="{BB962C8B-B14F-4D97-AF65-F5344CB8AC3E}">
-        <p14:creationId xmlns:p14="http://schemas.microsoft.com/office/powerpoint/2010/main" val="1816197902"/>
+        <p14:creationId xmlns:p14="http://schemas.microsoft.com/office/powerpoint/2010/main" val="3991558211"/>
       </p:ext>
     </p:extLst>
   </p:cSld>
@@ -22339,6 +22608,802 @@
       </p:grpSpPr>
       <p:sp>
         <p:nvSpPr>
+          <p:cNvPr id="2" name="Title 1">
+            <a:extLst>
+              <a:ext uri="{FF2B5EF4-FFF2-40B4-BE49-F238E27FC236}">
+                <a16:creationId xmlns:a16="http://schemas.microsoft.com/office/drawing/2014/main" id="{6972196C-1D2D-C240-AD57-E3EBC4FA030D}"/>
+              </a:ext>
+            </a:extLst>
+          </p:cNvPr>
+          <p:cNvSpPr>
+            <a:spLocks noGrp="1"/>
+          </p:cNvSpPr>
+          <p:nvPr>
+            <p:ph type="title"/>
+          </p:nvPr>
+        </p:nvSpPr>
+        <p:spPr/>
+        <p:txBody>
+          <a:bodyPr/>
+          <a:lstStyle/>
+          <a:p>
+            <a:pPr algn="ctr"/>
+            <a:r>
+              <a:rPr lang="en-US" dirty="0">
+                <a:latin typeface="National Park " pitchFamily="2" charset="77"/>
+              </a:rPr>
+              <a:t>Summary</a:t>
+            </a:r>
+          </a:p>
+        </p:txBody>
+      </p:sp>
+      <p:sp>
+        <p:nvSpPr>
+          <p:cNvPr id="3" name="Content Placeholder 2">
+            <a:extLst>
+              <a:ext uri="{FF2B5EF4-FFF2-40B4-BE49-F238E27FC236}">
+                <a16:creationId xmlns:a16="http://schemas.microsoft.com/office/drawing/2014/main" id="{59541F7C-8324-CD41-84A0-D9DC3E4E12B8}"/>
+              </a:ext>
+            </a:extLst>
+          </p:cNvPr>
+          <p:cNvSpPr>
+            <a:spLocks noGrp="1"/>
+          </p:cNvSpPr>
+          <p:nvPr>
+            <p:ph idx="1"/>
+          </p:nvPr>
+        </p:nvSpPr>
+        <p:spPr/>
+        <p:txBody>
+          <a:bodyPr>
+            <a:normAutofit/>
+          </a:bodyPr>
+          <a:lstStyle/>
+          <a:p>
+            <a:r>
+              <a:rPr lang="en-US" dirty="0">
+                <a:latin typeface="National Park " pitchFamily="2" charset="77"/>
+              </a:rPr>
+              <a:t>GNU Parallel is an effective tool that could be useful in </a:t>
+            </a:r>
+            <a:br>
+              <a:rPr lang="en-US" dirty="0">
+                <a:latin typeface="National Park " pitchFamily="2" charset="77"/>
+              </a:rPr>
+            </a:br>
+            <a:r>
+              <a:rPr lang="en-US" dirty="0">
+                <a:latin typeface="National Park " pitchFamily="2" charset="77"/>
+              </a:rPr>
+              <a:t>day-to-day tasks on the terminal as well as for larger workflows</a:t>
+            </a:r>
+          </a:p>
+          <a:p>
+            <a:r>
+              <a:rPr lang="en-US" dirty="0">
+                <a:latin typeface="National Park " pitchFamily="2" charset="77"/>
+              </a:rPr>
+              <a:t>Many options to choose from to customize a parallel operation</a:t>
+            </a:r>
+          </a:p>
+          <a:p>
+            <a:r>
+              <a:rPr lang="en-US" dirty="0">
+                <a:latin typeface="National Park " pitchFamily="2" charset="77"/>
+              </a:rPr>
+              <a:t>Very handy for quick prototyping</a:t>
+            </a:r>
+          </a:p>
+          <a:p>
+            <a:r>
+              <a:rPr lang="en-US" dirty="0">
+                <a:latin typeface="National Park " pitchFamily="2" charset="77"/>
+              </a:rPr>
+              <a:t>May be well suited for some production level work</a:t>
+            </a:r>
+          </a:p>
+          <a:p>
+            <a:endParaRPr lang="en-US" dirty="0">
+              <a:latin typeface="National Park " pitchFamily="2" charset="77"/>
+            </a:endParaRPr>
+          </a:p>
+        </p:txBody>
+      </p:sp>
+      <p:sp>
+        <p:nvSpPr>
+          <p:cNvPr id="4" name="Slide Number Placeholder 3">
+            <a:extLst>
+              <a:ext uri="{FF2B5EF4-FFF2-40B4-BE49-F238E27FC236}">
+                <a16:creationId xmlns:a16="http://schemas.microsoft.com/office/drawing/2014/main" id="{6D0E0BA3-5ECE-E94D-B034-8F400208F397}"/>
+              </a:ext>
+            </a:extLst>
+          </p:cNvPr>
+          <p:cNvSpPr>
+            <a:spLocks noGrp="1"/>
+          </p:cNvSpPr>
+          <p:nvPr>
+            <p:ph type="sldNum" sz="quarter" idx="12"/>
+          </p:nvPr>
+        </p:nvSpPr>
+        <p:spPr/>
+        <p:txBody>
+          <a:bodyPr/>
+          <a:lstStyle/>
+          <a:p>
+            <a:fld id="{4E3AEE2C-3A74-8643-B4A2-442777B583A3}" type="slidenum">
+              <a:rPr lang="en-US" smtClean="0">
+                <a:latin typeface="National Park " pitchFamily="2" charset="77"/>
+              </a:rPr>
+              <a:t>61</a:t>
+            </a:fld>
+            <a:endParaRPr lang="en-US">
+              <a:latin typeface="National Park " pitchFamily="2" charset="77"/>
+            </a:endParaRPr>
+          </a:p>
+        </p:txBody>
+      </p:sp>
+      <p:sp>
+        <p:nvSpPr>
+          <p:cNvPr id="5" name="TextBox 4">
+            <a:extLst>
+              <a:ext uri="{FF2B5EF4-FFF2-40B4-BE49-F238E27FC236}">
+                <a16:creationId xmlns:a16="http://schemas.microsoft.com/office/drawing/2014/main" id="{B9BD456B-BB50-C343-BC4E-DD06F77B9D78}"/>
+              </a:ext>
+            </a:extLst>
+          </p:cNvPr>
+          <p:cNvSpPr txBox="1"/>
+          <p:nvPr/>
+        </p:nvSpPr>
+        <p:spPr>
+          <a:xfrm>
+            <a:off x="7603274" y="4490264"/>
+            <a:ext cx="816249" cy="248209"/>
+          </a:xfrm>
+          <a:prstGeom prst="rect">
+            <a:avLst/>
+          </a:prstGeom>
+          <a:noFill/>
+        </p:spPr>
+        <p:txBody>
+          <a:bodyPr wrap="none" rtlCol="0">
+            <a:spAutoFit/>
+          </a:bodyPr>
+          <a:lstStyle/>
+          <a:p>
+            <a:r>
+              <a:rPr lang="en-US" sz="1013" dirty="0">
+                <a:latin typeface="National Park " pitchFamily="2" charset="77"/>
+                <a:hlinkClick r:id="rId2" action="ppaction://hlinksldjump"/>
+              </a:rPr>
+              <a:t>back to toc</a:t>
+            </a:r>
+            <a:endParaRPr lang="en-US" sz="1013" dirty="0">
+              <a:latin typeface="National Park " pitchFamily="2" charset="77"/>
+            </a:endParaRPr>
+          </a:p>
+        </p:txBody>
+      </p:sp>
+    </p:spTree>
+    <p:extLst>
+      <p:ext uri="{BB962C8B-B14F-4D97-AF65-F5344CB8AC3E}">
+        <p14:creationId xmlns:p14="http://schemas.microsoft.com/office/powerpoint/2010/main" val="1077433394"/>
+      </p:ext>
+    </p:extLst>
+  </p:cSld>
+  <p:clrMapOvr>
+    <a:masterClrMapping/>
+  </p:clrMapOvr>
+</p:sld>
+</file>
+
+<file path=ppt/slides/slide62.xml><?xml version="1.0" encoding="utf-8"?>
+<p:sld xmlns:a="http://schemas.openxmlformats.org/drawingml/2006/main" xmlns:r="http://schemas.openxmlformats.org/officeDocument/2006/relationships" xmlns:p="http://schemas.openxmlformats.org/presentationml/2006/main">
+  <p:cSld>
+    <p:spTree>
+      <p:nvGrpSpPr>
+        <p:cNvPr id="1" name=""/>
+        <p:cNvGrpSpPr/>
+        <p:nvPr/>
+      </p:nvGrpSpPr>
+      <p:grpSpPr>
+        <a:xfrm>
+          <a:off x="0" y="0"/>
+          <a:ext cx="0" cy="0"/>
+          <a:chOff x="0" y="0"/>
+          <a:chExt cx="0" cy="0"/>
+        </a:xfrm>
+      </p:grpSpPr>
+      <p:sp>
+        <p:nvSpPr>
+          <p:cNvPr id="2" name="Title 1">
+            <a:extLst>
+              <a:ext uri="{FF2B5EF4-FFF2-40B4-BE49-F238E27FC236}">
+                <a16:creationId xmlns:a16="http://schemas.microsoft.com/office/drawing/2014/main" id="{6972196C-1D2D-C240-AD57-E3EBC4FA030D}"/>
+              </a:ext>
+            </a:extLst>
+          </p:cNvPr>
+          <p:cNvSpPr>
+            <a:spLocks noGrp="1"/>
+          </p:cNvSpPr>
+          <p:nvPr>
+            <p:ph type="title"/>
+          </p:nvPr>
+        </p:nvSpPr>
+        <p:spPr/>
+        <p:txBody>
+          <a:bodyPr>
+            <a:normAutofit fontScale="90000"/>
+          </a:bodyPr>
+          <a:lstStyle/>
+          <a:p>
+            <a:pPr algn="ctr"/>
+            <a:r>
+              <a:rPr lang="en-US" dirty="0">
+                <a:latin typeface="National Park " pitchFamily="2" charset="77"/>
+              </a:rPr>
+              <a:t>Practice and Exercises : Titanic Data Challenge</a:t>
+            </a:r>
+          </a:p>
+        </p:txBody>
+      </p:sp>
+      <p:sp>
+        <p:nvSpPr>
+          <p:cNvPr id="3" name="Content Placeholder 2">
+            <a:extLst>
+              <a:ext uri="{FF2B5EF4-FFF2-40B4-BE49-F238E27FC236}">
+                <a16:creationId xmlns:a16="http://schemas.microsoft.com/office/drawing/2014/main" id="{59541F7C-8324-CD41-84A0-D9DC3E4E12B8}"/>
+              </a:ext>
+            </a:extLst>
+          </p:cNvPr>
+          <p:cNvSpPr>
+            <a:spLocks noGrp="1"/>
+          </p:cNvSpPr>
+          <p:nvPr>
+            <p:ph idx="1"/>
+          </p:nvPr>
+        </p:nvSpPr>
+        <p:spPr/>
+        <p:txBody>
+          <a:bodyPr>
+            <a:normAutofit fontScale="92500" lnSpcReduction="10000"/>
+          </a:bodyPr>
+          <a:lstStyle/>
+          <a:p>
+            <a:pPr marL="0" indent="0">
+              <a:buNone/>
+            </a:pPr>
+            <a:r>
+              <a:rPr lang="en-US" dirty="0"/>
+              <a:t>Data: in </a:t>
+            </a:r>
+            <a:r>
+              <a:rPr lang="en-US" dirty="0" err="1"/>
+              <a:t>Github</a:t>
+            </a:r>
+            <a:r>
+              <a:rPr lang="en-US" dirty="0"/>
+              <a:t>, </a:t>
+            </a:r>
+            <a:r>
+              <a:rPr lang="en-US" dirty="0" err="1"/>
+              <a:t>Titanic.csv</a:t>
+            </a:r>
+            <a:r>
+              <a:rPr lang="en-US" dirty="0"/>
+              <a:t> </a:t>
+            </a:r>
+          </a:p>
+          <a:p>
+            <a:r>
+              <a:rPr lang="en-US" dirty="0"/>
+              <a:t>Problem 1. What characteristics are shared by all passengers whose fare is 0?</a:t>
+            </a:r>
+          </a:p>
+          <a:p>
+            <a:r>
+              <a:rPr lang="en-US" dirty="0"/>
+              <a:t>Problem 2. How many married women over age 50 embarked in Cherbourg? (Married women are denoted by "Mrs.")</a:t>
+            </a:r>
+          </a:p>
+          <a:p>
+            <a:r>
+              <a:rPr lang="en-US" dirty="0"/>
+              <a:t>Problem 3. Which embarkation city had the highest-paying passengers on average?</a:t>
+            </a:r>
+          </a:p>
+          <a:p>
+            <a:r>
+              <a:rPr lang="en-US" dirty="0"/>
+              <a:t>Problem 4. What is the most common last name among passengers? What is the average number of passengers per last name?</a:t>
+            </a:r>
+          </a:p>
+          <a:p>
+            <a:r>
+              <a:rPr lang="en-US" dirty="0"/>
+              <a:t>Problem 5. What's the survival rate for passengers in the three different classes, i.e., what fraction of passengers in each class </a:t>
+            </a:r>
+            <a:r>
+              <a:rPr lang="en-US"/>
+              <a:t>survived?</a:t>
+            </a:r>
+            <a:endParaRPr lang="en-US" dirty="0"/>
+          </a:p>
+          <a:p>
+            <a:endParaRPr lang="en-US" dirty="0"/>
+          </a:p>
+        </p:txBody>
+      </p:sp>
+      <p:sp>
+        <p:nvSpPr>
+          <p:cNvPr id="4" name="Slide Number Placeholder 3">
+            <a:extLst>
+              <a:ext uri="{FF2B5EF4-FFF2-40B4-BE49-F238E27FC236}">
+                <a16:creationId xmlns:a16="http://schemas.microsoft.com/office/drawing/2014/main" id="{6D0E0BA3-5ECE-E94D-B034-8F400208F397}"/>
+              </a:ext>
+            </a:extLst>
+          </p:cNvPr>
+          <p:cNvSpPr>
+            <a:spLocks noGrp="1"/>
+          </p:cNvSpPr>
+          <p:nvPr>
+            <p:ph type="sldNum" sz="quarter" idx="12"/>
+          </p:nvPr>
+        </p:nvSpPr>
+        <p:spPr/>
+        <p:txBody>
+          <a:bodyPr/>
+          <a:lstStyle/>
+          <a:p>
+            <a:fld id="{4E3AEE2C-3A74-8643-B4A2-442777B583A3}" type="slidenum">
+              <a:rPr lang="en-US" smtClean="0">
+                <a:latin typeface="National Park " pitchFamily="2" charset="77"/>
+              </a:rPr>
+              <a:t>62</a:t>
+            </a:fld>
+            <a:endParaRPr lang="en-US">
+              <a:latin typeface="National Park " pitchFamily="2" charset="77"/>
+            </a:endParaRPr>
+          </a:p>
+        </p:txBody>
+      </p:sp>
+    </p:spTree>
+    <p:extLst>
+      <p:ext uri="{BB962C8B-B14F-4D97-AF65-F5344CB8AC3E}">
+        <p14:creationId xmlns:p14="http://schemas.microsoft.com/office/powerpoint/2010/main" val="2526893295"/>
+      </p:ext>
+    </p:extLst>
+  </p:cSld>
+  <p:clrMapOvr>
+    <a:masterClrMapping/>
+  </p:clrMapOvr>
+</p:sld>
+</file>
+
+<file path=ppt/slides/slide63.xml><?xml version="1.0" encoding="utf-8"?>
+<p:sld xmlns:a="http://schemas.openxmlformats.org/drawingml/2006/main" xmlns:r="http://schemas.openxmlformats.org/officeDocument/2006/relationships" xmlns:p="http://schemas.openxmlformats.org/presentationml/2006/main">
+  <p:cSld>
+    <p:spTree>
+      <p:nvGrpSpPr>
+        <p:cNvPr id="1" name=""/>
+        <p:cNvGrpSpPr/>
+        <p:nvPr/>
+      </p:nvGrpSpPr>
+      <p:grpSpPr>
+        <a:xfrm>
+          <a:off x="0" y="0"/>
+          <a:ext cx="0" cy="0"/>
+          <a:chOff x="0" y="0"/>
+          <a:chExt cx="0" cy="0"/>
+        </a:xfrm>
+      </p:grpSpPr>
+      <p:sp>
+        <p:nvSpPr>
+          <p:cNvPr id="2" name="Title 1">
+            <a:extLst>
+              <a:ext uri="{FF2B5EF4-FFF2-40B4-BE49-F238E27FC236}">
+                <a16:creationId xmlns:a16="http://schemas.microsoft.com/office/drawing/2014/main" id="{6972196C-1D2D-C240-AD57-E3EBC4FA030D}"/>
+              </a:ext>
+            </a:extLst>
+          </p:cNvPr>
+          <p:cNvSpPr>
+            <a:spLocks noGrp="1"/>
+          </p:cNvSpPr>
+          <p:nvPr>
+            <p:ph type="title"/>
+          </p:nvPr>
+        </p:nvSpPr>
+        <p:spPr/>
+        <p:txBody>
+          <a:bodyPr>
+            <a:normAutofit fontScale="90000"/>
+          </a:bodyPr>
+          <a:lstStyle/>
+          <a:p>
+            <a:pPr algn="ctr"/>
+            <a:r>
+              <a:rPr lang="en-US" dirty="0">
+                <a:latin typeface="National Park " pitchFamily="2" charset="77"/>
+              </a:rPr>
+              <a:t>Practice and Exercises : MIT Datacenter Challenge</a:t>
+            </a:r>
+          </a:p>
+        </p:txBody>
+      </p:sp>
+      <p:sp>
+        <p:nvSpPr>
+          <p:cNvPr id="3" name="Content Placeholder 2">
+            <a:extLst>
+              <a:ext uri="{FF2B5EF4-FFF2-40B4-BE49-F238E27FC236}">
+                <a16:creationId xmlns:a16="http://schemas.microsoft.com/office/drawing/2014/main" id="{59541F7C-8324-CD41-84A0-D9DC3E4E12B8}"/>
+              </a:ext>
+            </a:extLst>
+          </p:cNvPr>
+          <p:cNvSpPr>
+            <a:spLocks noGrp="1"/>
+          </p:cNvSpPr>
+          <p:nvPr>
+            <p:ph idx="1"/>
+          </p:nvPr>
+        </p:nvSpPr>
+        <p:spPr/>
+        <p:txBody>
+          <a:bodyPr>
+            <a:normAutofit/>
+          </a:bodyPr>
+          <a:lstStyle/>
+          <a:p>
+            <a:r>
+              <a:rPr lang="en-US" dirty="0">
+                <a:hlinkClick r:id="rId2"/>
+              </a:rPr>
+              <a:t>dcc.mit.edu</a:t>
+            </a:r>
+            <a:r>
+              <a:rPr lang="en-US" dirty="0"/>
+              <a:t> A 2.6T dataset pertaining to cluster operations</a:t>
+            </a:r>
+          </a:p>
+          <a:p>
+            <a:r>
+              <a:rPr lang="en-US" b="1" dirty="0"/>
+              <a:t>Partial</a:t>
+            </a:r>
+            <a:r>
+              <a:rPr lang="en-US" dirty="0"/>
+              <a:t> </a:t>
+            </a:r>
+            <a:r>
+              <a:rPr lang="en-US" b="1" dirty="0"/>
+              <a:t>data </a:t>
+            </a:r>
+            <a:r>
+              <a:rPr lang="en-US" dirty="0"/>
+              <a:t>available on </a:t>
+            </a:r>
+            <a:r>
+              <a:rPr lang="en-US" dirty="0" err="1"/>
+              <a:t>Github</a:t>
+            </a:r>
+            <a:r>
+              <a:rPr lang="en-US" dirty="0"/>
+              <a:t> at </a:t>
+            </a:r>
+            <a:r>
+              <a:rPr lang="en-US" sz="1700" b="1" dirty="0">
+                <a:latin typeface="Courier New" panose="02070309020205020404" pitchFamily="49" charset="0"/>
+                <a:cs typeface="Courier New" panose="02070309020205020404" pitchFamily="49" charset="0"/>
+              </a:rPr>
+              <a:t>data/datacenter-challenge</a:t>
+            </a:r>
+            <a:r>
+              <a:rPr lang="en-US" dirty="0"/>
+              <a:t> </a:t>
+            </a:r>
+          </a:p>
+          <a:p>
+            <a:r>
+              <a:rPr lang="en-US" dirty="0"/>
+              <a:t>Although geared towards AI based models, </a:t>
+            </a:r>
+            <a:r>
+              <a:rPr lang="en-US" b="1" dirty="0"/>
+              <a:t>GNU Parallel </a:t>
+            </a:r>
+            <a:r>
+              <a:rPr lang="en-US" dirty="0"/>
+              <a:t>could help gain insight on patterns from existing data</a:t>
+            </a:r>
+          </a:p>
+          <a:p>
+            <a:r>
+              <a:rPr lang="en-US" dirty="0"/>
+              <a:t>Scheduling Characterization</a:t>
+            </a:r>
+          </a:p>
+          <a:p>
+            <a:r>
+              <a:rPr lang="en-US" dirty="0"/>
+              <a:t>Workload Characterization</a:t>
+            </a:r>
+          </a:p>
+          <a:p>
+            <a:r>
+              <a:rPr lang="en-US" dirty="0"/>
+              <a:t>File System Characterization</a:t>
+            </a:r>
+          </a:p>
+          <a:p>
+            <a:r>
+              <a:rPr lang="en-US" dirty="0"/>
+              <a:t>Error Characterization</a:t>
+            </a:r>
+          </a:p>
+        </p:txBody>
+      </p:sp>
+      <p:sp>
+        <p:nvSpPr>
+          <p:cNvPr id="4" name="Slide Number Placeholder 3">
+            <a:extLst>
+              <a:ext uri="{FF2B5EF4-FFF2-40B4-BE49-F238E27FC236}">
+                <a16:creationId xmlns:a16="http://schemas.microsoft.com/office/drawing/2014/main" id="{6D0E0BA3-5ECE-E94D-B034-8F400208F397}"/>
+              </a:ext>
+            </a:extLst>
+          </p:cNvPr>
+          <p:cNvSpPr>
+            <a:spLocks noGrp="1"/>
+          </p:cNvSpPr>
+          <p:nvPr>
+            <p:ph type="sldNum" sz="quarter" idx="12"/>
+          </p:nvPr>
+        </p:nvSpPr>
+        <p:spPr/>
+        <p:txBody>
+          <a:bodyPr/>
+          <a:lstStyle/>
+          <a:p>
+            <a:fld id="{4E3AEE2C-3A74-8643-B4A2-442777B583A3}" type="slidenum">
+              <a:rPr lang="en-US" smtClean="0">
+                <a:latin typeface="National Park " pitchFamily="2" charset="77"/>
+              </a:rPr>
+              <a:t>63</a:t>
+            </a:fld>
+            <a:endParaRPr lang="en-US">
+              <a:latin typeface="National Park " pitchFamily="2" charset="77"/>
+            </a:endParaRPr>
+          </a:p>
+        </p:txBody>
+      </p:sp>
+    </p:spTree>
+    <p:extLst>
+      <p:ext uri="{BB962C8B-B14F-4D97-AF65-F5344CB8AC3E}">
+        <p14:creationId xmlns:p14="http://schemas.microsoft.com/office/powerpoint/2010/main" val="4215097671"/>
+      </p:ext>
+    </p:extLst>
+  </p:cSld>
+  <p:clrMapOvr>
+    <a:masterClrMapping/>
+  </p:clrMapOvr>
+</p:sld>
+</file>
+
+<file path=ppt/slides/slide64.xml><?xml version="1.0" encoding="utf-8"?>
+<p:sld xmlns:a="http://schemas.openxmlformats.org/drawingml/2006/main" xmlns:r="http://schemas.openxmlformats.org/officeDocument/2006/relationships" xmlns:p="http://schemas.openxmlformats.org/presentationml/2006/main">
+  <p:cSld>
+    <p:spTree>
+      <p:nvGrpSpPr>
+        <p:cNvPr id="1" name=""/>
+        <p:cNvGrpSpPr/>
+        <p:nvPr/>
+      </p:nvGrpSpPr>
+      <p:grpSpPr>
+        <a:xfrm>
+          <a:off x="0" y="0"/>
+          <a:ext cx="0" cy="0"/>
+          <a:chOff x="0" y="0"/>
+          <a:chExt cx="0" cy="0"/>
+        </a:xfrm>
+      </p:grpSpPr>
+      <p:sp>
+        <p:nvSpPr>
+          <p:cNvPr id="2" name="Title 1"/>
+          <p:cNvSpPr>
+            <a:spLocks noGrp="1"/>
+          </p:cNvSpPr>
+          <p:nvPr>
+            <p:ph type="title"/>
+          </p:nvPr>
+        </p:nvSpPr>
+        <p:spPr/>
+        <p:txBody>
+          <a:bodyPr/>
+          <a:lstStyle/>
+          <a:p>
+            <a:pPr algn="ctr"/>
+            <a:r>
+              <a:rPr lang="en-US" dirty="0">
+                <a:latin typeface="National Park " pitchFamily="2" charset="77"/>
+              </a:rPr>
+              <a:t>Credits, references and resources</a:t>
+            </a:r>
+          </a:p>
+        </p:txBody>
+      </p:sp>
+      <p:sp>
+        <p:nvSpPr>
+          <p:cNvPr id="3" name="Content Placeholder 2"/>
+          <p:cNvSpPr>
+            <a:spLocks noGrp="1"/>
+          </p:cNvSpPr>
+          <p:nvPr>
+            <p:ph idx="1"/>
+          </p:nvPr>
+        </p:nvSpPr>
+        <p:spPr/>
+        <p:txBody>
+          <a:bodyPr>
+            <a:normAutofit fontScale="77500" lnSpcReduction="20000"/>
+          </a:bodyPr>
+          <a:lstStyle/>
+          <a:p>
+            <a:r>
+              <a:rPr lang="en-US" dirty="0">
+                <a:hlinkClick r:id="rId3"/>
+              </a:rPr>
+              <a:t>gnu.org/software/parallel</a:t>
+            </a:r>
+            <a:endParaRPr lang="en-US" dirty="0"/>
+          </a:p>
+          <a:p>
+            <a:r>
+              <a:rPr lang="en-US" dirty="0">
+                <a:hlinkClick r:id="rId4"/>
+              </a:rPr>
+              <a:t>rcc.uchicago.edu/documentation/_build/html/running-jobs/srun-parallel/index.html</a:t>
+            </a:r>
+            <a:endParaRPr lang="en-US" dirty="0"/>
+          </a:p>
+          <a:p>
+            <a:r>
+              <a:rPr lang="en-US" dirty="0">
+                <a:hlinkClick r:id="rId5"/>
+              </a:rPr>
+              <a:t>ulhpc-tutorials.readthedocs.io/en/latest/sequential/basics</a:t>
+            </a:r>
+            <a:endParaRPr lang="en-US" dirty="0"/>
+          </a:p>
+          <a:p>
+            <a:r>
+              <a:rPr lang="en-US" dirty="0">
+                <a:hlinkClick r:id="rId6"/>
+              </a:rPr>
+              <a:t>docs.ycrc.yale.edu/clusters-at-yale/guides/parallel</a:t>
+            </a:r>
+            <a:endParaRPr lang="en-US" dirty="0"/>
+          </a:p>
+          <a:p>
+            <a:r>
+              <a:rPr lang="en-US" dirty="0">
+                <a:hlinkClick r:id="rId7"/>
+              </a:rPr>
+              <a:t>www.vanderbilt.edu/accre/documentation/parallel</a:t>
+            </a:r>
+            <a:endParaRPr lang="en-US" dirty="0"/>
+          </a:p>
+          <a:p>
+            <a:r>
+              <a:rPr lang="en-US" dirty="0">
+                <a:hlinkClick r:id="rId8"/>
+              </a:rPr>
+              <a:t>docs-research-it.berkeley.edu/services/high-performance-computing/user-guide/running-your-jobs/gnu-parallel</a:t>
+            </a:r>
+            <a:endParaRPr lang="en-US" dirty="0"/>
+          </a:p>
+          <a:p>
+            <a:r>
+              <a:rPr lang="en-US" dirty="0">
+                <a:hlinkClick r:id="rId9"/>
+              </a:rPr>
+              <a:t>omgenomics.com/parallel</a:t>
+            </a:r>
+            <a:endParaRPr lang="en-US" dirty="0"/>
+          </a:p>
+          <a:p>
+            <a:r>
+              <a:rPr lang="en-US" dirty="0">
+                <a:hlinkClick r:id="rId10"/>
+              </a:rPr>
+              <a:t>curc.readthedocs.io/en/latest/software/GNUParallel.html</a:t>
+            </a:r>
+            <a:endParaRPr lang="en-US" dirty="0"/>
+          </a:p>
+          <a:p>
+            <a:r>
+              <a:rPr lang="en-US" dirty="0">
+                <a:hlinkClick r:id="rId11"/>
+              </a:rPr>
+              <a:t>thenybble.de/posts/json-analysis</a:t>
+            </a:r>
+            <a:endParaRPr lang="en-US" dirty="0"/>
+          </a:p>
+          <a:p>
+            <a:r>
+              <a:rPr lang="en-US" dirty="0">
+                <a:hlinkClick r:id="rId12"/>
+              </a:rPr>
+              <a:t>stackoverflow.com/questions/tagged/gnu-parallel</a:t>
+            </a:r>
+            <a:endParaRPr lang="en-US" dirty="0"/>
+          </a:p>
+          <a:p>
+            <a:r>
+              <a:rPr lang="en-US" dirty="0">
+                <a:hlinkClick r:id="rId13"/>
+              </a:rPr>
+              <a:t>unix.stackexchange.com/questions/tagged/gnu-parallel</a:t>
+            </a:r>
+            <a:endParaRPr lang="en-US" dirty="0"/>
+          </a:p>
+        </p:txBody>
+      </p:sp>
+      <p:sp>
+        <p:nvSpPr>
+          <p:cNvPr id="4" name="Slide Number Placeholder 3"/>
+          <p:cNvSpPr>
+            <a:spLocks noGrp="1"/>
+          </p:cNvSpPr>
+          <p:nvPr>
+            <p:ph type="sldNum" sz="quarter" idx="12"/>
+          </p:nvPr>
+        </p:nvSpPr>
+        <p:spPr/>
+        <p:txBody>
+          <a:bodyPr/>
+          <a:lstStyle/>
+          <a:p>
+            <a:fld id="{4E3AEE2C-3A74-8643-B4A2-442777B583A3}" type="slidenum">
+              <a:rPr lang="en-US" smtClean="0">
+                <a:latin typeface="National Park " pitchFamily="2" charset="77"/>
+              </a:rPr>
+              <a:t>64</a:t>
+            </a:fld>
+            <a:endParaRPr lang="en-US">
+              <a:latin typeface="National Park " pitchFamily="2" charset="77"/>
+            </a:endParaRPr>
+          </a:p>
+        </p:txBody>
+      </p:sp>
+    </p:spTree>
+    <p:extLst>
+      <p:ext uri="{BB962C8B-B14F-4D97-AF65-F5344CB8AC3E}">
+        <p14:creationId xmlns:p14="http://schemas.microsoft.com/office/powerpoint/2010/main" val="1816197902"/>
+      </p:ext>
+    </p:extLst>
+  </p:cSld>
+  <p:clrMapOvr>
+    <a:masterClrMapping/>
+  </p:clrMapOvr>
+</p:sld>
+</file>
+
+<file path=ppt/slides/slide65.xml><?xml version="1.0" encoding="utf-8"?>
+<p:sld xmlns:a="http://schemas.openxmlformats.org/drawingml/2006/main" xmlns:r="http://schemas.openxmlformats.org/officeDocument/2006/relationships" xmlns:p="http://schemas.openxmlformats.org/presentationml/2006/main">
+  <p:cSld>
+    <p:spTree>
+      <p:nvGrpSpPr>
+        <p:cNvPr id="1" name=""/>
+        <p:cNvGrpSpPr/>
+        <p:nvPr/>
+      </p:nvGrpSpPr>
+      <p:grpSpPr>
+        <a:xfrm>
+          <a:off x="0" y="0"/>
+          <a:ext cx="0" cy="0"/>
+          <a:chOff x="0" y="0"/>
+          <a:chExt cx="0" cy="0"/>
+        </a:xfrm>
+      </p:grpSpPr>
+      <p:sp>
+        <p:nvSpPr>
           <p:cNvPr id="2" name="Title 1"/>
           <p:cNvSpPr>
             <a:spLocks noGrp="1"/>
@@ -22416,7 +23481,7 @@
               <a:rPr lang="en-US" smtClean="0">
                 <a:latin typeface="National Park " pitchFamily="2" charset="77"/>
               </a:rPr>
-              <a:t>61</a:t>
+              <a:t>65</a:t>
             </a:fld>
             <a:endParaRPr lang="en-US">
               <a:latin typeface="National Park " pitchFamily="2" charset="77"/>
@@ -22467,7 +23532,7 @@
 </p:sld>
 </file>
 
-<file path=ppt/slides/slide62.xml><?xml version="1.0" encoding="utf-8"?>
+<file path=ppt/slides/slide66.xml><?xml version="1.0" encoding="utf-8"?>
 <p:sld xmlns:a="http://schemas.openxmlformats.org/drawingml/2006/main" xmlns:r="http://schemas.openxmlformats.org/officeDocument/2006/relationships" xmlns:p="http://schemas.openxmlformats.org/presentationml/2006/main">
   <p:cSld>
     <p:spTree>
@@ -22489,368 +23554,6 @@
           <p:cNvPr id="2" name="Title 1">
             <a:extLst>
               <a:ext uri="{FF2B5EF4-FFF2-40B4-BE49-F238E27FC236}">
-                <a16:creationId xmlns:a16="http://schemas.microsoft.com/office/drawing/2014/main" id="{6972196C-1D2D-C240-AD57-E3EBC4FA030D}"/>
-              </a:ext>
-            </a:extLst>
-          </p:cNvPr>
-          <p:cNvSpPr>
-            <a:spLocks noGrp="1"/>
-          </p:cNvSpPr>
-          <p:nvPr>
-            <p:ph type="title"/>
-          </p:nvPr>
-        </p:nvSpPr>
-        <p:spPr/>
-        <p:txBody>
-          <a:bodyPr>
-            <a:normAutofit fontScale="90000"/>
-          </a:bodyPr>
-          <a:lstStyle/>
-          <a:p>
-            <a:pPr algn="ctr"/>
-            <a:r>
-              <a:rPr lang="en-US" dirty="0">
-                <a:latin typeface="National Park " pitchFamily="2" charset="77"/>
-              </a:rPr>
-              <a:t>Practice and Exercises : Titanic Data Challenge</a:t>
-            </a:r>
-          </a:p>
-        </p:txBody>
-      </p:sp>
-      <p:sp>
-        <p:nvSpPr>
-          <p:cNvPr id="3" name="Content Placeholder 2">
-            <a:extLst>
-              <a:ext uri="{FF2B5EF4-FFF2-40B4-BE49-F238E27FC236}">
-                <a16:creationId xmlns:a16="http://schemas.microsoft.com/office/drawing/2014/main" id="{59541F7C-8324-CD41-84A0-D9DC3E4E12B8}"/>
-              </a:ext>
-            </a:extLst>
-          </p:cNvPr>
-          <p:cNvSpPr>
-            <a:spLocks noGrp="1"/>
-          </p:cNvSpPr>
-          <p:nvPr>
-            <p:ph idx="1"/>
-          </p:nvPr>
-        </p:nvSpPr>
-        <p:spPr/>
-        <p:txBody>
-          <a:bodyPr>
-            <a:normAutofit fontScale="92500" lnSpcReduction="20000"/>
-          </a:bodyPr>
-          <a:lstStyle/>
-          <a:p>
-            <a:pPr marL="0" indent="0">
-              <a:buNone/>
-            </a:pPr>
-            <a:r>
-              <a:rPr lang="en-US" dirty="0"/>
-              <a:t>Data: in </a:t>
-            </a:r>
-            <a:r>
-              <a:rPr lang="en-US" dirty="0" err="1"/>
-              <a:t>Github</a:t>
-            </a:r>
-            <a:r>
-              <a:rPr lang="en-US" dirty="0"/>
-              <a:t>, </a:t>
-            </a:r>
-            <a:r>
-              <a:rPr lang="en-US" dirty="0" err="1"/>
-              <a:t>Titanic.csv</a:t>
-            </a:r>
-            <a:r>
-              <a:rPr lang="en-US" dirty="0"/>
-              <a:t> </a:t>
-            </a:r>
-          </a:p>
-          <a:p>
-            <a:r>
-              <a:rPr lang="en-US" dirty="0"/>
-              <a:t>Problem 1. What characteristics are shared by all passengers whose fare is 0?</a:t>
-            </a:r>
-          </a:p>
-          <a:p>
-            <a:r>
-              <a:rPr lang="en-US" dirty="0"/>
-              <a:t>Problem 2. How many married women over age 50 embarked in Cherbourg? (Married women are denoted by "Mrs.")</a:t>
-            </a:r>
-          </a:p>
-          <a:p>
-            <a:r>
-              <a:rPr lang="en-US" dirty="0"/>
-              <a:t>Problem 3. Which embarkation city had the highest-paying passengers on average?</a:t>
-            </a:r>
-          </a:p>
-          <a:p>
-            <a:r>
-              <a:rPr lang="en-US" dirty="0"/>
-              <a:t>Problem 4. What is the most common last name among passengers? What is the average number of passengers per last name?</a:t>
-            </a:r>
-          </a:p>
-          <a:p>
-            <a:r>
-              <a:rPr lang="en-US" dirty="0"/>
-              <a:t>Problem 5. What's the survival rate for passengers in the three different classes, i.e., what fraction of passengers in each class survived? Find the answer using spreadsheet functions only - don't perform any arithmetic by hand! </a:t>
-            </a:r>
-          </a:p>
-          <a:p>
-            <a:endParaRPr lang="en-US" dirty="0"/>
-          </a:p>
-        </p:txBody>
-      </p:sp>
-      <p:sp>
-        <p:nvSpPr>
-          <p:cNvPr id="4" name="Slide Number Placeholder 3">
-            <a:extLst>
-              <a:ext uri="{FF2B5EF4-FFF2-40B4-BE49-F238E27FC236}">
-                <a16:creationId xmlns:a16="http://schemas.microsoft.com/office/drawing/2014/main" id="{6D0E0BA3-5ECE-E94D-B034-8F400208F397}"/>
-              </a:ext>
-            </a:extLst>
-          </p:cNvPr>
-          <p:cNvSpPr>
-            <a:spLocks noGrp="1"/>
-          </p:cNvSpPr>
-          <p:nvPr>
-            <p:ph type="sldNum" sz="quarter" idx="12"/>
-          </p:nvPr>
-        </p:nvSpPr>
-        <p:spPr/>
-        <p:txBody>
-          <a:bodyPr/>
-          <a:lstStyle/>
-          <a:p>
-            <a:fld id="{4E3AEE2C-3A74-8643-B4A2-442777B583A3}" type="slidenum">
-              <a:rPr lang="en-US" smtClean="0">
-                <a:latin typeface="National Park " pitchFamily="2" charset="77"/>
-              </a:rPr>
-              <a:t>62</a:t>
-            </a:fld>
-            <a:endParaRPr lang="en-US">
-              <a:latin typeface="National Park " pitchFamily="2" charset="77"/>
-            </a:endParaRPr>
-          </a:p>
-        </p:txBody>
-      </p:sp>
-    </p:spTree>
-    <p:extLst>
-      <p:ext uri="{BB962C8B-B14F-4D97-AF65-F5344CB8AC3E}">
-        <p14:creationId xmlns:p14="http://schemas.microsoft.com/office/powerpoint/2010/main" val="2526893295"/>
-      </p:ext>
-    </p:extLst>
-  </p:cSld>
-  <p:clrMapOvr>
-    <a:masterClrMapping/>
-  </p:clrMapOvr>
-</p:sld>
-</file>
-
-<file path=ppt/slides/slide63.xml><?xml version="1.0" encoding="utf-8"?>
-<p:sld xmlns:a="http://schemas.openxmlformats.org/drawingml/2006/main" xmlns:r="http://schemas.openxmlformats.org/officeDocument/2006/relationships" xmlns:p="http://schemas.openxmlformats.org/presentationml/2006/main">
-  <p:cSld>
-    <p:spTree>
-      <p:nvGrpSpPr>
-        <p:cNvPr id="1" name=""/>
-        <p:cNvGrpSpPr/>
-        <p:nvPr/>
-      </p:nvGrpSpPr>
-      <p:grpSpPr>
-        <a:xfrm>
-          <a:off x="0" y="0"/>
-          <a:ext cx="0" cy="0"/>
-          <a:chOff x="0" y="0"/>
-          <a:chExt cx="0" cy="0"/>
-        </a:xfrm>
-      </p:grpSpPr>
-      <p:sp>
-        <p:nvSpPr>
-          <p:cNvPr id="2" name="Title 1">
-            <a:extLst>
-              <a:ext uri="{FF2B5EF4-FFF2-40B4-BE49-F238E27FC236}">
-                <a16:creationId xmlns:a16="http://schemas.microsoft.com/office/drawing/2014/main" id="{6972196C-1D2D-C240-AD57-E3EBC4FA030D}"/>
-              </a:ext>
-            </a:extLst>
-          </p:cNvPr>
-          <p:cNvSpPr>
-            <a:spLocks noGrp="1"/>
-          </p:cNvSpPr>
-          <p:nvPr>
-            <p:ph type="title"/>
-          </p:nvPr>
-        </p:nvSpPr>
-        <p:spPr/>
-        <p:txBody>
-          <a:bodyPr>
-            <a:normAutofit fontScale="90000"/>
-          </a:bodyPr>
-          <a:lstStyle/>
-          <a:p>
-            <a:pPr algn="ctr"/>
-            <a:r>
-              <a:rPr lang="en-US" dirty="0">
-                <a:latin typeface="National Park " pitchFamily="2" charset="77"/>
-              </a:rPr>
-              <a:t>Practice and Exercises : MIT Datacenter Challenge</a:t>
-            </a:r>
-          </a:p>
-        </p:txBody>
-      </p:sp>
-      <p:sp>
-        <p:nvSpPr>
-          <p:cNvPr id="3" name="Content Placeholder 2">
-            <a:extLst>
-              <a:ext uri="{FF2B5EF4-FFF2-40B4-BE49-F238E27FC236}">
-                <a16:creationId xmlns:a16="http://schemas.microsoft.com/office/drawing/2014/main" id="{59541F7C-8324-CD41-84A0-D9DC3E4E12B8}"/>
-              </a:ext>
-            </a:extLst>
-          </p:cNvPr>
-          <p:cNvSpPr>
-            <a:spLocks noGrp="1"/>
-          </p:cNvSpPr>
-          <p:nvPr>
-            <p:ph idx="1"/>
-          </p:nvPr>
-        </p:nvSpPr>
-        <p:spPr/>
-        <p:txBody>
-          <a:bodyPr>
-            <a:normAutofit/>
-          </a:bodyPr>
-          <a:lstStyle/>
-          <a:p>
-            <a:r>
-              <a:rPr lang="en-US" dirty="0">
-                <a:hlinkClick r:id="rId2"/>
-              </a:rPr>
-              <a:t>dcc.mit.edu</a:t>
-            </a:r>
-            <a:r>
-              <a:rPr lang="en-US" dirty="0"/>
-              <a:t> </a:t>
-            </a:r>
-          </a:p>
-          <a:p>
-            <a:r>
-              <a:rPr lang="en-US" dirty="0"/>
-              <a:t>Partial </a:t>
-            </a:r>
-            <a:r>
-              <a:rPr lang="en-US" b="1" dirty="0"/>
-              <a:t>data available</a:t>
-            </a:r>
-            <a:r>
-              <a:rPr lang="en-US" dirty="0"/>
-              <a:t> on </a:t>
-            </a:r>
-            <a:r>
-              <a:rPr lang="en-US" dirty="0" err="1"/>
-              <a:t>Github</a:t>
-            </a:r>
-            <a:r>
-              <a:rPr lang="en-US" dirty="0"/>
-              <a:t> at /data/datacenter-challenge </a:t>
-            </a:r>
-          </a:p>
-          <a:p>
-            <a:r>
-              <a:rPr lang="en-US" dirty="0"/>
-              <a:t>Although geared towards AI based models, GNU parallel could help gain insight on patterns from existing data</a:t>
-            </a:r>
-          </a:p>
-          <a:p>
-            <a:r>
-              <a:rPr lang="en-US" dirty="0"/>
-              <a:t>Scheduling Characterization</a:t>
-            </a:r>
-          </a:p>
-          <a:p>
-            <a:r>
-              <a:rPr lang="en-US" dirty="0"/>
-              <a:t>Workload Characterization</a:t>
-            </a:r>
-          </a:p>
-          <a:p>
-            <a:r>
-              <a:rPr lang="en-US" dirty="0"/>
-              <a:t>File System Characterization</a:t>
-            </a:r>
-          </a:p>
-          <a:p>
-            <a:r>
-              <a:rPr lang="en-US" dirty="0"/>
-              <a:t>Error Characterization</a:t>
-            </a:r>
-          </a:p>
-        </p:txBody>
-      </p:sp>
-      <p:sp>
-        <p:nvSpPr>
-          <p:cNvPr id="4" name="Slide Number Placeholder 3">
-            <a:extLst>
-              <a:ext uri="{FF2B5EF4-FFF2-40B4-BE49-F238E27FC236}">
-                <a16:creationId xmlns:a16="http://schemas.microsoft.com/office/drawing/2014/main" id="{6D0E0BA3-5ECE-E94D-B034-8F400208F397}"/>
-              </a:ext>
-            </a:extLst>
-          </p:cNvPr>
-          <p:cNvSpPr>
-            <a:spLocks noGrp="1"/>
-          </p:cNvSpPr>
-          <p:nvPr>
-            <p:ph type="sldNum" sz="quarter" idx="12"/>
-          </p:nvPr>
-        </p:nvSpPr>
-        <p:spPr/>
-        <p:txBody>
-          <a:bodyPr/>
-          <a:lstStyle/>
-          <a:p>
-            <a:fld id="{4E3AEE2C-3A74-8643-B4A2-442777B583A3}" type="slidenum">
-              <a:rPr lang="en-US" smtClean="0">
-                <a:latin typeface="National Park " pitchFamily="2" charset="77"/>
-              </a:rPr>
-              <a:t>63</a:t>
-            </a:fld>
-            <a:endParaRPr lang="en-US">
-              <a:latin typeface="National Park " pitchFamily="2" charset="77"/>
-            </a:endParaRPr>
-          </a:p>
-        </p:txBody>
-      </p:sp>
-    </p:spTree>
-    <p:extLst>
-      <p:ext uri="{BB962C8B-B14F-4D97-AF65-F5344CB8AC3E}">
-        <p14:creationId xmlns:p14="http://schemas.microsoft.com/office/powerpoint/2010/main" val="4215097671"/>
-      </p:ext>
-    </p:extLst>
-  </p:cSld>
-  <p:clrMapOvr>
-    <a:masterClrMapping/>
-  </p:clrMapOvr>
-</p:sld>
-</file>
-
-<file path=ppt/slides/slide64.xml><?xml version="1.0" encoding="utf-8"?>
-<p:sld xmlns:a="http://schemas.openxmlformats.org/drawingml/2006/main" xmlns:r="http://schemas.openxmlformats.org/officeDocument/2006/relationships" xmlns:p="http://schemas.openxmlformats.org/presentationml/2006/main">
-  <p:cSld>
-    <p:spTree>
-      <p:nvGrpSpPr>
-        <p:cNvPr id="1" name=""/>
-        <p:cNvGrpSpPr/>
-        <p:nvPr/>
-      </p:nvGrpSpPr>
-      <p:grpSpPr>
-        <a:xfrm>
-          <a:off x="0" y="0"/>
-          <a:ext cx="0" cy="0"/>
-          <a:chOff x="0" y="0"/>
-          <a:chExt cx="0" cy="0"/>
-        </a:xfrm>
-      </p:grpSpPr>
-      <p:sp>
-        <p:nvSpPr>
-          <p:cNvPr id="2" name="Title 1">
-            <a:extLst>
-              <a:ext uri="{FF2B5EF4-FFF2-40B4-BE49-F238E27FC236}">
                 <a16:creationId xmlns:a16="http://schemas.microsoft.com/office/drawing/2014/main" id="{3CDA2C0A-84C5-DDCE-DE2D-F26D112FC42D}"/>
               </a:ext>
             </a:extLst>
@@ -22954,7 +23657,7 @@
           <a:p>
             <a:fld id="{4E3AEE2C-3A74-8643-B4A2-442777B583A3}" type="slidenum">
               <a:rPr lang="en-US" smtClean="0"/>
-              <a:t>64</a:t>
+              <a:t>66</a:t>
             </a:fld>
             <a:endParaRPr lang="en-US"/>
           </a:p>
@@ -23350,7 +24053,7 @@
               <a:rPr lang="en-US" dirty="0">
                 <a:latin typeface="National Park " pitchFamily="2" charset="77"/>
               </a:rPr>
-              <a:t>Part 2: Intro to GNU Parallel</a:t>
+              <a:t>Part 2: Introduction to GNU Parallel</a:t>
             </a:r>
             <a:endParaRPr lang="en-US" i="1" dirty="0">
               <a:latin typeface="National Park Medium" pitchFamily="2" charset="77"/>

</xml_diff>

<commit_message>
final updates and minor fixes.
</commit_message>
<xml_diff>
--- a/gnu-parallel-tutorial.pptx
+++ b/gnu-parallel-tutorial.pptx
@@ -75,8 +75,8 @@
     <p:sldId id="398" r:id="rId63"/>
     <p:sldId id="393" r:id="rId64"/>
     <p:sldId id="288" r:id="rId65"/>
-    <p:sldId id="309" r:id="rId66"/>
-    <p:sldId id="456" r:id="rId67"/>
+    <p:sldId id="456" r:id="rId66"/>
+    <p:sldId id="309" r:id="rId67"/>
   </p:sldIdLst>
   <p:sldSz cx="9144000" cy="5143500" type="screen16x9"/>
   <p:notesSz cx="9144000" cy="6858000"/>
@@ -4509,7 +4509,7 @@
           <a:p>
             <a:r>
               <a:rPr lang="en-US" dirty="0"/>
-              <a:t>A terminal tool to parallelize shell commands</a:t>
+              <a:t>A terminal tool to parallelize processes</a:t>
             </a:r>
           </a:p>
           <a:p>
@@ -4521,7 +4521,7 @@
           <a:p>
             <a:r>
               <a:rPr lang="en-US" dirty="0"/>
-              <a:t>Well suited to run many single-core tasks on:</a:t>
+              <a:t>Well suited to run many single-core / single-thread tasks on:</a:t>
             </a:r>
           </a:p>
           <a:p>
@@ -4542,7 +4542,7 @@
             <a:pPr lvl="1"/>
             <a:r>
               <a:rPr lang="en-US" dirty="0"/>
-              <a:t>Works well with Resource Managers and job schedulers</a:t>
+              <a:t>Works well with Resource Managers and Job Schedulers</a:t>
             </a:r>
           </a:p>
           <a:p>
@@ -4793,16 +4793,23 @@
                 <a:latin typeface="Courier New" panose="02070309020205020404" pitchFamily="49" charset="0"/>
                 <a:cs typeface="Courier New" panose="02070309020205020404" pitchFamily="49" charset="0"/>
               </a:rPr>
-              <a:t>make install    # needs </a:t>
-            </a:r>
-            <a:r>
-              <a:rPr lang="en-US" sz="1800" b="1" dirty="0" err="1">
+              <a:t>make install    </a:t>
+            </a:r>
+            <a:r>
+              <a:rPr lang="en-US" sz="1800" dirty="0">
+                <a:latin typeface="Courier New" panose="02070309020205020404" pitchFamily="49" charset="0"/>
+                <a:cs typeface="Courier New" panose="02070309020205020404" pitchFamily="49" charset="0"/>
+              </a:rPr>
+              <a:t># needs </a:t>
+            </a:r>
+            <a:r>
+              <a:rPr lang="en-US" sz="1800" dirty="0" err="1">
                 <a:latin typeface="Courier New" panose="02070309020205020404" pitchFamily="49" charset="0"/>
                 <a:cs typeface="Courier New" panose="02070309020205020404" pitchFamily="49" charset="0"/>
               </a:rPr>
               <a:t>libevent</a:t>
             </a:r>
-            <a:endParaRPr lang="en-US" sz="1800" b="1" dirty="0">
+            <a:endParaRPr lang="en-US" sz="1800" dirty="0">
               <a:latin typeface="Courier New" panose="02070309020205020404" pitchFamily="49" charset="0"/>
               <a:cs typeface="Courier New" panose="02070309020205020404" pitchFamily="49" charset="0"/>
             </a:endParaRPr>
@@ -4810,7 +4817,7 @@
           <a:p>
             <a:r>
               <a:rPr lang="en-US" dirty="0"/>
-              <a:t>Set PATH and it is ready to use:</a:t>
+              <a:t>Set PATH and it is ready to go:</a:t>
             </a:r>
             <a:br>
               <a:rPr lang="en-US" dirty="0"/>
@@ -5059,7 +5066,14 @@
                 <a:latin typeface="Courier New" panose="02070309020205020404" pitchFamily="49" charset="0"/>
                 <a:cs typeface="Courier New" panose="02070309020205020404" pitchFamily="49" charset="0"/>
               </a:rPr>
-              <a:t>parallel --help    # summary of most imp options</a:t>
+              <a:t>parallel --help    </a:t>
+            </a:r>
+            <a:r>
+              <a:rPr lang="en-US" sz="1800" dirty="0">
+                <a:latin typeface="Courier New" panose="02070309020205020404" pitchFamily="49" charset="0"/>
+                <a:cs typeface="Courier New" panose="02070309020205020404" pitchFamily="49" charset="0"/>
+              </a:rPr>
+              <a:t># summary of most imp options</a:t>
             </a:r>
           </a:p>
           <a:p>
@@ -5071,16 +5085,23 @@
                 <a:latin typeface="Courier New" panose="02070309020205020404" pitchFamily="49" charset="0"/>
                 <a:cs typeface="Courier New" panose="02070309020205020404" pitchFamily="49" charset="0"/>
               </a:rPr>
-              <a:t>parallel --max-line-length-allowed # max size of </a:t>
-            </a:r>
-            <a:r>
-              <a:rPr lang="en-US" sz="1800" b="1" dirty="0" err="1">
+              <a:t>parallel --max-line-length-allowed </a:t>
+            </a:r>
+            <a:r>
+              <a:rPr lang="en-US" sz="1800" dirty="0">
+                <a:latin typeface="Courier New" panose="02070309020205020404" pitchFamily="49" charset="0"/>
+                <a:cs typeface="Courier New" panose="02070309020205020404" pitchFamily="49" charset="0"/>
+              </a:rPr>
+              <a:t># max size of </a:t>
+            </a:r>
+            <a:r>
+              <a:rPr lang="en-US" sz="1800" dirty="0" err="1">
                 <a:latin typeface="Courier New" panose="02070309020205020404" pitchFamily="49" charset="0"/>
                 <a:cs typeface="Courier New" panose="02070309020205020404" pitchFamily="49" charset="0"/>
               </a:rPr>
               <a:t>cmdline</a:t>
             </a:r>
-            <a:endParaRPr lang="en-US" sz="1800" b="1" dirty="0">
+            <a:endParaRPr lang="en-US" sz="1800" dirty="0">
               <a:latin typeface="Courier New" panose="02070309020205020404" pitchFamily="49" charset="0"/>
               <a:cs typeface="Courier New" panose="02070309020205020404" pitchFamily="49" charset="0"/>
             </a:endParaRPr>
@@ -5405,7 +5426,7 @@
         </p:nvCxnSpPr>
         <p:spPr>
           <a:xfrm>
-            <a:off x="6549594" y="2192266"/>
+            <a:off x="6542220" y="2192266"/>
             <a:ext cx="0" cy="539496"/>
           </a:xfrm>
           <a:prstGeom prst="straightConnector1">
@@ -5441,7 +5462,7 @@
         </p:nvSpPr>
         <p:spPr>
           <a:xfrm>
-            <a:off x="6206711" y="1933863"/>
+            <a:off x="6147719" y="1933863"/>
             <a:ext cx="813043" cy="248209"/>
           </a:xfrm>
           <a:prstGeom prst="rect">
@@ -5636,7 +5657,7 @@
               <a:rPr lang="en-US" dirty="0">
                 <a:latin typeface="National Park " pitchFamily="2" charset="77"/>
               </a:rPr>
-              <a:t>Another Form of same command</a:t>
+              <a:t>Another Form of the same command</a:t>
             </a:r>
           </a:p>
         </p:txBody>
@@ -7447,7 +7468,7 @@
             </a:pPr>
             <a:r>
               <a:rPr lang="en-US" sz="1600" dirty="0"/>
-              <a:t>Triple colon semantic: Run &lt;command&gt; in parallel for each of the input parameters:</a:t>
+              <a:t>Triple colon: Run &lt;command&gt; in parallel for each of the input parameters:</a:t>
             </a:r>
             <a:br>
               <a:rPr lang="en-US" sz="1600" dirty="0"/>
@@ -7490,11 +7511,11 @@
             </a:pPr>
             <a:r>
               <a:rPr lang="en-US" sz="1600" b="1" dirty="0"/>
-              <a:t>Quad colon </a:t>
+              <a:t>Quad colon</a:t>
             </a:r>
             <a:r>
               <a:rPr lang="en-US" sz="1600" dirty="0"/>
-              <a:t>semantic: Run &lt;command&gt; in parallel for each line in input file; </a:t>
+              <a:t>: Run &lt;command&gt; in parallel for each line in input file; </a:t>
             </a:r>
             <a:r>
               <a:rPr lang="en-US" sz="1600" b="1" dirty="0">
@@ -7505,7 +7526,7 @@
             </a:r>
             <a:r>
               <a:rPr lang="en-US" sz="1600" dirty="0"/>
-              <a:t> is alternative syntax to quadruple colon</a:t>
+              <a:t> is alternative syntax to quad colon</a:t>
             </a:r>
             <a:br>
               <a:rPr lang="en-US" sz="1600" dirty="0"/>
@@ -8196,6 +8217,58 @@
                 <a:sym typeface="Courier New"/>
               </a:rPr>
             </a:br>
+            <a:r>
+              <a:rPr lang="en-US" sz="1600" dirty="0"/>
+              <a:t>May use </a:t>
+            </a:r>
+            <a:r>
+              <a:rPr lang="en-US" sz="1600" b="1" dirty="0">
+                <a:latin typeface="Courier New"/>
+                <a:ea typeface="Courier New"/>
+                <a:cs typeface="Courier New"/>
+                <a:sym typeface="Courier New"/>
+              </a:rPr>
+              <a:t>-N0</a:t>
+            </a:r>
+            <a:r>
+              <a:rPr lang="en-US" sz="1600" dirty="0"/>
+              <a:t> when no commands have no arguments (still need to provide :::)</a:t>
+            </a:r>
+          </a:p>
+          <a:p>
+            <a:pPr marL="596900" lvl="1" indent="0">
+              <a:spcBef>
+                <a:spcPts val="0"/>
+              </a:spcBef>
+              <a:buSzPts val="1400"/>
+              <a:buNone/>
+            </a:pPr>
+            <a:r>
+              <a:rPr lang="en-US" sz="1600" b="1" dirty="0">
+                <a:latin typeface="Courier New"/>
+                <a:ea typeface="Courier New"/>
+                <a:cs typeface="Courier New"/>
+                <a:sym typeface="Courier New"/>
+              </a:rPr>
+              <a:t>parallel -N0 date ::: </a:t>
+            </a:r>
+            <a:r>
+              <a:rPr lang="en-US" sz="1600" b="1" dirty="0" err="1">
+                <a:latin typeface="Courier New"/>
+                <a:ea typeface="Courier New"/>
+                <a:cs typeface="Courier New"/>
+                <a:sym typeface="Courier New"/>
+              </a:rPr>
+              <a:t>xyz</a:t>
+            </a:r>
+            <a:br>
+              <a:rPr lang="en-US" sz="1600" b="1" dirty="0">
+                <a:latin typeface="Courier New"/>
+                <a:ea typeface="Courier New"/>
+                <a:cs typeface="Courier New"/>
+                <a:sym typeface="Courier New"/>
+              </a:rPr>
+            </a:br>
             <a:endParaRPr lang="en-US" sz="1600" b="1" dirty="0">
               <a:latin typeface="Courier New"/>
               <a:ea typeface="Courier New"/>
@@ -8304,7 +8377,16 @@
                 <a:cs typeface="Courier New"/>
                 <a:sym typeface="Courier New"/>
               </a:rPr>
-              <a:t>/passwd echo # same as above</a:t>
+              <a:t>/passwd echo </a:t>
+            </a:r>
+            <a:r>
+              <a:rPr lang="en-US" sz="1600" dirty="0">
+                <a:latin typeface="Courier New"/>
+                <a:ea typeface="Courier New"/>
+                <a:cs typeface="Courier New"/>
+                <a:sym typeface="Courier New"/>
+              </a:rPr>
+              <a:t># same as above</a:t>
             </a:r>
             <a:br>
               <a:rPr lang="en-US" sz="1600" b="1" dirty="0">
@@ -8756,7 +8838,7 @@
             </a:pPr>
             <a:r>
               <a:rPr lang="en-US" sz="1600" dirty="0"/>
-              <a:t>Is equivalent to a nested for loop!:</a:t>
+              <a:t>is equivalent to a nested for loop:</a:t>
             </a:r>
             <a:br>
               <a:rPr lang="en-US" sz="1600" dirty="0"/>
@@ -8828,7 +8910,7 @@
                 <a:cs typeface="Courier New"/>
                 <a:sym typeface="Courier New"/>
               </a:rPr>
-              <a:t>    Echo $</a:t>
+              <a:t>    echo $</a:t>
             </a:r>
             <a:r>
               <a:rPr lang="en-US" sz="1600" b="1" dirty="0" err="1">
@@ -8922,7 +9004,7 @@
             </a:r>
             <a:r>
               <a:rPr lang="en-US" sz="1900" dirty="0"/>
-              <a:t> 1:1</a:t>
+              <a:t> 1:1:</a:t>
             </a:r>
             <a:br>
               <a:rPr lang="en-US" sz="1900" dirty="0"/>
@@ -9241,34 +9323,62 @@
             </a:r>
             <a:r>
               <a:rPr lang="en-US" sz="1600" dirty="0"/>
-              <a:t> /</a:t>
-            </a:r>
-            <a:r>
-              <a:rPr lang="en-US" sz="1600" dirty="0" err="1"/>
+              <a:t> </a:t>
+            </a:r>
+            <a:r>
+              <a:rPr lang="en-US" sz="1600" b="1" dirty="0">
+                <a:latin typeface="Courier New" panose="02070309020205020404" pitchFamily="49" charset="0"/>
+                <a:cs typeface="Courier New" panose="02070309020205020404" pitchFamily="49" charset="0"/>
+              </a:rPr>
+              <a:t>/</a:t>
+            </a:r>
+            <a:r>
+              <a:rPr lang="en-US" sz="1600" b="1" dirty="0" err="1">
+                <a:latin typeface="Courier New" panose="02070309020205020404" pitchFamily="49" charset="0"/>
+                <a:cs typeface="Courier New" panose="02070309020205020404" pitchFamily="49" charset="0"/>
+              </a:rPr>
               <a:t>tmp</a:t>
             </a:r>
             <a:r>
-              <a:rPr lang="en-US" sz="1600" dirty="0"/>
+              <a:rPr lang="en-US" sz="1600" b="1" dirty="0">
+                <a:latin typeface="Courier New" panose="02070309020205020404" pitchFamily="49" charset="0"/>
+                <a:cs typeface="Courier New" panose="02070309020205020404" pitchFamily="49" charset="0"/>
+              </a:rPr>
               <a:t>/</a:t>
             </a:r>
             <a:r>
-              <a:rPr lang="en-US" sz="1600" dirty="0" err="1"/>
+              <a:rPr lang="en-US" sz="1600" b="1" dirty="0" err="1">
+                <a:latin typeface="Courier New" panose="02070309020205020404" pitchFamily="49" charset="0"/>
+                <a:cs typeface="Courier New" panose="02070309020205020404" pitchFamily="49" charset="0"/>
+              </a:rPr>
               <a:t>afile.txt</a:t>
             </a:r>
             <a:r>
-              <a:rPr lang="en-US" sz="1600" dirty="0"/>
+              <a:rPr lang="en-US" sz="1600" b="1" dirty="0">
+                <a:latin typeface="Courier New" panose="02070309020205020404" pitchFamily="49" charset="0"/>
+                <a:cs typeface="Courier New" panose="02070309020205020404" pitchFamily="49" charset="0"/>
+              </a:rPr>
               <a:t> --&gt; /</a:t>
             </a:r>
             <a:r>
-              <a:rPr lang="en-US" sz="1600" dirty="0" err="1"/>
+              <a:rPr lang="en-US" sz="1600" b="1" dirty="0" err="1">
+                <a:latin typeface="Courier New" panose="02070309020205020404" pitchFamily="49" charset="0"/>
+                <a:cs typeface="Courier New" panose="02070309020205020404" pitchFamily="49" charset="0"/>
+              </a:rPr>
               <a:t>tmp</a:t>
             </a:r>
             <a:r>
-              <a:rPr lang="en-US" sz="1600" dirty="0"/>
+              <a:rPr lang="en-US" sz="1600" b="1" dirty="0">
+                <a:latin typeface="Courier New" panose="02070309020205020404" pitchFamily="49" charset="0"/>
+                <a:cs typeface="Courier New" panose="02070309020205020404" pitchFamily="49" charset="0"/>
+              </a:rPr>
               <a:t>/</a:t>
             </a:r>
             <a:r>
-              <a:rPr lang="en-US" sz="1600" dirty="0" err="1"/>
+              <a:rPr lang="en-US" sz="1600" b="1" dirty="0" err="1">
+                <a:latin typeface="Courier New" panose="02070309020205020404" pitchFamily="49" charset="0"/>
+                <a:cs typeface="Courier New" panose="02070309020205020404" pitchFamily="49" charset="0"/>
+              </a:rPr>
               <a:t>afile</a:t>
             </a:r>
             <a:br>
@@ -9291,32 +9401,55 @@
             </a:r>
             <a:r>
               <a:rPr lang="en-US" sz="1600" dirty="0"/>
-              <a:t> /</a:t>
-            </a:r>
-            <a:r>
-              <a:rPr lang="en-US" sz="1600" dirty="0" err="1"/>
+              <a:t> </a:t>
+            </a:r>
+            <a:r>
+              <a:rPr lang="en-US" sz="1600" b="1" dirty="0">
+                <a:latin typeface="Courier New" panose="02070309020205020404" pitchFamily="49" charset="0"/>
+                <a:cs typeface="Courier New" panose="02070309020205020404" pitchFamily="49" charset="0"/>
+              </a:rPr>
+              <a:t>/</a:t>
+            </a:r>
+            <a:r>
+              <a:rPr lang="en-US" sz="1600" b="1" dirty="0" err="1">
+                <a:latin typeface="Courier New" panose="02070309020205020404" pitchFamily="49" charset="0"/>
+                <a:cs typeface="Courier New" panose="02070309020205020404" pitchFamily="49" charset="0"/>
+              </a:rPr>
               <a:t>tmp</a:t>
             </a:r>
             <a:r>
-              <a:rPr lang="en-US" sz="1600" dirty="0"/>
+              <a:rPr lang="en-US" sz="1600" b="1" dirty="0">
+                <a:latin typeface="Courier New" panose="02070309020205020404" pitchFamily="49" charset="0"/>
+                <a:cs typeface="Courier New" panose="02070309020205020404" pitchFamily="49" charset="0"/>
+              </a:rPr>
               <a:t>/</a:t>
             </a:r>
             <a:r>
-              <a:rPr lang="en-US" sz="1600" dirty="0" err="1"/>
+              <a:rPr lang="en-US" sz="1600" b="1" dirty="0" err="1">
+                <a:latin typeface="Courier New" panose="02070309020205020404" pitchFamily="49" charset="0"/>
+                <a:cs typeface="Courier New" panose="02070309020205020404" pitchFamily="49" charset="0"/>
+              </a:rPr>
               <a:t>afile.txt</a:t>
             </a:r>
             <a:r>
-              <a:rPr lang="en-US" sz="1600" dirty="0"/>
+              <a:rPr lang="en-US" sz="1600" b="1" dirty="0">
+                <a:latin typeface="Courier New" panose="02070309020205020404" pitchFamily="49" charset="0"/>
+                <a:cs typeface="Courier New" panose="02070309020205020404" pitchFamily="49" charset="0"/>
+              </a:rPr>
               <a:t> </a:t>
             </a:r>
             <a:r>
-              <a:rPr lang="en-US" sz="1600" dirty="0">
+              <a:rPr lang="en-US" sz="1600" b="1" dirty="0">
+                <a:latin typeface="Courier New" panose="02070309020205020404" pitchFamily="49" charset="0"/>
+                <a:cs typeface="Courier New" panose="02070309020205020404" pitchFamily="49" charset="0"/>
                 <a:sym typeface="Wingdings" pitchFamily="2" charset="2"/>
               </a:rPr>
               <a:t>--&gt; </a:t>
             </a:r>
             <a:r>
-              <a:rPr lang="en-US" sz="1600" dirty="0" err="1">
+              <a:rPr lang="en-US" sz="1600" b="1" dirty="0" err="1">
+                <a:latin typeface="Courier New" panose="02070309020205020404" pitchFamily="49" charset="0"/>
+                <a:cs typeface="Courier New" panose="02070309020205020404" pitchFamily="49" charset="0"/>
                 <a:sym typeface="Wingdings" pitchFamily="2" charset="2"/>
               </a:rPr>
               <a:t>afile.txt</a:t>
@@ -9545,7 +9678,7 @@
         </p:nvSpPr>
         <p:spPr>
           <a:xfrm>
-            <a:off x="311700" y="1152475"/>
+            <a:off x="311700" y="1218841"/>
             <a:ext cx="8520600" cy="3416400"/>
           </a:xfrm>
           <a:prstGeom prst="rect">
@@ -9814,7 +9947,7 @@
             </a:br>
             <a:r>
               <a:rPr lang="en-US" sz="1600" dirty="0"/>
-              <a:t>0 means as many jobs as possible, default is all cores on a machine. May be provided as %. Silently ignore if value is greater than cores available.</a:t>
+              <a:t>0 means as many jobs as possible, default is all cores on a machine. May be provided as %. Silently ignores if value is greater than cores available.</a:t>
             </a:r>
             <a:br>
               <a:rPr lang="en-US" sz="1600" dirty="0"/>
@@ -9895,23 +10028,7 @@
             <a:br>
               <a:rPr lang="en-US" sz="1600" dirty="0"/>
             </a:br>
-            <a:r>
-              <a:rPr lang="en-US" sz="1600" dirty="0"/>
-              <a:t>Use </a:t>
-            </a:r>
-            <a:r>
-              <a:rPr lang="en-US" sz="1600" b="1" dirty="0">
-                <a:latin typeface="Courier New"/>
-                <a:ea typeface="Courier New"/>
-                <a:cs typeface="Courier New"/>
-                <a:sym typeface="Courier New"/>
-              </a:rPr>
-              <a:t>-N0</a:t>
-            </a:r>
-            <a:r>
-              <a:rPr lang="en-US" sz="1600" dirty="0"/>
-              <a:t> when no arguments</a:t>
-            </a:r>
+            <a:endParaRPr lang="en-US" sz="1600" dirty="0"/>
           </a:p>
         </p:txBody>
       </p:sp>
@@ -10429,7 +10546,11 @@
             </a:r>
             <a:r>
               <a:rPr lang="en-US" sz="1600" dirty="0"/>
-              <a:t>: show what will run in standard output but will not run anything</a:t>
+              <a:t>: show what will run in standard output but will not run anything, </a:t>
+            </a:r>
+            <a:r>
+              <a:rPr lang="en-US" sz="1600" b="1" dirty="0"/>
+              <a:t>very useful</a:t>
             </a:r>
           </a:p>
         </p:txBody>
@@ -10728,16 +10849,34 @@
               <a:buNone/>
             </a:pPr>
             <a:r>
-              <a:rPr lang="en-US" b="1">
+              <a:rPr lang="en-US" b="1" dirty="0">
                 <a:latin typeface="Courier New"/>
                 <a:ea typeface="Courier New"/>
                 <a:cs typeface="Courier New"/>
                 <a:sym typeface="Courier New"/>
               </a:rPr>
-              <a:t>--joblog, --resume</a:t>
-            </a:r>
-            <a:r>
-              <a:rPr lang="en-US"/>
+              <a:t>--</a:t>
+            </a:r>
+            <a:r>
+              <a:rPr lang="en-US" b="1" dirty="0" err="1">
+                <a:latin typeface="Courier New"/>
+                <a:ea typeface="Courier New"/>
+                <a:cs typeface="Courier New"/>
+                <a:sym typeface="Courier New"/>
+              </a:rPr>
+              <a:t>joblog</a:t>
+            </a:r>
+            <a:r>
+              <a:rPr lang="en-US" b="1" dirty="0">
+                <a:latin typeface="Courier New"/>
+                <a:ea typeface="Courier New"/>
+                <a:cs typeface="Courier New"/>
+                <a:sym typeface="Courier New"/>
+              </a:rPr>
+              <a:t>, --resume</a:t>
+            </a:r>
+            <a:r>
+              <a:rPr lang="en-US" dirty="0"/>
               <a:t>: Allows for monitoring progress, checkpointing and resuming an interrupted / partially failed run</a:t>
             </a:r>
           </a:p>
@@ -10750,14 +10889,101 @@
               <a:buNone/>
             </a:pPr>
             <a:r>
-              <a:rPr lang="en-US" b="1">
+              <a:rPr lang="en-US" b="1" dirty="0">
                 <a:latin typeface="Courier New"/>
                 <a:ea typeface="Courier New"/>
                 <a:cs typeface="Courier New"/>
                 <a:sym typeface="Courier New"/>
               </a:rPr>
-              <a:t>parallel -j 16 -n 100 --joblog /tmp/job.log --resume gen_digest {} :::: keys.txt</a:t>
-            </a:r>
+              <a:t>parallel -j 16 -N 100 --</a:t>
+            </a:r>
+            <a:r>
+              <a:rPr lang="en-US" b="1" dirty="0" err="1">
+                <a:latin typeface="Courier New"/>
+                <a:ea typeface="Courier New"/>
+                <a:cs typeface="Courier New"/>
+                <a:sym typeface="Courier New"/>
+              </a:rPr>
+              <a:t>joblog</a:t>
+            </a:r>
+            <a:r>
+              <a:rPr lang="en-US" b="1" dirty="0">
+                <a:latin typeface="Courier New"/>
+                <a:ea typeface="Courier New"/>
+                <a:cs typeface="Courier New"/>
+                <a:sym typeface="Courier New"/>
+              </a:rPr>
+              <a:t> /</a:t>
+            </a:r>
+            <a:r>
+              <a:rPr lang="en-US" b="1" dirty="0" err="1">
+                <a:latin typeface="Courier New"/>
+                <a:ea typeface="Courier New"/>
+                <a:cs typeface="Courier New"/>
+                <a:sym typeface="Courier New"/>
+              </a:rPr>
+              <a:t>tmp</a:t>
+            </a:r>
+            <a:r>
+              <a:rPr lang="en-US" b="1" dirty="0">
+                <a:latin typeface="Courier New"/>
+                <a:ea typeface="Courier New"/>
+                <a:cs typeface="Courier New"/>
+                <a:sym typeface="Courier New"/>
+              </a:rPr>
+              <a:t>/</a:t>
+            </a:r>
+            <a:r>
+              <a:rPr lang="en-US" b="1" dirty="0" err="1">
+                <a:latin typeface="Courier New"/>
+                <a:ea typeface="Courier New"/>
+                <a:cs typeface="Courier New"/>
+                <a:sym typeface="Courier New"/>
+              </a:rPr>
+              <a:t>job.log</a:t>
+            </a:r>
+            <a:r>
+              <a:rPr lang="en-US" b="1" dirty="0">
+                <a:latin typeface="Courier New"/>
+                <a:ea typeface="Courier New"/>
+                <a:cs typeface="Courier New"/>
+                <a:sym typeface="Courier New"/>
+              </a:rPr>
+              <a:t> --resume </a:t>
+            </a:r>
+            <a:r>
+              <a:rPr lang="en-US" b="1" dirty="0" err="1">
+                <a:latin typeface="Courier New"/>
+                <a:ea typeface="Courier New"/>
+                <a:cs typeface="Courier New"/>
+                <a:sym typeface="Courier New"/>
+              </a:rPr>
+              <a:t>gzip</a:t>
+            </a:r>
+            <a:r>
+              <a:rPr lang="en-US" b="1" dirty="0">
+                <a:latin typeface="Courier New"/>
+                <a:ea typeface="Courier New"/>
+                <a:cs typeface="Courier New"/>
+                <a:sym typeface="Courier New"/>
+              </a:rPr>
+              <a:t> {} :::: </a:t>
+            </a:r>
+            <a:r>
+              <a:rPr lang="en-US" b="1" dirty="0" err="1">
+                <a:latin typeface="Courier New"/>
+                <a:ea typeface="Courier New"/>
+                <a:cs typeface="Courier New"/>
+                <a:sym typeface="Courier New"/>
+              </a:rPr>
+              <a:t>filelist.txt</a:t>
+            </a:r>
+            <a:endParaRPr lang="en-US" b="1" dirty="0">
+              <a:latin typeface="Courier New"/>
+              <a:ea typeface="Courier New"/>
+              <a:cs typeface="Courier New"/>
+              <a:sym typeface="Courier New"/>
+            </a:endParaRPr>
           </a:p>
           <a:p>
             <a:pPr marL="0" indent="0">
@@ -10768,11 +10994,11 @@
               <a:buNone/>
             </a:pPr>
             <a:r>
-              <a:rPr lang="en-US"/>
+              <a:rPr lang="en-US" dirty="0"/>
               <a:t>Additionally, </a:t>
             </a:r>
             <a:r>
-              <a:rPr lang="en-US" b="1">
+              <a:rPr lang="en-US" b="1" dirty="0">
                 <a:latin typeface="Courier New"/>
                 <a:ea typeface="Courier New"/>
                 <a:cs typeface="Courier New"/>
@@ -10781,11 +11007,11 @@
               <a:t>--retry-failed</a:t>
             </a:r>
             <a:r>
-              <a:rPr lang="en-US"/>
+              <a:rPr lang="en-US" dirty="0"/>
               <a:t> (reads from log) and </a:t>
             </a:r>
             <a:r>
-              <a:rPr lang="en-US" b="1">
+              <a:rPr lang="en-US" b="1" dirty="0">
                 <a:latin typeface="Courier New"/>
                 <a:ea typeface="Courier New"/>
                 <a:cs typeface="Courier New"/>
@@ -10794,22 +11020,9 @@
               <a:t>--resume-failed</a:t>
             </a:r>
             <a:r>
-              <a:rPr lang="en-US"/>
+              <a:rPr lang="en-US" dirty="0"/>
               <a:t> (resumes afresh) to try failed jobs again. </a:t>
             </a:r>
-          </a:p>
-          <a:p>
-            <a:pPr marL="0" indent="0">
-              <a:spcBef>
-                <a:spcPts val="1200"/>
-              </a:spcBef>
-              <a:spcAft>
-                <a:spcPts val="1200"/>
-              </a:spcAft>
-              <a:buFont typeface="Arial" panose="020B0604020202020204" pitchFamily="34" charset="0"/>
-              <a:buNone/>
-            </a:pPr>
-            <a:endParaRPr lang="en-US" dirty="0"/>
           </a:p>
         </p:txBody>
       </p:sp>
@@ -10911,16 +11124,23 @@
                 <a:latin typeface="Courier New" panose="02070309020205020404" pitchFamily="49" charset="0"/>
                 <a:cs typeface="Courier New" panose="02070309020205020404" pitchFamily="49" charset="0"/>
               </a:rPr>
-              <a:t>parallel --files echo ::: A B C # will be saved in /</a:t>
-            </a:r>
-            <a:r>
-              <a:rPr lang="en-US" sz="1640" b="1" dirty="0" err="1">
+              <a:t>parallel --files echo ::: A B C </a:t>
+            </a:r>
+            <a:r>
+              <a:rPr lang="en-US" sz="1640" dirty="0">
+                <a:latin typeface="Courier New" panose="02070309020205020404" pitchFamily="49" charset="0"/>
+                <a:cs typeface="Courier New" panose="02070309020205020404" pitchFamily="49" charset="0"/>
+              </a:rPr>
+              <a:t># will be saved in /</a:t>
+            </a:r>
+            <a:r>
+              <a:rPr lang="en-US" sz="1640" dirty="0" err="1">
                 <a:latin typeface="Courier New" panose="02070309020205020404" pitchFamily="49" charset="0"/>
                 <a:cs typeface="Courier New" panose="02070309020205020404" pitchFamily="49" charset="0"/>
               </a:rPr>
               <a:t>tmp</a:t>
             </a:r>
-            <a:endParaRPr lang="en-US" sz="1640" b="1" dirty="0">
+            <a:endParaRPr lang="en-US" sz="1640" dirty="0">
               <a:latin typeface="Courier New" panose="02070309020205020404" pitchFamily="49" charset="0"/>
               <a:cs typeface="Courier New" panose="02070309020205020404" pitchFamily="49" charset="0"/>
             </a:endParaRPr>
@@ -11039,17 +11259,24 @@
                 <a:latin typeface="Courier New" panose="02070309020205020404" pitchFamily="49" charset="0"/>
                 <a:cs typeface="Courier New" panose="02070309020205020404" pitchFamily="49" charset="0"/>
               </a:rPr>
-              <a:t> --install # activate </a:t>
-            </a:r>
-            <a:r>
-              <a:rPr lang="en-US" sz="1800" b="1" dirty="0" err="1">
+              <a:t> --install </a:t>
+            </a:r>
+            <a:r>
+              <a:rPr lang="en-US" sz="1800" dirty="0">
+                <a:latin typeface="Courier New" panose="02070309020205020404" pitchFamily="49" charset="0"/>
+                <a:cs typeface="Courier New" panose="02070309020205020404" pitchFamily="49" charset="0"/>
+              </a:rPr>
+              <a:t># activate </a:t>
+            </a:r>
+            <a:r>
+              <a:rPr lang="en-US" sz="1800" dirty="0" err="1">
                 <a:latin typeface="Courier New" panose="02070309020205020404" pitchFamily="49" charset="0"/>
                 <a:cs typeface="Courier New" panose="02070309020205020404" pitchFamily="49" charset="0"/>
               </a:rPr>
               <a:t>parset</a:t>
             </a:r>
             <a:r>
-              <a:rPr lang="en-US" sz="1800" b="1" dirty="0">
+              <a:rPr lang="en-US" sz="1800" dirty="0">
                 <a:latin typeface="Courier New" panose="02070309020205020404" pitchFamily="49" charset="0"/>
                 <a:cs typeface="Courier New" panose="02070309020205020404" pitchFamily="49" charset="0"/>
               </a:rPr>
@@ -11531,6 +11758,16 @@
             <a:br>
               <a:rPr lang="en-US" dirty="0"/>
             </a:br>
+            <a:r>
+              <a:rPr lang="en-US" sz="1650" b="1" dirty="0">
+                <a:latin typeface="Courier New" panose="02070309020205020404" pitchFamily="49" charset="0"/>
+                <a:cs typeface="Courier New" panose="02070309020205020404" pitchFamily="49" charset="0"/>
+              </a:rPr>
+              <a:t>-N256</a:t>
+            </a:r>
+            <a:br>
+              <a:rPr lang="en-US" dirty="0"/>
+            </a:br>
             <a:br>
               <a:rPr lang="en-US" dirty="0"/>
             </a:br>
@@ -11700,7 +11937,20 @@
                 <a:latin typeface="Courier New" panose="02070309020205020404" pitchFamily="49" charset="0"/>
                 <a:cs typeface="Courier New" panose="02070309020205020404" pitchFamily="49" charset="0"/>
               </a:rPr>
-              <a:t>--nice 17</a:t>
+              <a:t>--nice 17 </a:t>
+            </a:r>
+            <a:br>
+              <a:rPr lang="en-US" sz="1640" b="1" dirty="0">
+                <a:latin typeface="Courier New" panose="02070309020205020404" pitchFamily="49" charset="0"/>
+                <a:cs typeface="Courier New" panose="02070309020205020404" pitchFamily="49" charset="0"/>
+              </a:rPr>
+            </a:br>
+            <a:r>
+              <a:rPr lang="en-US" sz="1640" b="1" dirty="0">
+                <a:latin typeface="Courier New" panose="02070309020205020404" pitchFamily="49" charset="0"/>
+                <a:cs typeface="Courier New" panose="02070309020205020404" pitchFamily="49" charset="0"/>
+              </a:rPr>
+              <a:t>-N100</a:t>
             </a:r>
           </a:p>
           <a:p>
@@ -11753,7 +12003,28 @@
               </a:rPr>
               <a:t>vv</a:t>
             </a:r>
-            <a:endParaRPr lang="en-US" sz="1640" b="1" dirty="0">
+            <a:r>
+              <a:rPr lang="en-US" sz="1640" b="1" dirty="0">
+                <a:latin typeface="Courier New" panose="02070309020205020404" pitchFamily="49" charset="0"/>
+                <a:cs typeface="Courier New" panose="02070309020205020404" pitchFamily="49" charset="0"/>
+              </a:rPr>
+              <a:t> </a:t>
+            </a:r>
+            <a:r>
+              <a:rPr lang="en-US" sz="1640" dirty="0">
+                <a:latin typeface="Courier New" panose="02070309020205020404" pitchFamily="49" charset="0"/>
+                <a:cs typeface="Courier New" panose="02070309020205020404" pitchFamily="49" charset="0"/>
+              </a:rPr>
+              <a:t># useful when used with </a:t>
+            </a:r>
+            <a:r>
+              <a:rPr lang="en-US" sz="1640" dirty="0" err="1">
+                <a:latin typeface="Courier New" panose="02070309020205020404" pitchFamily="49" charset="0"/>
+                <a:cs typeface="Courier New" panose="02070309020205020404" pitchFamily="49" charset="0"/>
+              </a:rPr>
+              <a:t>ssh</a:t>
+            </a:r>
+            <a:endParaRPr lang="en-US" sz="1640" dirty="0">
               <a:latin typeface="Courier New" panose="02070309020205020404" pitchFamily="49" charset="0"/>
               <a:cs typeface="Courier New" panose="02070309020205020404" pitchFamily="49" charset="0"/>
             </a:endParaRPr>
@@ -13801,7 +14072,7 @@
                 <a:latin typeface="Courier New" panose="02070309020205020404" pitchFamily="49" charset="0"/>
                 <a:cs typeface="Courier New" panose="02070309020205020404" pitchFamily="49" charset="0"/>
               </a:rPr>
-              <a:t>parallel -k -S rage1,rage4,rage7,rage8,rage9,rage10,rage11,rage12 ${</a:t>
+              <a:t>parallel -S rage1,rage4,rage7,rage8,rage9,rage10,rage11,rage12 ${</a:t>
             </a:r>
             <a:r>
               <a:rPr lang="en-US" sz="1640" b="1" dirty="0" err="1">
@@ -14199,7 +14470,7 @@
                 <a:latin typeface="Courier New" panose="02070309020205020404" pitchFamily="49" charset="0"/>
                 <a:cs typeface="Courier New" panose="02070309020205020404" pitchFamily="49" charset="0"/>
               </a:rPr>
-              <a:t> :::\ {28..35} \</a:t>
+              <a:t> ::: {28..35} \</a:t>
             </a:r>
             <a:br>
               <a:rPr lang="en-US" sz="1640" b="1" dirty="0">
@@ -14462,7 +14733,7 @@
           <a:p>
             <a:r>
               <a:rPr lang="en-US" dirty="0"/>
-              <a:t>When data is send over a Linux pipe to parallel command, it is treated as </a:t>
+              <a:t>When data is sent over a Linux pipe to parallel command, it is treated as </a:t>
             </a:r>
             <a:r>
               <a:rPr lang="en-US" b="1" dirty="0"/>
@@ -14500,7 +14771,7 @@
           <a:p>
             <a:r>
               <a:rPr lang="en-US" dirty="0"/>
-              <a:t>In the pipe mode, the data is delivered to the parallel command as </a:t>
+              <a:t>In the pipe mode, the data is delivered to the parallel command as standard input aka </a:t>
             </a:r>
             <a:r>
               <a:rPr lang="en-US" b="1" dirty="0"/>
@@ -14599,20 +14870,7 @@
                 <a:latin typeface="Courier New" panose="02070309020205020404" pitchFamily="49" charset="0"/>
                 <a:cs typeface="Courier New" panose="02070309020205020404" pitchFamily="49" charset="0"/>
               </a:rPr>
-              <a:t> -l \ </a:t>
-            </a:r>
-            <a:br>
-              <a:rPr lang="en-US" sz="1800" b="1" dirty="0">
-                <a:latin typeface="Courier New" panose="02070309020205020404" pitchFamily="49" charset="0"/>
-                <a:cs typeface="Courier New" panose="02070309020205020404" pitchFamily="49" charset="0"/>
-              </a:rPr>
-            </a:br>
-            <a:r>
-              <a:rPr lang="en-US" sz="1800" b="1" dirty="0">
-                <a:latin typeface="Courier New" panose="02070309020205020404" pitchFamily="49" charset="0"/>
-                <a:cs typeface="Courier New" panose="02070309020205020404" pitchFamily="49" charset="0"/>
-              </a:rPr>
-              <a:t>  # -N &lt;num&gt; for lines</a:t>
+              <a:t> -l</a:t>
             </a:r>
           </a:p>
         </p:txBody>
@@ -16186,7 +16444,7 @@
                 <a:latin typeface="Courier New" panose="02070309020205020404" pitchFamily="49" charset="0"/>
                 <a:cs typeface="Courier New" panose="02070309020205020404" pitchFamily="49" charset="0"/>
               </a:rPr>
-              <a:t> parallel --jobs 6 ./</a:t>
+              <a:t> parallel --jobs 8 ./</a:t>
             </a:r>
             <a:r>
               <a:rPr lang="en-US" b="1" dirty="0" err="1">
@@ -16209,13 +16467,10 @@
               </a:rPr>
               <a:t>input.txt</a:t>
             </a:r>
-            <a:r>
-              <a:rPr lang="en-US" b="1" dirty="0">
-                <a:latin typeface="Courier New" panose="02070309020205020404" pitchFamily="49" charset="0"/>
-                <a:cs typeface="Courier New" panose="02070309020205020404" pitchFamily="49" charset="0"/>
-              </a:rPr>
-              <a:t> </a:t>
-            </a:r>
+            <a:endParaRPr lang="en-US" b="1" dirty="0">
+              <a:latin typeface="Courier New" panose="02070309020205020404" pitchFamily="49" charset="0"/>
+              <a:cs typeface="Courier New" panose="02070309020205020404" pitchFamily="49" charset="0"/>
+            </a:endParaRPr>
           </a:p>
         </p:txBody>
       </p:sp>
@@ -16509,30 +16764,7 @@
                 <a:latin typeface="Courier New" panose="02070309020205020404" pitchFamily="49" charset="0"/>
                 <a:cs typeface="Courier New" panose="02070309020205020404" pitchFamily="49" charset="0"/>
               </a:rPr>
-              <a:t>parallel -j $SLURM_NTASKS &lt; </a:t>
-            </a:r>
-            <a:r>
-              <a:rPr lang="en-US" sz="1640" b="1" dirty="0" err="1">
-                <a:latin typeface="Courier New" panose="02070309020205020404" pitchFamily="49" charset="0"/>
-                <a:cs typeface="Courier New" panose="02070309020205020404" pitchFamily="49" charset="0"/>
-              </a:rPr>
-              <a:t>commands.txt</a:t>
-            </a:r>
-            <a:endParaRPr lang="en-US" sz="1640" b="1" dirty="0">
-              <a:latin typeface="Courier New" panose="02070309020205020404" pitchFamily="49" charset="0"/>
-              <a:cs typeface="Courier New" panose="02070309020205020404" pitchFamily="49" charset="0"/>
-            </a:endParaRPr>
-          </a:p>
-          <a:p>
-            <a:pPr marL="0" indent="0">
-              <a:buNone/>
-            </a:pPr>
-            <a:r>
-              <a:rPr lang="en-US" sz="1640" dirty="0">
-                <a:latin typeface="Courier New" panose="02070309020205020404" pitchFamily="49" charset="0"/>
-                <a:cs typeface="Courier New" panose="02070309020205020404" pitchFamily="49" charset="0"/>
-              </a:rPr>
-              <a:t>#OR</a:t>
+              <a:t>##OR</a:t>
             </a:r>
           </a:p>
           <a:p>
@@ -16618,6 +16850,12 @@
             <a:pPr marL="0" indent="0">
               <a:buNone/>
             </a:pPr>
+            <a:br>
+              <a:rPr lang="en-US" sz="1640" b="1" dirty="0">
+                <a:latin typeface="Courier New" panose="02070309020205020404" pitchFamily="49" charset="0"/>
+                <a:cs typeface="Courier New" panose="02070309020205020404" pitchFamily="49" charset="0"/>
+              </a:rPr>
+            </a:br>
             <a:r>
               <a:rPr lang="en-US" sz="1640" b="1" dirty="0">
                 <a:latin typeface="Courier New" panose="02070309020205020404" pitchFamily="49" charset="0"/>
@@ -16981,6 +17219,67 @@
               <a:t>45</a:t>
             </a:fld>
             <a:endParaRPr lang="en-US"/>
+          </a:p>
+        </p:txBody>
+      </p:sp>
+      <p:sp>
+        <p:nvSpPr>
+          <p:cNvPr id="5" name="TextBox 4">
+            <a:extLst>
+              <a:ext uri="{FF2B5EF4-FFF2-40B4-BE49-F238E27FC236}">
+                <a16:creationId xmlns:a16="http://schemas.microsoft.com/office/drawing/2014/main" id="{5E8B5B6C-8F38-D883-6B61-D1D2D3FE135D}"/>
+              </a:ext>
+            </a:extLst>
+          </p:cNvPr>
+          <p:cNvSpPr txBox="1"/>
+          <p:nvPr/>
+        </p:nvSpPr>
+        <p:spPr>
+          <a:xfrm>
+            <a:off x="5412285" y="1411630"/>
+            <a:ext cx="3000630" cy="369332"/>
+          </a:xfrm>
+          <a:prstGeom prst="rect">
+            <a:avLst/>
+          </a:prstGeom>
+          <a:noFill/>
+          <a:ln>
+            <a:solidFill>
+              <a:schemeClr val="accent1"/>
+            </a:solidFill>
+          </a:ln>
+        </p:spPr>
+        <p:txBody>
+          <a:bodyPr wrap="none" rtlCol="0">
+            <a:spAutoFit/>
+          </a:bodyPr>
+          <a:lstStyle/>
+          <a:p>
+            <a:r>
+              <a:rPr lang="en-US" dirty="0"/>
+              <a:t>code in </a:t>
+            </a:r>
+            <a:r>
+              <a:rPr lang="en-US" dirty="0" err="1"/>
+              <a:t>Github</a:t>
+            </a:r>
+            <a:r>
+              <a:rPr lang="en-US" dirty="0"/>
+              <a:t>: </a:t>
+            </a:r>
+            <a:r>
+              <a:rPr lang="en-US" dirty="0" err="1"/>
+              <a:t>src</a:t>
+            </a:r>
+            <a:r>
+              <a:rPr lang="en-US" dirty="0"/>
+              <a:t>/</a:t>
+            </a:r>
+            <a:r>
+              <a:rPr lang="en-US" dirty="0" err="1"/>
+              <a:t>multinode</a:t>
+            </a:r>
+            <a:endParaRPr lang="en-US" dirty="0"/>
           </a:p>
         </p:txBody>
       </p:sp>
@@ -18135,7 +18434,7 @@
               <a:rPr lang="en-US" dirty="0">
                 <a:latin typeface="National Park " pitchFamily="2" charset="77"/>
               </a:rPr>
-              <a:t>A Full DAG Workflow Example</a:t>
+              <a:t>A DAG Workflow Example</a:t>
             </a:r>
           </a:p>
         </p:txBody>
@@ -19055,7 +19354,7 @@
         <p:spPr>
           <a:xfrm>
             <a:off x="2013154" y="4771108"/>
-            <a:ext cx="4182235" cy="369332"/>
+            <a:ext cx="3906519" cy="369332"/>
           </a:xfrm>
           <a:prstGeom prst="rect">
             <a:avLst/>
@@ -19070,7 +19369,7 @@
           <a:p>
             <a:r>
               <a:rPr lang="en-US" dirty="0"/>
-              <a:t>All sources available in </a:t>
+              <a:t>Sources available in </a:t>
             </a:r>
             <a:r>
               <a:rPr lang="en-US" dirty="0" err="1"/>
@@ -21119,7 +21418,14 @@
                 <a:latin typeface="Courier New" panose="02070309020205020404" pitchFamily="49" charset="0"/>
                 <a:cs typeface="Courier New" panose="02070309020205020404" pitchFamily="49" charset="0"/>
               </a:rPr>
-              <a:t>/^&gt;/ {</a:t>
+              <a:t>/^&gt;/ </a:t>
+            </a:r>
+            <a:r>
+              <a:rPr lang="en-US" b="1" dirty="0">
+                <a:latin typeface="Courier New" panose="02070309020205020404" pitchFamily="49" charset="0"/>
+                <a:cs typeface="Courier New" panose="02070309020205020404" pitchFamily="49" charset="0"/>
+              </a:rPr>
+              <a:t>{</a:t>
             </a:r>
             <a:br>
               <a:rPr lang="en-US" dirty="0">
@@ -21199,7 +21505,21 @@
                 <a:latin typeface="Courier New" panose="02070309020205020404" pitchFamily="49" charset="0"/>
                 <a:cs typeface="Courier New" panose="02070309020205020404" pitchFamily="49" charset="0"/>
               </a:rPr>
-              <a:t>       print &gt;&gt; file; n++; next;</a:t>
+              <a:t>       print &gt;&gt; file; n++; </a:t>
+            </a:r>
+            <a:r>
+              <a:rPr lang="en-US" b="1" dirty="0">
+                <a:latin typeface="Courier New" panose="02070309020205020404" pitchFamily="49" charset="0"/>
+                <a:cs typeface="Courier New" panose="02070309020205020404" pitchFamily="49" charset="0"/>
+              </a:rPr>
+              <a:t>next</a:t>
+            </a:r>
+            <a:r>
+              <a:rPr lang="en-US" dirty="0">
+                <a:latin typeface="Courier New" panose="02070309020205020404" pitchFamily="49" charset="0"/>
+                <a:cs typeface="Courier New" panose="02070309020205020404" pitchFamily="49" charset="0"/>
+              </a:rPr>
+              <a:t>;</a:t>
             </a:r>
             <a:br>
               <a:rPr lang="en-US" dirty="0">
@@ -21212,7 +21532,14 @@
                 <a:latin typeface="Courier New" panose="02070309020205020404" pitchFamily="49" charset="0"/>
                 <a:cs typeface="Courier New" panose="02070309020205020404" pitchFamily="49" charset="0"/>
               </a:rPr>
-              <a:t>     }</a:t>
+              <a:t>     </a:t>
+            </a:r>
+            <a:r>
+              <a:rPr lang="en-US" b="1" dirty="0">
+                <a:latin typeface="Courier New" panose="02070309020205020404" pitchFamily="49" charset="0"/>
+                <a:cs typeface="Courier New" panose="02070309020205020404" pitchFamily="49" charset="0"/>
+              </a:rPr>
+              <a:t>}</a:t>
             </a:r>
             <a:br>
               <a:rPr lang="en-US" dirty="0">
@@ -21221,11 +21548,32 @@
               </a:rPr>
             </a:br>
             <a:r>
+              <a:rPr lang="en-US" b="1" dirty="0">
+                <a:latin typeface="Courier New" panose="02070309020205020404" pitchFamily="49" charset="0"/>
+                <a:cs typeface="Courier New" panose="02070309020205020404" pitchFamily="49" charset="0"/>
+              </a:rPr>
+              <a:t>{</a:t>
+            </a:r>
+            <a:r>
               <a:rPr lang="en-US" dirty="0">
                 <a:latin typeface="Courier New" panose="02070309020205020404" pitchFamily="49" charset="0"/>
                 <a:cs typeface="Courier New" panose="02070309020205020404" pitchFamily="49" charset="0"/>
               </a:rPr>
-              <a:t>{ print &gt;&gt; file; }' &lt; </a:t>
+              <a:t> print &gt;&gt; file; </a:t>
+            </a:r>
+            <a:r>
+              <a:rPr lang="en-US" b="1" dirty="0">
+                <a:latin typeface="Courier New" panose="02070309020205020404" pitchFamily="49" charset="0"/>
+                <a:cs typeface="Courier New" panose="02070309020205020404" pitchFamily="49" charset="0"/>
+              </a:rPr>
+              <a:t>}</a:t>
+            </a:r>
+            <a:r>
+              <a:rPr lang="en-US" dirty="0">
+                <a:latin typeface="Courier New" panose="02070309020205020404" pitchFamily="49" charset="0"/>
+                <a:cs typeface="Courier New" panose="02070309020205020404" pitchFamily="49" charset="0"/>
+              </a:rPr>
+              <a:t>' &lt; </a:t>
             </a:r>
             <a:r>
               <a:rPr lang="en-US" dirty="0" err="1">
@@ -22091,7 +22439,7 @@
               <a:rPr lang="en-US" dirty="0">
                 <a:latin typeface="National Park " pitchFamily="2" charset="77"/>
               </a:rPr>
-              <a:t>Slides and practice data for download</a:t>
+              <a:t>Slides and Practice Data for Download</a:t>
             </a:r>
           </a:p>
         </p:txBody>
@@ -22115,7 +22463,7 @@
         <p:spPr/>
         <p:txBody>
           <a:bodyPr>
-            <a:normAutofit/>
+            <a:normAutofit lnSpcReduction="10000"/>
           </a:bodyPr>
           <a:lstStyle/>
           <a:p>
@@ -22132,12 +22480,27 @@
               <a:buNone/>
             </a:pPr>
             <a:r>
-              <a:rPr lang="en-US" sz="2000" dirty="0">
+              <a:rPr lang="en-US" sz="2600" dirty="0">
                 <a:hlinkClick r:id="rId2"/>
               </a:rPr>
               <a:t>github.com/ketancmaheshwari/escience23tut</a:t>
             </a:r>
-            <a:endParaRPr lang="en-US" sz="2000" dirty="0"/>
+            <a:endParaRPr lang="en-US" sz="2600" dirty="0"/>
+          </a:p>
+          <a:p>
+            <a:pPr marL="0" indent="0">
+              <a:buNone/>
+            </a:pPr>
+            <a:r>
+              <a:rPr lang="en-US" sz="4000" dirty="0">
+                <a:cs typeface="Courier New" panose="02070309020205020404" pitchFamily="49" charset="0"/>
+                <a:hlinkClick r:id="rId3"/>
+              </a:rPr>
+              <a:t>tinyurl.com/4v4b8pch</a:t>
+            </a:r>
+            <a:endParaRPr lang="en-US" sz="4000" dirty="0">
+              <a:cs typeface="Courier New" panose="02070309020205020404" pitchFamily="49" charset="0"/>
+            </a:endParaRPr>
           </a:p>
           <a:p>
             <a:pPr marL="0" indent="0">
@@ -22200,6 +22563,22 @@
             </a:pPr>
             <a:endParaRPr lang="en-US" sz="2000" dirty="0"/>
           </a:p>
+          <a:p>
+            <a:pPr marL="0" indent="0">
+              <a:buNone/>
+            </a:pPr>
+            <a:r>
+              <a:rPr lang="en-US" sz="2000" dirty="0"/>
+              <a:t>Pull requests welcome! </a:t>
+            </a:r>
+            <a:r>
+              <a:rPr lang="en-US" sz="2000" dirty="0">
+                <a:sym typeface="Wingdings" pitchFamily="2" charset="2"/>
+              </a:rPr>
+              <a:t> </a:t>
+            </a:r>
+            <a:endParaRPr lang="en-US" sz="2000" dirty="0"/>
+          </a:p>
         </p:txBody>
       </p:sp>
       <p:sp>
@@ -22235,6 +22614,36 @@
           </a:p>
         </p:txBody>
       </p:sp>
+      <p:pic>
+        <p:nvPicPr>
+          <p:cNvPr id="5" name="Picture 4">
+            <a:extLst>
+              <a:ext uri="{FF2B5EF4-FFF2-40B4-BE49-F238E27FC236}">
+                <a16:creationId xmlns:a16="http://schemas.microsoft.com/office/drawing/2014/main" id="{8E9BD16E-BFBD-A700-F42F-B8E2927BA677}"/>
+              </a:ext>
+            </a:extLst>
+          </p:cNvPr>
+          <p:cNvPicPr>
+            <a:picLocks noChangeAspect="1"/>
+          </p:cNvPicPr>
+          <p:nvPr/>
+        </p:nvPicPr>
+        <p:blipFill>
+          <a:blip r:embed="rId4"/>
+          <a:stretch>
+            <a:fillRect/>
+          </a:stretch>
+        </p:blipFill>
+        <p:spPr>
+          <a:xfrm>
+            <a:off x="7042559" y="1706626"/>
+            <a:ext cx="1612900" cy="1612900"/>
+          </a:xfrm>
+          <a:prstGeom prst="rect">
+            <a:avLst/>
+          </a:prstGeom>
+        </p:spPr>
+      </p:pic>
     </p:spTree>
     <p:extLst>
       <p:ext uri="{BB962C8B-B14F-4D97-AF65-F5344CB8AC3E}">
@@ -23407,6 +23816,159 @@
       </p:grpSpPr>
       <p:sp>
         <p:nvSpPr>
+          <p:cNvPr id="2" name="Title 1">
+            <a:extLst>
+              <a:ext uri="{FF2B5EF4-FFF2-40B4-BE49-F238E27FC236}">
+                <a16:creationId xmlns:a16="http://schemas.microsoft.com/office/drawing/2014/main" id="{3CDA2C0A-84C5-DDCE-DE2D-F26D112FC42D}"/>
+              </a:ext>
+            </a:extLst>
+          </p:cNvPr>
+          <p:cNvSpPr>
+            <a:spLocks noGrp="1"/>
+          </p:cNvSpPr>
+          <p:nvPr>
+            <p:ph type="title"/>
+          </p:nvPr>
+        </p:nvSpPr>
+        <p:spPr/>
+        <p:txBody>
+          <a:bodyPr>
+            <a:normAutofit fontScale="90000"/>
+          </a:bodyPr>
+          <a:lstStyle/>
+          <a:p>
+            <a:pPr algn="ctr"/>
+            <a:r>
+              <a:rPr lang="en-US" dirty="0">
+                <a:latin typeface="National Park " pitchFamily="2" charset="77"/>
+              </a:rPr>
+              <a:t>Other Possible Venues to look for challenges</a:t>
+            </a:r>
+          </a:p>
+        </p:txBody>
+      </p:sp>
+      <p:sp>
+        <p:nvSpPr>
+          <p:cNvPr id="3" name="Content Placeholder 2">
+            <a:extLst>
+              <a:ext uri="{FF2B5EF4-FFF2-40B4-BE49-F238E27FC236}">
+                <a16:creationId xmlns:a16="http://schemas.microsoft.com/office/drawing/2014/main" id="{F46367CA-67BA-E0A5-9C11-0819709041BA}"/>
+              </a:ext>
+            </a:extLst>
+          </p:cNvPr>
+          <p:cNvSpPr>
+            <a:spLocks noGrp="1"/>
+          </p:cNvSpPr>
+          <p:nvPr>
+            <p:ph idx="1"/>
+          </p:nvPr>
+        </p:nvSpPr>
+        <p:spPr/>
+        <p:txBody>
+          <a:bodyPr/>
+          <a:lstStyle/>
+          <a:p>
+            <a:r>
+              <a:rPr lang="en-US" dirty="0"/>
+              <a:t>data/sales-data.csv</a:t>
+            </a:r>
+            <a:endParaRPr lang="en-US" dirty="0">
+              <a:hlinkClick r:id="rId2"/>
+            </a:endParaRPr>
+          </a:p>
+          <a:p>
+            <a:r>
+              <a:rPr lang="en-US" dirty="0">
+                <a:hlinkClick r:id="rId2"/>
+              </a:rPr>
+              <a:t>annas-blog.org/worldcat-scrape.html</a:t>
+            </a:r>
+            <a:endParaRPr lang="en-US" dirty="0"/>
+          </a:p>
+          <a:p>
+            <a:r>
+              <a:rPr lang="en-US" dirty="0">
+                <a:hlinkClick r:id="rId3"/>
+              </a:rPr>
+              <a:t>smc-datachallenge.ornl.gov</a:t>
+            </a:r>
+            <a:endParaRPr lang="en-US" dirty="0"/>
+          </a:p>
+          <a:p>
+            <a:r>
+              <a:rPr lang="en-US" dirty="0">
+                <a:hlinkClick r:id="rId4"/>
+              </a:rPr>
+              <a:t>www.reddit.com/r/DataHoarder</a:t>
+            </a:r>
+            <a:endParaRPr lang="en-US" dirty="0"/>
+          </a:p>
+          <a:p>
+            <a:endParaRPr lang="en-US" dirty="0"/>
+          </a:p>
+        </p:txBody>
+      </p:sp>
+      <p:sp>
+        <p:nvSpPr>
+          <p:cNvPr id="4" name="Slide Number Placeholder 3">
+            <a:extLst>
+              <a:ext uri="{FF2B5EF4-FFF2-40B4-BE49-F238E27FC236}">
+                <a16:creationId xmlns:a16="http://schemas.microsoft.com/office/drawing/2014/main" id="{DC20C616-4036-B93A-64BC-2D0981B65436}"/>
+              </a:ext>
+            </a:extLst>
+          </p:cNvPr>
+          <p:cNvSpPr>
+            <a:spLocks noGrp="1"/>
+          </p:cNvSpPr>
+          <p:nvPr>
+            <p:ph type="sldNum" sz="quarter" idx="12"/>
+          </p:nvPr>
+        </p:nvSpPr>
+        <p:spPr/>
+        <p:txBody>
+          <a:bodyPr/>
+          <a:lstStyle/>
+          <a:p>
+            <a:fld id="{4E3AEE2C-3A74-8643-B4A2-442777B583A3}" type="slidenum">
+              <a:rPr lang="en-US" smtClean="0"/>
+              <a:t>65</a:t>
+            </a:fld>
+            <a:endParaRPr lang="en-US"/>
+          </a:p>
+        </p:txBody>
+      </p:sp>
+    </p:spTree>
+    <p:extLst>
+      <p:ext uri="{BB962C8B-B14F-4D97-AF65-F5344CB8AC3E}">
+        <p14:creationId xmlns:p14="http://schemas.microsoft.com/office/powerpoint/2010/main" val="592777674"/>
+      </p:ext>
+    </p:extLst>
+  </p:cSld>
+  <p:clrMapOvr>
+    <a:masterClrMapping/>
+  </p:clrMapOvr>
+</p:sld>
+</file>
+
+<file path=ppt/slides/slide66.xml><?xml version="1.0" encoding="utf-8"?>
+<p:sld xmlns:a="http://schemas.openxmlformats.org/drawingml/2006/main" xmlns:r="http://schemas.openxmlformats.org/officeDocument/2006/relationships" xmlns:p="http://schemas.openxmlformats.org/presentationml/2006/main">
+  <p:cSld>
+    <p:spTree>
+      <p:nvGrpSpPr>
+        <p:cNvPr id="1" name=""/>
+        <p:cNvGrpSpPr/>
+        <p:nvPr/>
+      </p:nvGrpSpPr>
+      <p:grpSpPr>
+        <a:xfrm>
+          <a:off x="0" y="0"/>
+          <a:ext cx="0" cy="0"/>
+          <a:chOff x="0" y="0"/>
+          <a:chExt cx="0" cy="0"/>
+        </a:xfrm>
+      </p:grpSpPr>
+      <p:sp>
+        <p:nvSpPr>
           <p:cNvPr id="2" name="Title 1"/>
           <p:cNvSpPr>
             <a:spLocks noGrp="1"/>
@@ -23484,7 +24046,7 @@
               <a:rPr lang="en-US" smtClean="0">
                 <a:latin typeface="National Park " pitchFamily="2" charset="77"/>
               </a:rPr>
-              <a:t>65</a:t>
+              <a:t>66</a:t>
             </a:fld>
             <a:endParaRPr lang="en-US">
               <a:latin typeface="National Park " pitchFamily="2" charset="77"/>
@@ -23535,150 +24097,6 @@
 </p:sld>
 </file>
 
-<file path=ppt/slides/slide66.xml><?xml version="1.0" encoding="utf-8"?>
-<p:sld xmlns:a="http://schemas.openxmlformats.org/drawingml/2006/main" xmlns:r="http://schemas.openxmlformats.org/officeDocument/2006/relationships" xmlns:p="http://schemas.openxmlformats.org/presentationml/2006/main">
-  <p:cSld>
-    <p:spTree>
-      <p:nvGrpSpPr>
-        <p:cNvPr id="1" name=""/>
-        <p:cNvGrpSpPr/>
-        <p:nvPr/>
-      </p:nvGrpSpPr>
-      <p:grpSpPr>
-        <a:xfrm>
-          <a:off x="0" y="0"/>
-          <a:ext cx="0" cy="0"/>
-          <a:chOff x="0" y="0"/>
-          <a:chExt cx="0" cy="0"/>
-        </a:xfrm>
-      </p:grpSpPr>
-      <p:sp>
-        <p:nvSpPr>
-          <p:cNvPr id="2" name="Title 1">
-            <a:extLst>
-              <a:ext uri="{FF2B5EF4-FFF2-40B4-BE49-F238E27FC236}">
-                <a16:creationId xmlns:a16="http://schemas.microsoft.com/office/drawing/2014/main" id="{3CDA2C0A-84C5-DDCE-DE2D-F26D112FC42D}"/>
-              </a:ext>
-            </a:extLst>
-          </p:cNvPr>
-          <p:cNvSpPr>
-            <a:spLocks noGrp="1"/>
-          </p:cNvSpPr>
-          <p:nvPr>
-            <p:ph type="title"/>
-          </p:nvPr>
-        </p:nvSpPr>
-        <p:spPr/>
-        <p:txBody>
-          <a:bodyPr>
-            <a:normAutofit fontScale="90000"/>
-          </a:bodyPr>
-          <a:lstStyle/>
-          <a:p>
-            <a:pPr algn="ctr"/>
-            <a:r>
-              <a:rPr lang="en-US" dirty="0">
-                <a:latin typeface="National Park " pitchFamily="2" charset="77"/>
-              </a:rPr>
-              <a:t>Other Possible Venues to look for challenges</a:t>
-            </a:r>
-          </a:p>
-        </p:txBody>
-      </p:sp>
-      <p:sp>
-        <p:nvSpPr>
-          <p:cNvPr id="3" name="Content Placeholder 2">
-            <a:extLst>
-              <a:ext uri="{FF2B5EF4-FFF2-40B4-BE49-F238E27FC236}">
-                <a16:creationId xmlns:a16="http://schemas.microsoft.com/office/drawing/2014/main" id="{F46367CA-67BA-E0A5-9C11-0819709041BA}"/>
-              </a:ext>
-            </a:extLst>
-          </p:cNvPr>
-          <p:cNvSpPr>
-            <a:spLocks noGrp="1"/>
-          </p:cNvSpPr>
-          <p:nvPr>
-            <p:ph idx="1"/>
-          </p:nvPr>
-        </p:nvSpPr>
-        <p:spPr/>
-        <p:txBody>
-          <a:bodyPr/>
-          <a:lstStyle/>
-          <a:p>
-            <a:r>
-              <a:rPr lang="en-US" dirty="0">
-                <a:hlinkClick r:id="rId2"/>
-              </a:rPr>
-              <a:t>annas-blog.org/worldcat-scrape.html</a:t>
-            </a:r>
-            <a:endParaRPr lang="en-US" dirty="0"/>
-          </a:p>
-          <a:p>
-            <a:r>
-              <a:rPr lang="en-US" dirty="0">
-                <a:hlinkClick r:id="rId3"/>
-              </a:rPr>
-              <a:t>smc-datachallenge.ornl.gov</a:t>
-            </a:r>
-            <a:endParaRPr lang="en-US" dirty="0"/>
-          </a:p>
-          <a:p>
-            <a:r>
-              <a:rPr lang="en-US" dirty="0">
-                <a:hlinkClick r:id="rId4"/>
-              </a:rPr>
-              <a:t>www.reddit.com/r/DataHoarder</a:t>
-            </a:r>
-            <a:endParaRPr lang="en-US" dirty="0"/>
-          </a:p>
-          <a:p>
-            <a:endParaRPr lang="en-US" dirty="0"/>
-          </a:p>
-        </p:txBody>
-      </p:sp>
-      <p:sp>
-        <p:nvSpPr>
-          <p:cNvPr id="4" name="Slide Number Placeholder 3">
-            <a:extLst>
-              <a:ext uri="{FF2B5EF4-FFF2-40B4-BE49-F238E27FC236}">
-                <a16:creationId xmlns:a16="http://schemas.microsoft.com/office/drawing/2014/main" id="{DC20C616-4036-B93A-64BC-2D0981B65436}"/>
-              </a:ext>
-            </a:extLst>
-          </p:cNvPr>
-          <p:cNvSpPr>
-            <a:spLocks noGrp="1"/>
-          </p:cNvSpPr>
-          <p:nvPr>
-            <p:ph type="sldNum" sz="quarter" idx="12"/>
-          </p:nvPr>
-        </p:nvSpPr>
-        <p:spPr/>
-        <p:txBody>
-          <a:bodyPr/>
-          <a:lstStyle/>
-          <a:p>
-            <a:fld id="{4E3AEE2C-3A74-8643-B4A2-442777B583A3}" type="slidenum">
-              <a:rPr lang="en-US" smtClean="0"/>
-              <a:t>66</a:t>
-            </a:fld>
-            <a:endParaRPr lang="en-US"/>
-          </a:p>
-        </p:txBody>
-      </p:sp>
-    </p:spTree>
-    <p:extLst>
-      <p:ext uri="{BB962C8B-B14F-4D97-AF65-F5344CB8AC3E}">
-        <p14:creationId xmlns:p14="http://schemas.microsoft.com/office/powerpoint/2010/main" val="592777674"/>
-      </p:ext>
-    </p:extLst>
-  </p:cSld>
-  <p:clrMapOvr>
-    <a:masterClrMapping/>
-  </p:clrMapOvr>
-</p:sld>
-</file>
-
 <file path=ppt/slides/slide7.xml><?xml version="1.0" encoding="utf-8"?>
 <p:sld xmlns:a="http://schemas.openxmlformats.org/drawingml/2006/main" xmlns:r="http://schemas.openxmlformats.org/officeDocument/2006/relationships" xmlns:p="http://schemas.openxmlformats.org/presentationml/2006/main">
   <p:cSld>
@@ -23759,7 +24177,7 @@
             <a:pPr lvl="1"/>
             <a:r>
               <a:rPr lang="en-US" dirty="0"/>
-              <a:t>common commands, basic understanding of files and directories, editing.</a:t>
+              <a:t>common commands, basic understanding of files and directories, process.</a:t>
             </a:r>
             <a:br>
               <a:rPr lang="en-US" dirty="0"/>
@@ -23788,12 +24206,9 @@
               <a:rPr lang="en-US" b="1" dirty="0">
                 <a:cs typeface="Courier New" panose="02070309020205020404" pitchFamily="49" charset="0"/>
               </a:rPr>
-              <a:t>, cat</a:t>
-            </a:r>
-            <a:r>
-              <a:rPr lang="en-US" dirty="0"/>
-              <a:t> </a:t>
-            </a:r>
+              <a:t>, cat, date, seq</a:t>
+            </a:r>
+            <a:endParaRPr lang="en-US" dirty="0"/>
           </a:p>
           <a:p>
             <a:endParaRPr lang="en-US" dirty="0"/>
@@ -23970,7 +24385,7 @@
           <a:p>
             <a:r>
               <a:rPr lang="en-US" dirty="0"/>
-              <a:t>Plan to publish solutions around Nov 10 on </a:t>
+              <a:t>Plan to publish solutions around Nov 10, 2023, on </a:t>
             </a:r>
             <a:r>
               <a:rPr lang="en-US" dirty="0" err="1"/>

</xml_diff>

<commit_message>
adding desc of data.
</commit_message>
<xml_diff>
--- a/gnu-parallel-tutorial.pptx
+++ b/gnu-parallel-tutorial.pptx
@@ -277,7 +277,7 @@
           <a:p>
             <a:fld id="{DE0C789A-1381-F54D-B55B-DCBB91319C08}" type="datetimeFigureOut">
               <a:rPr lang="en-US" smtClean="0"/>
-              <a:t>10/10/23</a:t>
+              <a:t>10/11/23</a:t>
             </a:fld>
             <a:endParaRPr lang="en-US"/>
           </a:p>
@@ -454,7 +454,7 @@
           <a:p>
             <a:fld id="{46CB9FDB-056B-6244-AE56-9549F1074EBB}" type="datetimeFigureOut">
               <a:rPr lang="en-US" smtClean="0"/>
-              <a:t>10/10/23</a:t>
+              <a:t>10/11/23</a:t>
             </a:fld>
             <a:endParaRPr lang="en-US"/>
           </a:p>
@@ -1551,7 +1551,7 @@
           <a:p>
             <a:fld id="{524F091B-C9FE-714F-8F5F-8CFB82A747F1}" type="datetime1">
               <a:rPr lang="en-US" smtClean="0"/>
-              <a:t>10/10/23</a:t>
+              <a:t>10/11/23</a:t>
             </a:fld>
             <a:endParaRPr lang="en-US"/>
           </a:p>
@@ -1721,7 +1721,7 @@
           <a:p>
             <a:fld id="{E5121F4C-BC13-F84F-9AD9-260A611D728C}" type="datetime1">
               <a:rPr lang="en-US" smtClean="0"/>
-              <a:t>10/10/23</a:t>
+              <a:t>10/11/23</a:t>
             </a:fld>
             <a:endParaRPr lang="en-US"/>
           </a:p>
@@ -1901,7 +1901,7 @@
           <a:p>
             <a:fld id="{69934431-5E8A-0144-AD3C-F9F3B5843812}" type="datetime1">
               <a:rPr lang="en-US" smtClean="0"/>
-              <a:t>10/10/23</a:t>
+              <a:t>10/11/23</a:t>
             </a:fld>
             <a:endParaRPr lang="en-US"/>
           </a:p>
@@ -2071,7 +2071,7 @@
           <a:p>
             <a:fld id="{4D966F88-1DAF-F94F-A3D2-93E7964825AC}" type="datetime1">
               <a:rPr lang="en-US" smtClean="0"/>
-              <a:t>10/10/23</a:t>
+              <a:t>10/11/23</a:t>
             </a:fld>
             <a:endParaRPr lang="en-US"/>
           </a:p>
@@ -2317,7 +2317,7 @@
           <a:p>
             <a:fld id="{75F67F5F-B354-5B41-A0FF-E33ACFB7B000}" type="datetime1">
               <a:rPr lang="en-US" smtClean="0"/>
-              <a:t>10/10/23</a:t>
+              <a:t>10/11/23</a:t>
             </a:fld>
             <a:endParaRPr lang="en-US"/>
           </a:p>
@@ -2549,7 +2549,7 @@
           <a:p>
             <a:fld id="{1FE71E3D-61C4-AF47-B5F6-80F7A2125094}" type="datetime1">
               <a:rPr lang="en-US" smtClean="0"/>
-              <a:t>10/10/23</a:t>
+              <a:t>10/11/23</a:t>
             </a:fld>
             <a:endParaRPr lang="en-US"/>
           </a:p>
@@ -2916,7 +2916,7 @@
           <a:p>
             <a:fld id="{B7259F95-3E7B-AE48-BD5A-55F4F48F15EE}" type="datetime1">
               <a:rPr lang="en-US" smtClean="0"/>
-              <a:t>10/10/23</a:t>
+              <a:t>10/11/23</a:t>
             </a:fld>
             <a:endParaRPr lang="en-US"/>
           </a:p>
@@ -3034,7 +3034,7 @@
           <a:p>
             <a:fld id="{1E2D71D9-286E-D847-8194-60F3E909E40C}" type="datetime1">
               <a:rPr lang="en-US" smtClean="0"/>
-              <a:t>10/10/23</a:t>
+              <a:t>10/11/23</a:t>
             </a:fld>
             <a:endParaRPr lang="en-US"/>
           </a:p>
@@ -3129,7 +3129,7 @@
           <a:p>
             <a:fld id="{3AC70D76-DA63-C342-B98E-F532027F9CD7}" type="datetime1">
               <a:rPr lang="en-US" smtClean="0"/>
-              <a:t>10/10/23</a:t>
+              <a:t>10/11/23</a:t>
             </a:fld>
             <a:endParaRPr lang="en-US"/>
           </a:p>
@@ -3406,7 +3406,7 @@
           <a:p>
             <a:fld id="{74E169E1-67F4-DE43-8AD1-CF716A32D6D9}" type="datetime1">
               <a:rPr lang="en-US" smtClean="0"/>
-              <a:t>10/10/23</a:t>
+              <a:t>10/11/23</a:t>
             </a:fld>
             <a:endParaRPr lang="en-US"/>
           </a:p>
@@ -3663,7 +3663,7 @@
           <a:p>
             <a:fld id="{EDBC0E13-B072-744E-A1EF-1258C23FD22F}" type="datetime1">
               <a:rPr lang="en-US" smtClean="0"/>
-              <a:t>10/10/23</a:t>
+              <a:t>10/11/23</a:t>
             </a:fld>
             <a:endParaRPr lang="en-US"/>
           </a:p>
@@ -3876,7 +3876,7 @@
           <a:p>
             <a:fld id="{14D54490-4A22-8B41-9AA4-9BECA28CBC89}" type="datetime1">
               <a:rPr lang="en-US" smtClean="0"/>
-              <a:t>10/10/23</a:t>
+              <a:t>10/11/23</a:t>
             </a:fld>
             <a:endParaRPr lang="en-US"/>
           </a:p>
@@ -23478,7 +23478,7 @@
         <p:spPr/>
         <p:txBody>
           <a:bodyPr>
-            <a:normAutofit/>
+            <a:normAutofit lnSpcReduction="10000"/>
           </a:bodyPr>
           <a:lstStyle/>
           <a:p>
@@ -23491,6 +23491,12 @@
             <a:r>
               <a:rPr lang="en-US" dirty="0"/>
               <a:t> A 2.6T dataset pertaining to cluster operations</a:t>
+            </a:r>
+          </a:p>
+          <a:p>
+            <a:r>
+              <a:rPr lang="en-US" dirty="0"/>
+              <a:t>900K+ files, 2.6m+ lines of CSV data.</a:t>
             </a:r>
           </a:p>
           <a:p>
@@ -23881,14 +23887,27 @@
             <p:ph idx="1"/>
           </p:nvPr>
         </p:nvSpPr>
-        <p:spPr/>
+        <p:spPr>
+          <a:xfrm>
+            <a:off x="628650" y="1369219"/>
+            <a:ext cx="7886700" cy="3263504"/>
+          </a:xfrm>
+        </p:spPr>
         <p:txBody>
           <a:bodyPr/>
           <a:lstStyle/>
           <a:p>
             <a:r>
               <a:rPr lang="en-US" dirty="0"/>
-              <a:t>data/sales-data.csv</a:t>
+              <a:t>data/sales-</a:t>
+            </a:r>
+            <a:r>
+              <a:rPr lang="en-US" dirty="0" err="1"/>
+              <a:t>data.csv</a:t>
+            </a:r>
+            <a:r>
+              <a:rPr lang="en-US" dirty="0"/>
+              <a:t>: ~10K lines of sales data (mock)</a:t>
             </a:r>
             <a:endParaRPr lang="en-US" dirty="0">
               <a:hlinkClick r:id="rId2"/>

</xml_diff>

<commit_message>
adding prime c code
</commit_message>
<xml_diff>
--- a/gnu-parallel-tutorial.pptx
+++ b/gnu-parallel-tutorial.pptx
@@ -278,7 +278,7 @@
           <a:p>
             <a:fld id="{DE0C789A-1381-F54D-B55B-DCBB91319C08}" type="datetimeFigureOut">
               <a:rPr lang="en-US" smtClean="0"/>
-              <a:t>4/1/24</a:t>
+              <a:t>4/10/24</a:t>
             </a:fld>
             <a:endParaRPr lang="en-US"/>
           </a:p>
@@ -455,7 +455,7 @@
           <a:p>
             <a:fld id="{46CB9FDB-056B-6244-AE56-9549F1074EBB}" type="datetimeFigureOut">
               <a:rPr lang="en-US" smtClean="0"/>
-              <a:t>4/1/24</a:t>
+              <a:t>4/10/24</a:t>
             </a:fld>
             <a:endParaRPr lang="en-US"/>
           </a:p>
@@ -1552,7 +1552,7 @@
           <a:p>
             <a:fld id="{524F091B-C9FE-714F-8F5F-8CFB82A747F1}" type="datetime1">
               <a:rPr lang="en-US" smtClean="0"/>
-              <a:t>4/1/24</a:t>
+              <a:t>4/10/24</a:t>
             </a:fld>
             <a:endParaRPr lang="en-US"/>
           </a:p>
@@ -1722,7 +1722,7 @@
           <a:p>
             <a:fld id="{E5121F4C-BC13-F84F-9AD9-260A611D728C}" type="datetime1">
               <a:rPr lang="en-US" smtClean="0"/>
-              <a:t>4/1/24</a:t>
+              <a:t>4/10/24</a:t>
             </a:fld>
             <a:endParaRPr lang="en-US"/>
           </a:p>
@@ -1902,7 +1902,7 @@
           <a:p>
             <a:fld id="{69934431-5E8A-0144-AD3C-F9F3B5843812}" type="datetime1">
               <a:rPr lang="en-US" smtClean="0"/>
-              <a:t>4/1/24</a:t>
+              <a:t>4/10/24</a:t>
             </a:fld>
             <a:endParaRPr lang="en-US"/>
           </a:p>
@@ -2072,7 +2072,7 @@
           <a:p>
             <a:fld id="{4D966F88-1DAF-F94F-A3D2-93E7964825AC}" type="datetime1">
               <a:rPr lang="en-US" smtClean="0"/>
-              <a:t>4/1/24</a:t>
+              <a:t>4/10/24</a:t>
             </a:fld>
             <a:endParaRPr lang="en-US"/>
           </a:p>
@@ -2318,7 +2318,7 @@
           <a:p>
             <a:fld id="{75F67F5F-B354-5B41-A0FF-E33ACFB7B000}" type="datetime1">
               <a:rPr lang="en-US" smtClean="0"/>
-              <a:t>4/1/24</a:t>
+              <a:t>4/10/24</a:t>
             </a:fld>
             <a:endParaRPr lang="en-US"/>
           </a:p>
@@ -2550,7 +2550,7 @@
           <a:p>
             <a:fld id="{1FE71E3D-61C4-AF47-B5F6-80F7A2125094}" type="datetime1">
               <a:rPr lang="en-US" smtClean="0"/>
-              <a:t>4/1/24</a:t>
+              <a:t>4/10/24</a:t>
             </a:fld>
             <a:endParaRPr lang="en-US"/>
           </a:p>
@@ -2917,7 +2917,7 @@
           <a:p>
             <a:fld id="{B7259F95-3E7B-AE48-BD5A-55F4F48F15EE}" type="datetime1">
               <a:rPr lang="en-US" smtClean="0"/>
-              <a:t>4/1/24</a:t>
+              <a:t>4/10/24</a:t>
             </a:fld>
             <a:endParaRPr lang="en-US"/>
           </a:p>
@@ -3035,7 +3035,7 @@
           <a:p>
             <a:fld id="{1E2D71D9-286E-D847-8194-60F3E909E40C}" type="datetime1">
               <a:rPr lang="en-US" smtClean="0"/>
-              <a:t>4/1/24</a:t>
+              <a:t>4/10/24</a:t>
             </a:fld>
             <a:endParaRPr lang="en-US"/>
           </a:p>
@@ -3130,7 +3130,7 @@
           <a:p>
             <a:fld id="{3AC70D76-DA63-C342-B98E-F532027F9CD7}" type="datetime1">
               <a:rPr lang="en-US" smtClean="0"/>
-              <a:t>4/1/24</a:t>
+              <a:t>4/10/24</a:t>
             </a:fld>
             <a:endParaRPr lang="en-US"/>
           </a:p>
@@ -3407,7 +3407,7 @@
           <a:p>
             <a:fld id="{74E169E1-67F4-DE43-8AD1-CF716A32D6D9}" type="datetime1">
               <a:rPr lang="en-US" smtClean="0"/>
-              <a:t>4/1/24</a:t>
+              <a:t>4/10/24</a:t>
             </a:fld>
             <a:endParaRPr lang="en-US"/>
           </a:p>
@@ -3664,7 +3664,7 @@
           <a:p>
             <a:fld id="{EDBC0E13-B072-744E-A1EF-1258C23FD22F}" type="datetime1">
               <a:rPr lang="en-US" smtClean="0"/>
-              <a:t>4/1/24</a:t>
+              <a:t>4/10/24</a:t>
             </a:fld>
             <a:endParaRPr lang="en-US"/>
           </a:p>
@@ -3877,7 +3877,7 @@
           <a:p>
             <a:fld id="{14D54490-4A22-8B41-9AA4-9BECA28CBC89}" type="datetime1">
               <a:rPr lang="en-US" smtClean="0"/>
-              <a:t>4/1/24</a:t>
+              <a:t>4/10/24</a:t>
             </a:fld>
             <a:endParaRPr lang="en-US"/>
           </a:p>
@@ -14839,61 +14839,61 @@
           <a:lstStyle/>
           <a:p>
             <a:r>
-              <a:rPr lang="en-US" sz="1640" b="1" dirty="0">
+              <a:rPr lang="en-US" sz="1640" dirty="0">
                 <a:latin typeface="Courier New" panose="02070309020205020404" pitchFamily="49" charset="0"/>
                 <a:cs typeface="Courier New" panose="02070309020205020404" pitchFamily="49" charset="0"/>
               </a:rPr>
               <a:t>parallel -S rage1,rage4,rage7,rage8,rage9,rage10,rage11,rage12 ${</a:t>
             </a:r>
             <a:r>
-              <a:rPr lang="en-US" sz="1640" b="1" dirty="0" err="1">
+              <a:rPr lang="en-US" sz="1640" dirty="0" err="1">
                 <a:latin typeface="Courier New" panose="02070309020205020404" pitchFamily="49" charset="0"/>
                 <a:cs typeface="Courier New" panose="02070309020205020404" pitchFamily="49" charset="0"/>
               </a:rPr>
               <a:t>scan_cmd</a:t>
             </a:r>
             <a:r>
-              <a:rPr lang="en-US" sz="1640" b="1" dirty="0">
+              <a:rPr lang="en-US" sz="1640" dirty="0">
                 <a:latin typeface="Courier New" panose="02070309020205020404" pitchFamily="49" charset="0"/>
                 <a:cs typeface="Courier New" panose="02070309020205020404" pitchFamily="49" charset="0"/>
               </a:rPr>
               <a:t>} ::: \</a:t>
             </a:r>
             <a:br>
-              <a:rPr lang="en-US" sz="1640" b="1" dirty="0">
+              <a:rPr lang="en-US" sz="1640" dirty="0">
                 <a:latin typeface="Courier New" panose="02070309020205020404" pitchFamily="49" charset="0"/>
                 <a:cs typeface="Courier New" panose="02070309020205020404" pitchFamily="49" charset="0"/>
               </a:rPr>
             </a:br>
             <a:r>
-              <a:rPr lang="en-US" sz="1640" b="1" dirty="0">
+              <a:rPr lang="en-US" sz="1640" dirty="0">
                 <a:latin typeface="Courier New" panose="02070309020205020404" pitchFamily="49" charset="0"/>
                 <a:cs typeface="Courier New" panose="02070309020205020404" pitchFamily="49" charset="0"/>
               </a:rPr>
               <a:t>${</a:t>
             </a:r>
             <a:r>
-              <a:rPr lang="en-US" sz="1640" b="1" dirty="0" err="1">
+              <a:rPr lang="en-US" sz="1640" dirty="0" err="1">
                 <a:latin typeface="Courier New" panose="02070309020205020404" pitchFamily="49" charset="0"/>
                 <a:cs typeface="Courier New" panose="02070309020205020404" pitchFamily="49" charset="0"/>
               </a:rPr>
               <a:t>scan_path</a:t>
             </a:r>
             <a:r>
-              <a:rPr lang="en-US" sz="1640" b="1" dirty="0">
+              <a:rPr lang="en-US" sz="1640" dirty="0">
                 <a:latin typeface="Courier New" panose="02070309020205020404" pitchFamily="49" charset="0"/>
                 <a:cs typeface="Courier New" panose="02070309020205020404" pitchFamily="49" charset="0"/>
               </a:rPr>
               <a:t>}/{44..51} \</a:t>
             </a:r>
             <a:br>
-              <a:rPr lang="en-US" sz="1640" b="1" dirty="0">
+              <a:rPr lang="en-US" sz="1640" dirty="0">
                 <a:latin typeface="Courier New" panose="02070309020205020404" pitchFamily="49" charset="0"/>
                 <a:cs typeface="Courier New" panose="02070309020205020404" pitchFamily="49" charset="0"/>
               </a:rPr>
             </a:br>
             <a:r>
-              <a:rPr lang="en-US" sz="1640" b="1" dirty="0">
+              <a:rPr lang="en-US" sz="1640" dirty="0">
                 <a:latin typeface="Courier New" panose="02070309020205020404" pitchFamily="49" charset="0"/>
                 <a:cs typeface="Courier New" panose="02070309020205020404" pitchFamily="49" charset="0"/>
               </a:rPr>
@@ -14904,110 +14904,110 @@
             <a:pPr marL="0" indent="0">
               <a:buNone/>
             </a:pPr>
-            <a:endParaRPr lang="en-US" sz="1640" b="1" dirty="0">
+            <a:endParaRPr lang="en-US" sz="1640" dirty="0">
               <a:latin typeface="Courier New" panose="02070309020205020404" pitchFamily="49" charset="0"/>
               <a:cs typeface="Courier New" panose="02070309020205020404" pitchFamily="49" charset="0"/>
             </a:endParaRPr>
           </a:p>
           <a:p>
             <a:r>
-              <a:rPr lang="en-US" sz="1640" b="1" dirty="0">
+              <a:rPr lang="en-US" sz="1640" dirty="0">
                 <a:latin typeface="Courier New" panose="02070309020205020404" pitchFamily="49" charset="0"/>
                 <a:cs typeface="Courier New" panose="02070309020205020404" pitchFamily="49" charset="0"/>
               </a:rPr>
               <a:t>parallel -S rage4 --jobs 30 '</a:t>
             </a:r>
             <a:r>
-              <a:rPr lang="en-US" sz="1640" b="1" dirty="0" err="1">
+              <a:rPr lang="en-US" sz="1640" dirty="0" err="1">
                 <a:latin typeface="Courier New" panose="02070309020205020404" pitchFamily="49" charset="0"/>
                 <a:cs typeface="Courier New" panose="02070309020205020404" pitchFamily="49" charset="0"/>
               </a:rPr>
               <a:t>nats</a:t>
             </a:r>
             <a:r>
-              <a:rPr lang="en-US" sz="1640" b="1" dirty="0">
+              <a:rPr lang="en-US" sz="1640" dirty="0">
                 <a:latin typeface="Courier New" panose="02070309020205020404" pitchFamily="49" charset="0"/>
                 <a:cs typeface="Courier New" panose="02070309020205020404" pitchFamily="49" charset="0"/>
               </a:rPr>
               <a:t> -s rage2:4222 \</a:t>
             </a:r>
             <a:br>
-              <a:rPr lang="en-US" sz="1640" b="1" dirty="0">
+              <a:rPr lang="en-US" sz="1640" dirty="0">
                 <a:latin typeface="Courier New" panose="02070309020205020404" pitchFamily="49" charset="0"/>
                 <a:cs typeface="Courier New" panose="02070309020205020404" pitchFamily="49" charset="0"/>
               </a:rPr>
             </a:br>
             <a:r>
-              <a:rPr lang="en-US" sz="1640" b="1" dirty="0">
+              <a:rPr lang="en-US" sz="1640" dirty="0">
                 <a:latin typeface="Courier New" panose="02070309020205020404" pitchFamily="49" charset="0"/>
                 <a:cs typeface="Courier New" panose="02070309020205020404" pitchFamily="49" charset="0"/>
               </a:rPr>
               <a:t>pub </a:t>
             </a:r>
             <a:r>
-              <a:rPr lang="en-US" sz="1640" b="1" dirty="0" err="1">
+              <a:rPr lang="en-US" sz="1640" dirty="0" err="1">
                 <a:latin typeface="Courier New" panose="02070309020205020404" pitchFamily="49" charset="0"/>
                 <a:cs typeface="Courier New" panose="02070309020205020404" pitchFamily="49" charset="0"/>
               </a:rPr>
               <a:t>migration.files.request</a:t>
             </a:r>
             <a:r>
-              <a:rPr lang="en-US" sz="1640" b="1" dirty="0">
+              <a:rPr lang="en-US" sz="1640" dirty="0">
                 <a:latin typeface="Courier New" panose="02070309020205020404" pitchFamily="49" charset="0"/>
                 <a:cs typeface="Courier New" panose="02070309020205020404" pitchFamily="49" charset="0"/>
               </a:rPr>
               <a:t> --count 1 \</a:t>
             </a:r>
             <a:br>
-              <a:rPr lang="en-US" sz="1640" b="1" dirty="0">
+              <a:rPr lang="en-US" sz="1640" dirty="0">
                 <a:latin typeface="Courier New" panose="02070309020205020404" pitchFamily="49" charset="0"/>
                 <a:cs typeface="Courier New" panose="02070309020205020404" pitchFamily="49" charset="0"/>
               </a:rPr>
             </a:br>
             <a:r>
-              <a:rPr lang="en-US" sz="1640" b="1" dirty="0">
+              <a:rPr lang="en-US" sz="1640" dirty="0">
                 <a:latin typeface="Courier New" panose="02070309020205020404" pitchFamily="49" charset="0"/>
                 <a:cs typeface="Courier New" panose="02070309020205020404" pitchFamily="49" charset="0"/>
               </a:rPr>
               <a:t>"{\"path\": \"/</a:t>
             </a:r>
             <a:r>
-              <a:rPr lang="en-US" sz="1640" b="1" dirty="0" err="1">
+              <a:rPr lang="en-US" sz="1640" dirty="0" err="1">
                 <a:latin typeface="Courier New" panose="02070309020205020404" pitchFamily="49" charset="0"/>
                 <a:cs typeface="Courier New" panose="02070309020205020404" pitchFamily="49" charset="0"/>
               </a:rPr>
               <a:t>lustre</a:t>
             </a:r>
             <a:r>
-              <a:rPr lang="en-US" sz="1640" b="1" dirty="0">
+              <a:rPr lang="en-US" sz="1640" dirty="0">
                 <a:latin typeface="Courier New" panose="02070309020205020404" pitchFamily="49" charset="0"/>
                 <a:cs typeface="Courier New" panose="02070309020205020404" pitchFamily="49" charset="0"/>
               </a:rPr>
               <a:t>/</a:t>
             </a:r>
             <a:r>
-              <a:rPr lang="en-US" sz="1640" b="1" dirty="0" err="1">
+              <a:rPr lang="en-US" sz="1640" dirty="0" err="1">
                 <a:latin typeface="Courier New" panose="02070309020205020404" pitchFamily="49" charset="0"/>
                 <a:cs typeface="Courier New" panose="02070309020205020404" pitchFamily="49" charset="0"/>
               </a:rPr>
               <a:t>crius</a:t>
             </a:r>
             <a:r>
-              <a:rPr lang="en-US" sz="1640" b="1" dirty="0">
+              <a:rPr lang="en-US" sz="1640" dirty="0">
                 <a:latin typeface="Courier New" panose="02070309020205020404" pitchFamily="49" charset="0"/>
                 <a:cs typeface="Courier New" panose="02070309020205020404" pitchFamily="49" charset="0"/>
               </a:rPr>
               <a:t>/</a:t>
             </a:r>
             <a:r>
-              <a:rPr lang="en-US" sz="1640" b="1" dirty="0" err="1">
+              <a:rPr lang="en-US" sz="1640" dirty="0" err="1">
                 <a:latin typeface="Courier New" panose="02070309020205020404" pitchFamily="49" charset="0"/>
                 <a:cs typeface="Courier New" panose="02070309020205020404" pitchFamily="49" charset="0"/>
               </a:rPr>
               <a:t>migagenttests</a:t>
             </a:r>
             <a:r>
-              <a:rPr lang="en-US" sz="1640" b="1" dirty="0">
+              <a:rPr lang="en-US" sz="1640" dirty="0">
                 <a:latin typeface="Courier New" panose="02070309020205020404" pitchFamily="49" charset="0"/>
                 <a:cs typeface="Courier New" panose="02070309020205020404" pitchFamily="49" charset="0"/>
               </a:rPr>
@@ -15139,35 +15139,35 @@
           <a:lstStyle/>
           <a:p>
             <a:r>
-              <a:rPr lang="en-US" sz="1640" b="1" dirty="0">
+              <a:rPr lang="en-US" sz="1640" dirty="0">
                 <a:latin typeface="Courier New" panose="02070309020205020404" pitchFamily="49" charset="0"/>
                 <a:cs typeface="Courier New" panose="02070309020205020404" pitchFamily="49" charset="0"/>
               </a:rPr>
               <a:t>parallel -S rage4 --jobs 30 "touch -d '-1 week’\ /</a:t>
             </a:r>
             <a:r>
-              <a:rPr lang="en-US" sz="1640" b="1" dirty="0" err="1">
+              <a:rPr lang="en-US" sz="1640" dirty="0" err="1">
                 <a:latin typeface="Courier New" panose="02070309020205020404" pitchFamily="49" charset="0"/>
                 <a:cs typeface="Courier New" panose="02070309020205020404" pitchFamily="49" charset="0"/>
               </a:rPr>
               <a:t>lustre</a:t>
             </a:r>
             <a:r>
-              <a:rPr lang="en-US" sz="1640" b="1" dirty="0">
+              <a:rPr lang="en-US" sz="1640" dirty="0">
                 <a:latin typeface="Courier New" panose="02070309020205020404" pitchFamily="49" charset="0"/>
                 <a:cs typeface="Courier New" panose="02070309020205020404" pitchFamily="49" charset="0"/>
               </a:rPr>
               <a:t>/</a:t>
             </a:r>
             <a:r>
-              <a:rPr lang="en-US" sz="1640" b="1" dirty="0" err="1">
+              <a:rPr lang="en-US" sz="1640" dirty="0" err="1">
                 <a:latin typeface="Courier New" panose="02070309020205020404" pitchFamily="49" charset="0"/>
                 <a:cs typeface="Courier New" panose="02070309020205020404" pitchFamily="49" charset="0"/>
               </a:rPr>
               <a:t>crius</a:t>
             </a:r>
             <a:r>
-              <a:rPr lang="en-US" sz="1640" b="1" dirty="0">
+              <a:rPr lang="en-US" sz="1640" dirty="0">
                 <a:latin typeface="Courier New" panose="02070309020205020404" pitchFamily="49" charset="0"/>
                 <a:cs typeface="Courier New" panose="02070309020205020404" pitchFamily="49" charset="0"/>
               </a:rPr>
@@ -15182,75 +15182,75 @@
           </a:p>
           <a:p>
             <a:r>
-              <a:rPr lang="en-US" sz="1640" b="1" dirty="0">
+              <a:rPr lang="en-US" sz="1640" dirty="0">
                 <a:latin typeface="Courier New" panose="02070309020205020404" pitchFamily="49" charset="0"/>
                 <a:cs typeface="Courier New" panose="02070309020205020404" pitchFamily="49" charset="0"/>
               </a:rPr>
               <a:t>parallel -k -S \ rage1,rage2,rage4,rage5,rage6,rage7,rage8,rage9 \</a:t>
             </a:r>
             <a:br>
-              <a:rPr lang="en-US" sz="1640" b="1" dirty="0">
+              <a:rPr lang="en-US" sz="1640" dirty="0">
                 <a:latin typeface="Courier New" panose="02070309020205020404" pitchFamily="49" charset="0"/>
                 <a:cs typeface="Courier New" panose="02070309020205020404" pitchFamily="49" charset="0"/>
               </a:rPr>
             </a:br>
             <a:r>
-              <a:rPr lang="en-US" sz="1640" b="1" dirty="0">
+              <a:rPr lang="en-US" sz="1640" dirty="0">
                 <a:latin typeface="Courier New" panose="02070309020205020404" pitchFamily="49" charset="0"/>
                 <a:cs typeface="Courier New" panose="02070309020205020404" pitchFamily="49" charset="0"/>
               </a:rPr>
               <a:t>/</a:t>
             </a:r>
             <a:r>
-              <a:rPr lang="en-US" sz="1640" b="1" dirty="0" err="1">
+              <a:rPr lang="en-US" sz="1640" dirty="0" err="1">
                 <a:latin typeface="Courier New" panose="02070309020205020404" pitchFamily="49" charset="0"/>
                 <a:cs typeface="Courier New" panose="02070309020205020404" pitchFamily="49" charset="0"/>
               </a:rPr>
               <a:t>lustre</a:t>
             </a:r>
             <a:r>
-              <a:rPr lang="en-US" sz="1640" b="1" dirty="0">
+              <a:rPr lang="en-US" sz="1640" dirty="0">
                 <a:latin typeface="Courier New" panose="02070309020205020404" pitchFamily="49" charset="0"/>
                 <a:cs typeface="Courier New" panose="02070309020205020404" pitchFamily="49" charset="0"/>
               </a:rPr>
               <a:t>/</a:t>
             </a:r>
             <a:r>
-              <a:rPr lang="en-US" sz="1640" b="1" dirty="0" err="1">
+              <a:rPr lang="en-US" sz="1640" dirty="0" err="1">
                 <a:latin typeface="Courier New" panose="02070309020205020404" pitchFamily="49" charset="0"/>
                 <a:cs typeface="Courier New" panose="02070309020205020404" pitchFamily="49" charset="0"/>
               </a:rPr>
               <a:t>crius</a:t>
             </a:r>
             <a:r>
-              <a:rPr lang="en-US" sz="1640" b="1" dirty="0">
+              <a:rPr lang="en-US" sz="1640" dirty="0">
                 <a:latin typeface="Courier New" panose="02070309020205020404" pitchFamily="49" charset="0"/>
                 <a:cs typeface="Courier New" panose="02070309020205020404" pitchFamily="49" charset="0"/>
               </a:rPr>
               <a:t>/scripts/</a:t>
             </a:r>
             <a:r>
-              <a:rPr lang="en-US" sz="1640" b="1" dirty="0" err="1">
+              <a:rPr lang="en-US" sz="1640" dirty="0" err="1">
                 <a:latin typeface="Courier New" panose="02070309020205020404" pitchFamily="49" charset="0"/>
                 <a:cs typeface="Courier New" panose="02070309020205020404" pitchFamily="49" charset="0"/>
               </a:rPr>
               <a:t>measure_lfsfind.sh</a:t>
             </a:r>
             <a:r>
-              <a:rPr lang="en-US" sz="1640" b="1" dirty="0">
+              <a:rPr lang="en-US" sz="1640" dirty="0">
                 <a:latin typeface="Courier New" panose="02070309020205020404" pitchFamily="49" charset="0"/>
                 <a:cs typeface="Courier New" panose="02070309020205020404" pitchFamily="49" charset="0"/>
               </a:rPr>
               <a:t> ::: {28..35} \</a:t>
             </a:r>
             <a:br>
-              <a:rPr lang="en-US" sz="1640" b="1" dirty="0">
+              <a:rPr lang="en-US" sz="1640" dirty="0">
                 <a:latin typeface="Courier New" panose="02070309020205020404" pitchFamily="49" charset="0"/>
                 <a:cs typeface="Courier New" panose="02070309020205020404" pitchFamily="49" charset="0"/>
               </a:rPr>
             </a:br>
             <a:r>
-              <a:rPr lang="en-US" sz="1640" b="1" dirty="0">
+              <a:rPr lang="en-US" sz="1640" dirty="0">
                 <a:latin typeface="Courier New" panose="02070309020205020404" pitchFamily="49" charset="0"/>
                 <a:cs typeface="Courier New" panose="02070309020205020404" pitchFamily="49" charset="0"/>
               </a:rPr>

</xml_diff>